<commit_message>
Att do slide de apresentação final
</commit_message>
<xml_diff>
--- a/documentacao/Slide de apresentação sprint 3.pptx
+++ b/documentacao/Slide de apresentação sprint 3.pptx
@@ -10,7 +10,7 @@
     <p:sldId id="273" r:id="rId4"/>
     <p:sldId id="274" r:id="rId5"/>
     <p:sldId id="275" r:id="rId6"/>
-    <p:sldId id="276" r:id="rId7"/>
+    <p:sldId id="264" r:id="rId7"/>
     <p:sldId id="277" r:id="rId8"/>
     <p:sldId id="278" r:id="rId9"/>
     <p:sldId id="281" r:id="rId10"/>
@@ -116,6 +116,11 @@
       </a:defRPr>
     </a:lvl9pPr>
   </p:defaultTextStyle>
+  <p:extLst>
+    <p:ext uri="{EFAFB233-063F-42B5-8137-9DF3F51BA10A}">
+      <p15:sldGuideLst xmlns:p15="http://schemas.microsoft.com/office/powerpoint/2012/main"/>
+    </p:ext>
+  </p:extLst>
 </p:presentation>
 </file>
 
@@ -4720,8 +4725,8 @@
         </p:blipFill>
         <p:spPr>
           <a:xfrm>
-            <a:off x="1267077" y="1014538"/>
-            <a:ext cx="4828923" cy="4828923"/>
+            <a:off x="1270014" y="2638702"/>
+            <a:ext cx="3271284" cy="3271284"/>
           </a:xfrm>
           <a:prstGeom prst="rect">
             <a:avLst/>
@@ -4744,7 +4749,7 @@
         </p:nvSpPr>
         <p:spPr>
           <a:xfrm>
-            <a:off x="6957978" y="437605"/>
+            <a:off x="944319" y="441228"/>
             <a:ext cx="4390506" cy="1727795"/>
           </a:xfrm>
           <a:prstGeom prst="rect">
@@ -4808,8 +4813,8 @@
         </p:nvSpPr>
         <p:spPr>
           <a:xfrm>
-            <a:off x="7206397" y="2653813"/>
-            <a:ext cx="3893668" cy="2308324"/>
+            <a:off x="6340549" y="441228"/>
+            <a:ext cx="4390506" cy="4401205"/>
           </a:xfrm>
           <a:prstGeom prst="rect">
             <a:avLst/>
@@ -4822,33 +4827,99 @@
           </a:bodyPr>
           <a:lstStyle/>
           <a:p>
-            <a:pPr marL="342900" indent="-342900" algn="ctr">
-              <a:buFontTx/>
-              <a:buChar char="-"/>
+            <a:pPr marL="457200" indent="-457200" algn="ctr">
+              <a:buFont typeface="Arial" panose="020B0604020202020204" pitchFamily="34" charset="0"/>
+              <a:buChar char="•"/>
             </a:pPr>
             <a:r>
-              <a:rPr lang="pt-BR" sz="4800" b="1" dirty="0"/>
-              <a:t>Contexto :</a:t>
-            </a:r>
-          </a:p>
-          <a:p>
-            <a:pPr marL="342900" indent="-342900" algn="ctr">
-              <a:buFontTx/>
-              <a:buChar char="-"/>
+              <a:rPr lang="pt-BR" sz="2800" b="1" dirty="0"/>
+              <a:t>Estima-se que 60% dos corações e pulmões destinados à doação acabam sendo descartados (G1)</a:t>
+            </a:r>
+          </a:p>
+          <a:p>
+            <a:pPr algn="ctr"/>
+            <a:endParaRPr lang="pt-BR" sz="2800" b="1" dirty="0"/>
+          </a:p>
+          <a:p>
+            <a:pPr marL="457200" indent="-457200" algn="ctr">
+              <a:buFont typeface="Arial" panose="020B0604020202020204" pitchFamily="34" charset="0"/>
+              <a:buChar char="•"/>
             </a:pPr>
             <a:r>
-              <a:rPr lang="pt-BR" sz="4800" b="1" dirty="0"/>
-              <a:t>Solução :</a:t>
-            </a:r>
-          </a:p>
-          <a:p>
-            <a:pPr marL="342900" indent="-342900" algn="ctr">
-              <a:buFontTx/>
-              <a:buChar char="-"/>
-            </a:pPr>
-            <a:r>
-              <a:rPr lang="pt-BR" sz="4800" b="1" dirty="0"/>
-              <a:t>Justificativa :</a:t>
+              <a:rPr lang="pt-BR" sz="2800" b="1" dirty="0"/>
+              <a:t>O Brasil desperdiça cerca de 3 órgãos por dia (3.095 por ano) (Clipping)</a:t>
+            </a:r>
+          </a:p>
+        </p:txBody>
+      </p:sp>
+      <p:sp>
+        <p:nvSpPr>
+          <p:cNvPr id="6" name="Título 1">
+            <a:extLst>
+              <a:ext uri="{FF2B5EF4-FFF2-40B4-BE49-F238E27FC236}">
+                <a16:creationId xmlns:a16="http://schemas.microsoft.com/office/drawing/2014/main" id="{49E424EE-D7B6-44D2-AB08-DAB842141D65}"/>
+              </a:ext>
+            </a:extLst>
+          </p:cNvPr>
+          <p:cNvSpPr txBox="1">
+            <a:spLocks/>
+          </p:cNvSpPr>
+          <p:nvPr/>
+        </p:nvSpPr>
+        <p:spPr>
+          <a:xfrm>
+            <a:off x="5900472" y="5209953"/>
+            <a:ext cx="5270660" cy="700033"/>
+          </a:xfrm>
+          <a:prstGeom prst="rect">
+            <a:avLst/>
+          </a:prstGeom>
+        </p:spPr>
+        <p:txBody>
+          <a:bodyPr vert="horz" lIns="91440" tIns="45720" rIns="91440" bIns="45720" rtlCol="0" anchor="b">
+            <a:noAutofit/>
+          </a:bodyPr>
+          <a:lstStyle>
+            <a:lvl1pPr algn="l" defTabSz="914400" rtl="0" eaLnBrk="1" latinLnBrk="0" hangingPunct="1">
+              <a:lnSpc>
+                <a:spcPct val="90000"/>
+              </a:lnSpc>
+              <a:spcBef>
+                <a:spcPct val="0"/>
+              </a:spcBef>
+              <a:buNone/>
+              <a:defRPr sz="4400" kern="1200">
+                <a:solidFill>
+                  <a:schemeClr val="tx1"/>
+                </a:solidFill>
+                <a:latin typeface="+mj-lt"/>
+                <a:ea typeface="+mj-ea"/>
+                <a:cs typeface="+mj-cs"/>
+              </a:defRPr>
+            </a:lvl1pPr>
+          </a:lstStyle>
+          <a:p>
+            <a:pPr algn="ctr"/>
+            <a:r>
+              <a:rPr lang="en-US" b="1" dirty="0">
+                <a:latin typeface="Calibri (Corpo)"/>
+              </a:rPr>
+              <a:t>Solução: Cyber</a:t>
+            </a:r>
+            <a:r>
+              <a:rPr lang="en-US" b="1" dirty="0">
+                <a:solidFill>
+                  <a:srgbClr val="66CDAA"/>
+                </a:solidFill>
+                <a:latin typeface="Calibri (Corpo)"/>
+              </a:rPr>
+              <a:t>life </a:t>
+            </a:r>
+            <a:r>
+              <a:rPr lang="en-US" b="1" dirty="0">
+                <a:latin typeface="Calibri (Corpo)"/>
+              </a:rPr>
+              <a:t>!!!</a:t>
             </a:r>
           </a:p>
         </p:txBody>
@@ -5319,12 +5390,71 @@
           <a:chExt cx="0" cy="0"/>
         </a:xfrm>
       </p:grpSpPr>
+      <p:sp>
+        <p:nvSpPr>
+          <p:cNvPr id="19" name="Rectangle 48">
+            <a:extLst>
+              <a:ext uri="{FF2B5EF4-FFF2-40B4-BE49-F238E27FC236}">
+                <a16:creationId xmlns:a16="http://schemas.microsoft.com/office/drawing/2014/main" id="{3E636B5A-5F8A-47F7-9F22-F53189A82A98}"/>
+              </a:ext>
+            </a:extLst>
+          </p:cNvPr>
+          <p:cNvSpPr/>
+          <p:nvPr/>
+        </p:nvSpPr>
+        <p:spPr>
+          <a:xfrm>
+            <a:off x="2376309" y="1062579"/>
+            <a:ext cx="7497363" cy="2013840"/>
+          </a:xfrm>
+          <a:prstGeom prst="rect">
+            <a:avLst/>
+          </a:prstGeom>
+          <a:solidFill>
+            <a:srgbClr val="66CDAA"/>
+          </a:solidFill>
+          <a:ln>
+            <a:solidFill>
+              <a:schemeClr val="tx1"/>
+            </a:solidFill>
+          </a:ln>
+        </p:spPr>
+        <p:style>
+          <a:lnRef idx="2">
+            <a:schemeClr val="accent1">
+              <a:shade val="50000"/>
+            </a:schemeClr>
+          </a:lnRef>
+          <a:fillRef idx="1">
+            <a:schemeClr val="accent1"/>
+          </a:fillRef>
+          <a:effectRef idx="0">
+            <a:schemeClr val="accent1"/>
+          </a:effectRef>
+          <a:fontRef idx="minor">
+            <a:schemeClr val="lt1"/>
+          </a:fontRef>
+        </p:style>
+        <p:txBody>
+          <a:bodyPr rtlCol="0" anchor="ctr"/>
+          <a:lstStyle/>
+          <a:p>
+            <a:pPr algn="ctr"/>
+            <a:endParaRPr lang="en-US" dirty="0">
+              <a:solidFill>
+                <a:srgbClr val="FEE698"/>
+              </a:solidFill>
+              <a:cs typeface="Calibri"/>
+            </a:endParaRPr>
+          </a:p>
+        </p:txBody>
+      </p:sp>
       <p:pic>
         <p:nvPicPr>
-          <p:cNvPr id="2" name="Imagem 1" descr="Uma imagem contendo Forma&#10;&#10;Descrição gerada automaticamente">
-            <a:extLst>
-              <a:ext uri="{FF2B5EF4-FFF2-40B4-BE49-F238E27FC236}">
-                <a16:creationId xmlns:a16="http://schemas.microsoft.com/office/drawing/2014/main" id="{CA345D02-6215-4A04-BB78-BCC76E770665}"/>
+          <p:cNvPr id="197" name="Imagem 196" descr="Uma imagem contendo Forma&#10;&#10;Descrição gerada automaticamente">
+            <a:extLst>
+              <a:ext uri="{FF2B5EF4-FFF2-40B4-BE49-F238E27FC236}">
+                <a16:creationId xmlns:a16="http://schemas.microsoft.com/office/drawing/2014/main" id="{C68C820B-4812-4781-B9A3-C93F040EF143}"/>
               </a:ext>
             </a:extLst>
           </p:cNvPr>
@@ -5347,8 +5477,8 @@
         </p:blipFill>
         <p:spPr>
           <a:xfrm>
-            <a:off x="0" y="4269756"/>
-            <a:ext cx="2588244" cy="2588244"/>
+            <a:off x="5038533" y="897043"/>
+            <a:ext cx="2546299" cy="2546299"/>
           </a:xfrm>
           <a:prstGeom prst="rect">
             <a:avLst/>
@@ -5357,77 +5487,2573 @@
       </p:pic>
       <p:sp>
         <p:nvSpPr>
-          <p:cNvPr id="5" name="Título 1">
-            <a:extLst>
-              <a:ext uri="{FF2B5EF4-FFF2-40B4-BE49-F238E27FC236}">
-                <a16:creationId xmlns:a16="http://schemas.microsoft.com/office/drawing/2014/main" id="{C3826744-1D63-4848-BA6E-96E88159FF68}"/>
-              </a:ext>
-            </a:extLst>
-          </p:cNvPr>
-          <p:cNvSpPr txBox="1">
-            <a:spLocks/>
-          </p:cNvSpPr>
-          <p:nvPr/>
-        </p:nvSpPr>
-        <p:spPr>
-          <a:xfrm>
-            <a:off x="4597094" y="316726"/>
-            <a:ext cx="6293903" cy="1530752"/>
-          </a:xfrm>
-          <a:prstGeom prst="rect">
-            <a:avLst/>
-          </a:prstGeom>
-        </p:spPr>
-        <p:txBody>
-          <a:bodyPr vert="horz" lIns="91440" tIns="45720" rIns="91440" bIns="45720" rtlCol="0" anchor="b">
-            <a:noAutofit/>
+          <p:cNvPr id="49" name="Rectangle 48">
+            <a:extLst>
+              <a:ext uri="{FF2B5EF4-FFF2-40B4-BE49-F238E27FC236}">
+                <a16:creationId xmlns:a16="http://schemas.microsoft.com/office/drawing/2014/main" id="{6381D4FF-6B56-4E1F-914B-192D89E83919}"/>
+              </a:ext>
+            </a:extLst>
+          </p:cNvPr>
+          <p:cNvSpPr/>
+          <p:nvPr/>
+        </p:nvSpPr>
+        <p:spPr>
+          <a:xfrm>
+            <a:off x="93939" y="3203729"/>
+            <a:ext cx="5077563" cy="3334377"/>
+          </a:xfrm>
+          <a:prstGeom prst="rect">
+            <a:avLst/>
+          </a:prstGeom>
+          <a:solidFill>
+            <a:srgbClr val="66CDAA"/>
+          </a:solidFill>
+          <a:ln>
+            <a:solidFill>
+              <a:schemeClr val="tx1"/>
+            </a:solidFill>
+          </a:ln>
+        </p:spPr>
+        <p:style>
+          <a:lnRef idx="2">
+            <a:schemeClr val="accent1">
+              <a:shade val="50000"/>
+            </a:schemeClr>
+          </a:lnRef>
+          <a:fillRef idx="1">
+            <a:schemeClr val="accent1"/>
+          </a:fillRef>
+          <a:effectRef idx="0">
+            <a:schemeClr val="accent1"/>
+          </a:effectRef>
+          <a:fontRef idx="minor">
+            <a:schemeClr val="lt1"/>
+          </a:fontRef>
+        </p:style>
+        <p:txBody>
+          <a:bodyPr rtlCol="0" anchor="ctr"/>
+          <a:lstStyle/>
+          <a:p>
+            <a:pPr algn="ctr"/>
+            <a:endParaRPr lang="en-US" dirty="0">
+              <a:solidFill>
+                <a:srgbClr val="FEE698"/>
+              </a:solidFill>
+              <a:cs typeface="Calibri"/>
+            </a:endParaRPr>
+          </a:p>
+        </p:txBody>
+      </p:sp>
+      <p:sp>
+        <p:nvSpPr>
+          <p:cNvPr id="50" name="Rectangle 49">
+            <a:extLst>
+              <a:ext uri="{FF2B5EF4-FFF2-40B4-BE49-F238E27FC236}">
+                <a16:creationId xmlns:a16="http://schemas.microsoft.com/office/drawing/2014/main" id="{AA89722A-29EC-4D35-9397-7B4F4BE49695}"/>
+              </a:ext>
+            </a:extLst>
+          </p:cNvPr>
+          <p:cNvSpPr/>
+          <p:nvPr/>
+        </p:nvSpPr>
+        <p:spPr>
+          <a:xfrm>
+            <a:off x="7162615" y="3203739"/>
+            <a:ext cx="4907001" cy="3334377"/>
+          </a:xfrm>
+          <a:prstGeom prst="rect">
+            <a:avLst/>
+          </a:prstGeom>
+          <a:solidFill>
+            <a:srgbClr val="66CDAA"/>
+          </a:solidFill>
+          <a:ln>
+            <a:solidFill>
+              <a:schemeClr val="tx1"/>
+            </a:solidFill>
+          </a:ln>
+        </p:spPr>
+        <p:style>
+          <a:lnRef idx="2">
+            <a:schemeClr val="accent1">
+              <a:shade val="50000"/>
+            </a:schemeClr>
+          </a:lnRef>
+          <a:fillRef idx="1">
+            <a:schemeClr val="accent1"/>
+          </a:fillRef>
+          <a:effectRef idx="0">
+            <a:schemeClr val="accent1"/>
+          </a:effectRef>
+          <a:fontRef idx="minor">
+            <a:schemeClr val="lt1"/>
+          </a:fontRef>
+        </p:style>
+        <p:txBody>
+          <a:bodyPr rtlCol="0" anchor="ctr"/>
+          <a:lstStyle/>
+          <a:p>
+            <a:pPr algn="ctr"/>
+            <a:endParaRPr lang="en-US" dirty="0">
+              <a:highlight>
+                <a:srgbClr val="66CDAA"/>
+              </a:highlight>
+            </a:endParaRPr>
+          </a:p>
+        </p:txBody>
+      </p:sp>
+      <p:cxnSp>
+        <p:nvCxnSpPr>
+          <p:cNvPr id="4" name="Straight Arrow Connector 3">
+            <a:extLst>
+              <a:ext uri="{FF2B5EF4-FFF2-40B4-BE49-F238E27FC236}">
+                <a16:creationId xmlns:a16="http://schemas.microsoft.com/office/drawing/2014/main" id="{DC0E1FF4-9DF2-4A1F-B2E7-ABE3F0A3DA35}"/>
+              </a:ext>
+            </a:extLst>
+          </p:cNvPr>
+          <p:cNvCxnSpPr/>
+          <p:nvPr/>
+        </p:nvCxnSpPr>
+        <p:spPr>
+          <a:xfrm>
+            <a:off x="-4265" y="509636"/>
+            <a:ext cx="5193195" cy="0"/>
+          </a:xfrm>
+          <a:prstGeom prst="straightConnector1">
+            <a:avLst/>
+          </a:prstGeom>
+          <a:ln w="57150">
+            <a:solidFill>
+              <a:srgbClr val="F93400"/>
+            </a:solidFill>
+          </a:ln>
+        </p:spPr>
+        <p:style>
+          <a:lnRef idx="1">
+            <a:schemeClr val="accent1"/>
+          </a:lnRef>
+          <a:fillRef idx="0">
+            <a:schemeClr val="accent1"/>
+          </a:fillRef>
+          <a:effectRef idx="0">
+            <a:schemeClr val="accent1"/>
+          </a:effectRef>
+          <a:fontRef idx="minor">
+            <a:schemeClr val="tx1"/>
+          </a:fontRef>
+        </p:style>
+      </p:cxnSp>
+      <p:sp>
+        <p:nvSpPr>
+          <p:cNvPr id="6" name="CaixaDeTexto 2">
+            <a:extLst>
+              <a:ext uri="{FF2B5EF4-FFF2-40B4-BE49-F238E27FC236}">
+                <a16:creationId xmlns:a16="http://schemas.microsoft.com/office/drawing/2014/main" id="{4E448D3D-B3E6-435B-8457-41A5228BFE34}"/>
+              </a:ext>
+            </a:extLst>
+          </p:cNvPr>
+          <p:cNvSpPr txBox="1"/>
+          <p:nvPr/>
+        </p:nvSpPr>
+        <p:spPr>
+          <a:xfrm>
+            <a:off x="-52716" y="460502"/>
+            <a:ext cx="5107275" cy="584775"/>
+          </a:xfrm>
+          <a:prstGeom prst="rect">
+            <a:avLst/>
+          </a:prstGeom>
+          <a:noFill/>
+        </p:spPr>
+        <p:txBody>
+          <a:bodyPr wrap="square" lIns="91440" tIns="45720" rIns="91440" bIns="45720" rtlCol="0" anchor="t">
+            <a:spAutoFit/>
           </a:bodyPr>
-          <a:lstStyle>
-            <a:lvl1pPr algn="l" defTabSz="914400" rtl="0" eaLnBrk="1" latinLnBrk="0" hangingPunct="1">
-              <a:lnSpc>
-                <a:spcPct val="90000"/>
-              </a:lnSpc>
-              <a:spcBef>
-                <a:spcPct val="0"/>
-              </a:spcBef>
-              <a:buNone/>
-              <a:defRPr sz="4400" kern="1200">
-                <a:solidFill>
-                  <a:schemeClr val="tx1"/>
-                </a:solidFill>
-                <a:latin typeface="+mj-lt"/>
-                <a:ea typeface="+mj-ea"/>
-                <a:cs typeface="+mj-cs"/>
-              </a:defRPr>
-            </a:lvl1pPr>
-          </a:lstStyle>
-          <a:p>
-            <a:pPr algn="ctr"/>
-            <a:r>
-              <a:rPr lang="en-US" sz="5400" b="1" dirty="0">
-                <a:latin typeface="Neue Haas Grotesk Text Pro (Títulos)"/>
-              </a:rPr>
-              <a:t>Low level design </a:t>
-            </a:r>
-          </a:p>
-          <a:p>
-            <a:pPr algn="ctr"/>
-            <a:r>
-              <a:rPr lang="en-US" sz="5400" b="1" dirty="0">
+          <a:lstStyle/>
+          <a:p>
+            <a:r>
+              <a:rPr lang="pt-BR" sz="3200" b="1" dirty="0"/>
+              <a:t>LLD – Low Level Design</a:t>
+            </a:r>
+            <a:endParaRPr lang="pt-BR" sz="3200" b="1" dirty="0">
+              <a:cs typeface="Calibri"/>
+            </a:endParaRPr>
+          </a:p>
+        </p:txBody>
+      </p:sp>
+      <p:sp>
+        <p:nvSpPr>
+          <p:cNvPr id="8" name="CaixaDeTexto 2">
+            <a:extLst>
+              <a:ext uri="{FF2B5EF4-FFF2-40B4-BE49-F238E27FC236}">
+                <a16:creationId xmlns:a16="http://schemas.microsoft.com/office/drawing/2014/main" id="{2EE13C61-8B84-4286-895F-58F799DD602B}"/>
+              </a:ext>
+            </a:extLst>
+          </p:cNvPr>
+          <p:cNvSpPr txBox="1"/>
+          <p:nvPr/>
+        </p:nvSpPr>
+        <p:spPr>
+          <a:xfrm>
+            <a:off x="-41659" y="-144113"/>
+            <a:ext cx="6759574" cy="707886"/>
+          </a:xfrm>
+          <a:prstGeom prst="rect">
+            <a:avLst/>
+          </a:prstGeom>
+          <a:noFill/>
+        </p:spPr>
+        <p:txBody>
+          <a:bodyPr wrap="square" lIns="91440" tIns="45720" rIns="91440" bIns="45720" rtlCol="0" anchor="t">
+            <a:spAutoFit/>
+          </a:bodyPr>
+          <a:lstStyle/>
+          <a:p>
+            <a:r>
+              <a:rPr lang="pt-BR" sz="4000" b="1" dirty="0"/>
+              <a:t>Desenvolvimento do </a:t>
+            </a:r>
+            <a:r>
+              <a:rPr lang="pt-BR" sz="4000" b="1" dirty="0">
                 <a:solidFill>
                   <a:srgbClr val="66CDAA"/>
                 </a:solidFill>
-                <a:latin typeface="Neue Haas Grotesk Text Pro (Títulos)"/>
               </a:rPr>
-              <a:t>LLD</a:t>
-            </a:r>
+              <a:t>projeto</a:t>
+            </a:r>
+          </a:p>
+        </p:txBody>
+      </p:sp>
+      <p:pic>
+        <p:nvPicPr>
+          <p:cNvPr id="3" name="Picture 4" descr="A picture containing shape&#10;&#10;Description automatically generated">
+            <a:extLst>
+              <a:ext uri="{FF2B5EF4-FFF2-40B4-BE49-F238E27FC236}">
+                <a16:creationId xmlns:a16="http://schemas.microsoft.com/office/drawing/2014/main" id="{4D04CC01-EB9A-4930-9D34-EC020C483514}"/>
+              </a:ext>
+            </a:extLst>
+          </p:cNvPr>
+          <p:cNvPicPr>
+            <a:picLocks noChangeAspect="1"/>
+          </p:cNvPicPr>
+          <p:nvPr/>
+        </p:nvPicPr>
+        <p:blipFill>
+          <a:blip r:embed="rId3"/>
+          <a:stretch>
+            <a:fillRect/>
+          </a:stretch>
+        </p:blipFill>
+        <p:spPr>
+          <a:xfrm>
+            <a:off x="74975" y="3664826"/>
+            <a:ext cx="2182532" cy="2153127"/>
+          </a:xfrm>
+          <a:prstGeom prst="rect">
+            <a:avLst/>
+          </a:prstGeom>
+        </p:spPr>
+      </p:pic>
+      <p:pic>
+        <p:nvPicPr>
+          <p:cNvPr id="26" name="Picture 26" descr="A picture containing shape&#10;&#10;Description automatically generated">
+            <a:extLst>
+              <a:ext uri="{FF2B5EF4-FFF2-40B4-BE49-F238E27FC236}">
+                <a16:creationId xmlns:a16="http://schemas.microsoft.com/office/drawing/2014/main" id="{C99070BA-EE67-432B-9430-98827DC85245}"/>
+              </a:ext>
+            </a:extLst>
+          </p:cNvPr>
+          <p:cNvPicPr>
+            <a:picLocks noChangeAspect="1"/>
+          </p:cNvPicPr>
+          <p:nvPr/>
+        </p:nvPicPr>
+        <p:blipFill>
+          <a:blip r:embed="rId4"/>
+          <a:stretch>
+            <a:fillRect/>
+          </a:stretch>
+        </p:blipFill>
+        <p:spPr>
+          <a:xfrm>
+            <a:off x="2870356" y="3228168"/>
+            <a:ext cx="671682" cy="788956"/>
+          </a:xfrm>
+          <a:prstGeom prst="rect">
+            <a:avLst/>
+          </a:prstGeom>
+        </p:spPr>
+      </p:pic>
+      <p:pic>
+        <p:nvPicPr>
+          <p:cNvPr id="28" name="Picture 28" descr="A picture containing shape&#10;&#10;Description automatically generated">
+            <a:extLst>
+              <a:ext uri="{FF2B5EF4-FFF2-40B4-BE49-F238E27FC236}">
+                <a16:creationId xmlns:a16="http://schemas.microsoft.com/office/drawing/2014/main" id="{A525FDEC-5BFF-4439-81CD-96356AF1634E}"/>
+              </a:ext>
+            </a:extLst>
+          </p:cNvPr>
+          <p:cNvPicPr>
+            <a:picLocks noChangeAspect="1"/>
+          </p:cNvPicPr>
+          <p:nvPr/>
+        </p:nvPicPr>
+        <p:blipFill>
+          <a:blip r:embed="rId5"/>
+          <a:stretch>
+            <a:fillRect/>
+          </a:stretch>
+        </p:blipFill>
+        <p:spPr>
+          <a:xfrm>
+            <a:off x="5843813" y="5690604"/>
+            <a:ext cx="794716" cy="782706"/>
+          </a:xfrm>
+          <a:prstGeom prst="rect">
+            <a:avLst/>
+          </a:prstGeom>
+        </p:spPr>
+      </p:pic>
+      <p:pic>
+        <p:nvPicPr>
+          <p:cNvPr id="35" name="Picture 35" descr="Icon&#10;&#10;Description automatically generated">
+            <a:extLst>
+              <a:ext uri="{FF2B5EF4-FFF2-40B4-BE49-F238E27FC236}">
+                <a16:creationId xmlns:a16="http://schemas.microsoft.com/office/drawing/2014/main" id="{68C4ACC6-FD69-4182-9F5A-BE0385C0BAA4}"/>
+              </a:ext>
+            </a:extLst>
+          </p:cNvPr>
+          <p:cNvPicPr>
+            <a:picLocks noChangeAspect="1"/>
+          </p:cNvPicPr>
+          <p:nvPr/>
+        </p:nvPicPr>
+        <p:blipFill>
+          <a:blip r:embed="rId6"/>
+          <a:stretch>
+            <a:fillRect/>
+          </a:stretch>
+        </p:blipFill>
+        <p:spPr>
+          <a:xfrm>
+            <a:off x="8563346" y="4008234"/>
+            <a:ext cx="264416" cy="284651"/>
+          </a:xfrm>
+          <a:prstGeom prst="rect">
+            <a:avLst/>
+          </a:prstGeom>
+        </p:spPr>
+      </p:pic>
+      <p:pic>
+        <p:nvPicPr>
+          <p:cNvPr id="37" name="Picture 37" descr="Logo, icon&#10;&#10;Description automatically generated">
+            <a:extLst>
+              <a:ext uri="{FF2B5EF4-FFF2-40B4-BE49-F238E27FC236}">
+                <a16:creationId xmlns:a16="http://schemas.microsoft.com/office/drawing/2014/main" id="{8F4BAFDC-4BC1-4E78-8A82-0FBCC5AF63CA}"/>
+              </a:ext>
+            </a:extLst>
+          </p:cNvPr>
+          <p:cNvPicPr>
+            <a:picLocks noChangeAspect="1"/>
+          </p:cNvPicPr>
+          <p:nvPr/>
+        </p:nvPicPr>
+        <p:blipFill>
+          <a:blip r:embed="rId7"/>
+          <a:stretch>
+            <a:fillRect/>
+          </a:stretch>
+        </p:blipFill>
+        <p:spPr>
+          <a:xfrm>
+            <a:off x="8537211" y="4362440"/>
+            <a:ext cx="318217" cy="314581"/>
+          </a:xfrm>
+          <a:prstGeom prst="rect">
+            <a:avLst/>
+          </a:prstGeom>
+        </p:spPr>
+      </p:pic>
+      <p:pic>
+        <p:nvPicPr>
+          <p:cNvPr id="41" name="Picture 41" descr="A picture containing shape&#10;&#10;Description automatically generated">
+            <a:extLst>
+              <a:ext uri="{FF2B5EF4-FFF2-40B4-BE49-F238E27FC236}">
+                <a16:creationId xmlns:a16="http://schemas.microsoft.com/office/drawing/2014/main" id="{6360AA93-B698-4839-B540-6FD9C36C2FDA}"/>
+              </a:ext>
+            </a:extLst>
+          </p:cNvPr>
+          <p:cNvPicPr>
+            <a:picLocks noChangeAspect="1"/>
+          </p:cNvPicPr>
+          <p:nvPr/>
+        </p:nvPicPr>
+        <p:blipFill>
+          <a:blip r:embed="rId8"/>
+          <a:stretch>
+            <a:fillRect/>
+          </a:stretch>
+        </p:blipFill>
+        <p:spPr>
+          <a:xfrm>
+            <a:off x="11509685" y="5082794"/>
+            <a:ext cx="340435" cy="326349"/>
+          </a:xfrm>
+          <a:prstGeom prst="rect">
+            <a:avLst/>
+          </a:prstGeom>
+        </p:spPr>
+      </p:pic>
+      <p:pic>
+        <p:nvPicPr>
+          <p:cNvPr id="42" name="Picture 42" descr="A picture containing shape&#10;&#10;Description automatically generated">
+            <a:extLst>
+              <a:ext uri="{FF2B5EF4-FFF2-40B4-BE49-F238E27FC236}">
+                <a16:creationId xmlns:a16="http://schemas.microsoft.com/office/drawing/2014/main" id="{D4502D93-7229-4176-B85D-3D507CCECD39}"/>
+              </a:ext>
+            </a:extLst>
+          </p:cNvPr>
+          <p:cNvPicPr>
+            <a:picLocks noChangeAspect="1"/>
+          </p:cNvPicPr>
+          <p:nvPr/>
+        </p:nvPicPr>
+        <p:blipFill>
+          <a:blip r:embed="rId9"/>
+          <a:stretch>
+            <a:fillRect/>
+          </a:stretch>
+        </p:blipFill>
+        <p:spPr>
+          <a:xfrm>
+            <a:off x="11086920" y="5082794"/>
+            <a:ext cx="317335" cy="326349"/>
+          </a:xfrm>
+          <a:prstGeom prst="rect">
+            <a:avLst/>
+          </a:prstGeom>
+        </p:spPr>
+      </p:pic>
+      <p:sp>
+        <p:nvSpPr>
+          <p:cNvPr id="46" name="TextBox 45">
+            <a:extLst>
+              <a:ext uri="{FF2B5EF4-FFF2-40B4-BE49-F238E27FC236}">
+                <a16:creationId xmlns:a16="http://schemas.microsoft.com/office/drawing/2014/main" id="{4D79261F-0A4E-4A7D-8A55-D0EEEEA3496F}"/>
+              </a:ext>
+            </a:extLst>
+          </p:cNvPr>
+          <p:cNvSpPr txBox="1"/>
+          <p:nvPr/>
+        </p:nvSpPr>
+        <p:spPr>
+          <a:xfrm>
+            <a:off x="5652671" y="6427113"/>
+            <a:ext cx="1151590" cy="430887"/>
+          </a:xfrm>
+          <a:prstGeom prst="rect">
+            <a:avLst/>
+          </a:prstGeom>
+          <a:noFill/>
+        </p:spPr>
+        <p:txBody>
+          <a:bodyPr rot="0" spcFirstLastPara="0" vertOverflow="overflow" horzOverflow="overflow" vert="horz" wrap="square" lIns="91440" tIns="45720" rIns="91440" bIns="45720" numCol="1" spcCol="0" rtlCol="0" fromWordArt="0" anchor="t" anchorCtr="0" forceAA="0" compatLnSpc="1">
+            <a:prstTxWarp prst="textNoShape">
+              <a:avLst/>
+            </a:prstTxWarp>
+            <a:spAutoFit/>
+          </a:bodyPr>
+          <a:lstStyle/>
+          <a:p>
+            <a:pPr algn="ctr"/>
+            <a:r>
+              <a:rPr lang="en-US" sz="1100" dirty="0">
+                <a:latin typeface="Rockwell Nova Extra Bold"/>
+              </a:rPr>
+              <a:t>REDE PÚBLICA</a:t>
+            </a:r>
+          </a:p>
+        </p:txBody>
+      </p:sp>
+      <p:cxnSp>
+        <p:nvCxnSpPr>
+          <p:cNvPr id="45" name="Straight Arrow Connector 44">
+            <a:extLst>
+              <a:ext uri="{FF2B5EF4-FFF2-40B4-BE49-F238E27FC236}">
+                <a16:creationId xmlns:a16="http://schemas.microsoft.com/office/drawing/2014/main" id="{CAEA4BF9-3C19-4464-BF4E-387159081D67}"/>
+              </a:ext>
+            </a:extLst>
+          </p:cNvPr>
+          <p:cNvCxnSpPr>
+            <a:cxnSpLocks/>
+          </p:cNvCxnSpPr>
+          <p:nvPr/>
+        </p:nvCxnSpPr>
+        <p:spPr>
+          <a:xfrm flipV="1">
+            <a:off x="5332639" y="6386625"/>
+            <a:ext cx="643618" cy="1401"/>
+          </a:xfrm>
+          <a:prstGeom prst="straightConnector1">
+            <a:avLst/>
+          </a:prstGeom>
+          <a:ln w="57150">
+            <a:solidFill>
+              <a:schemeClr val="tx1"/>
+            </a:solidFill>
+            <a:prstDash val="sysDot"/>
+          </a:ln>
+        </p:spPr>
+        <p:style>
+          <a:lnRef idx="1">
+            <a:schemeClr val="accent1"/>
+          </a:lnRef>
+          <a:fillRef idx="0">
+            <a:schemeClr val="accent1"/>
+          </a:fillRef>
+          <a:effectRef idx="0">
+            <a:schemeClr val="accent1"/>
+          </a:effectRef>
+          <a:fontRef idx="minor">
+            <a:schemeClr val="tx1"/>
+          </a:fontRef>
+        </p:style>
+      </p:cxnSp>
+      <p:sp>
+        <p:nvSpPr>
+          <p:cNvPr id="60" name="TextBox 59">
+            <a:extLst>
+              <a:ext uri="{FF2B5EF4-FFF2-40B4-BE49-F238E27FC236}">
+                <a16:creationId xmlns:a16="http://schemas.microsoft.com/office/drawing/2014/main" id="{66BF760A-AFE4-4C29-937E-62442BDFC127}"/>
+              </a:ext>
+            </a:extLst>
+          </p:cNvPr>
+          <p:cNvSpPr txBox="1"/>
+          <p:nvPr/>
+        </p:nvSpPr>
+        <p:spPr>
+          <a:xfrm>
+            <a:off x="383604" y="3375100"/>
+            <a:ext cx="1653794" cy="430887"/>
+          </a:xfrm>
+          <a:prstGeom prst="rect">
+            <a:avLst/>
+          </a:prstGeom>
+          <a:noFill/>
+        </p:spPr>
+        <p:txBody>
+          <a:bodyPr rot="0" spcFirstLastPara="0" vertOverflow="overflow" horzOverflow="overflow" vert="horz" wrap="square" lIns="91440" tIns="45720" rIns="91440" bIns="45720" numCol="1" spcCol="0" rtlCol="0" fromWordArt="0" anchor="t" anchorCtr="0" forceAA="0" compatLnSpc="1">
+            <a:prstTxWarp prst="textNoShape">
+              <a:avLst/>
+            </a:prstTxWarp>
+            <a:spAutoFit/>
+          </a:bodyPr>
+          <a:lstStyle/>
+          <a:p>
+            <a:pPr algn="ctr"/>
+            <a:r>
+              <a:rPr lang="en-US" sz="1100" b="1" dirty="0">
+                <a:latin typeface="Rockwell Nova Extra Bold" panose="02060903020205020403" pitchFamily="18" charset="0"/>
+                <a:ea typeface="+mn-lt"/>
+                <a:cs typeface="+mn-lt"/>
+              </a:rPr>
+              <a:t>CAIXA</a:t>
+            </a:r>
+            <a:endParaRPr lang="en-US" dirty="0">
+              <a:latin typeface="Rockwell Nova Extra Bold" panose="02060903020205020403" pitchFamily="18" charset="0"/>
+            </a:endParaRPr>
+          </a:p>
+          <a:p>
+            <a:pPr algn="ctr"/>
+            <a:r>
+              <a:rPr lang="en-US" sz="1100" b="1" dirty="0">
+                <a:latin typeface="Rockwell Nova Extra Bold" panose="02060903020205020403" pitchFamily="18" charset="0"/>
+                <a:ea typeface="+mn-lt"/>
+                <a:cs typeface="+mn-lt"/>
+              </a:rPr>
+              <a:t> ISOTÉRMICA</a:t>
+            </a:r>
+          </a:p>
+        </p:txBody>
+      </p:sp>
+      <p:sp>
+        <p:nvSpPr>
+          <p:cNvPr id="62" name="TextBox 61">
+            <a:extLst>
+              <a:ext uri="{FF2B5EF4-FFF2-40B4-BE49-F238E27FC236}">
+                <a16:creationId xmlns:a16="http://schemas.microsoft.com/office/drawing/2014/main" id="{A8D5AAFC-231E-4D8B-920E-17738A298F96}"/>
+              </a:ext>
+            </a:extLst>
+          </p:cNvPr>
+          <p:cNvSpPr txBox="1"/>
+          <p:nvPr/>
+        </p:nvSpPr>
+        <p:spPr>
+          <a:xfrm>
+            <a:off x="2845662" y="4850671"/>
+            <a:ext cx="2251403" cy="1195590"/>
+          </a:xfrm>
+          <a:prstGeom prst="rect">
+            <a:avLst/>
+          </a:prstGeom>
+          <a:noFill/>
+        </p:spPr>
+        <p:txBody>
+          <a:bodyPr rot="0" spcFirstLastPara="0" vertOverflow="overflow" horzOverflow="overflow" vert="horz" wrap="square" lIns="91440" tIns="45720" rIns="91440" bIns="45720" numCol="1" spcCol="0" rtlCol="0" fromWordArt="0" anchor="t" anchorCtr="0" forceAA="0" compatLnSpc="1">
+            <a:prstTxWarp prst="textNoShape">
+              <a:avLst/>
+            </a:prstTxWarp>
+            <a:spAutoFit/>
+          </a:bodyPr>
+          <a:lstStyle/>
+          <a:p>
+            <a:r>
+              <a:rPr lang="en-US" sz="1400" dirty="0">
+                <a:latin typeface="Arial Rounded MT Bold"/>
+                <a:ea typeface="+mn-lt"/>
+                <a:cs typeface="+mn-lt"/>
+              </a:rPr>
+              <a:t>Arduino com sensor LM35 embutido</a:t>
+            </a:r>
+          </a:p>
+          <a:p>
+            <a:r>
+              <a:rPr lang="en-US" sz="1400" dirty="0">
+                <a:latin typeface="Arial Rounded MT Bold"/>
+                <a:cs typeface="Calibri"/>
+              </a:rPr>
+              <a:t>na caixa, transmitindo os dados via internet</a:t>
+            </a:r>
+          </a:p>
+          <a:p>
+            <a:r>
+              <a:rPr lang="en-US" sz="1400" dirty="0">
+                <a:latin typeface="Arial Rounded MT Bold"/>
+                <a:cs typeface="Calibri"/>
+              </a:rPr>
+              <a:t>ao servidor</a:t>
+            </a:r>
+          </a:p>
+        </p:txBody>
+      </p:sp>
+      <p:cxnSp>
+        <p:nvCxnSpPr>
+          <p:cNvPr id="64" name="Straight Arrow Connector 63">
+            <a:extLst>
+              <a:ext uri="{FF2B5EF4-FFF2-40B4-BE49-F238E27FC236}">
+                <a16:creationId xmlns:a16="http://schemas.microsoft.com/office/drawing/2014/main" id="{80D755BF-5E3C-4FC4-850B-E59ED10339CD}"/>
+              </a:ext>
+            </a:extLst>
+          </p:cNvPr>
+          <p:cNvCxnSpPr>
+            <a:cxnSpLocks/>
+          </p:cNvCxnSpPr>
+          <p:nvPr/>
+        </p:nvCxnSpPr>
+        <p:spPr>
+          <a:xfrm flipH="1">
+            <a:off x="7310840" y="6378239"/>
+            <a:ext cx="4198845" cy="0"/>
+          </a:xfrm>
+          <a:prstGeom prst="straightConnector1">
+            <a:avLst/>
+          </a:prstGeom>
+          <a:ln w="57150">
+            <a:solidFill>
+              <a:schemeClr val="tx1"/>
+            </a:solidFill>
+            <a:prstDash val="sysDot"/>
+          </a:ln>
+        </p:spPr>
+        <p:style>
+          <a:lnRef idx="1">
+            <a:schemeClr val="accent1"/>
+          </a:lnRef>
+          <a:fillRef idx="0">
+            <a:schemeClr val="accent1"/>
+          </a:fillRef>
+          <a:effectRef idx="0">
+            <a:schemeClr val="accent1"/>
+          </a:effectRef>
+          <a:fontRef idx="minor">
+            <a:schemeClr val="tx1"/>
+          </a:fontRef>
+        </p:style>
+      </p:cxnSp>
+      <p:cxnSp>
+        <p:nvCxnSpPr>
+          <p:cNvPr id="70" name="Straight Arrow Connector 69">
+            <a:extLst>
+              <a:ext uri="{FF2B5EF4-FFF2-40B4-BE49-F238E27FC236}">
+                <a16:creationId xmlns:a16="http://schemas.microsoft.com/office/drawing/2014/main" id="{2A342B06-60BB-4954-98F9-B5A910F4DDD3}"/>
+              </a:ext>
+            </a:extLst>
+          </p:cNvPr>
+          <p:cNvCxnSpPr>
+            <a:cxnSpLocks/>
+          </p:cNvCxnSpPr>
+          <p:nvPr/>
+        </p:nvCxnSpPr>
+        <p:spPr>
+          <a:xfrm>
+            <a:off x="6217768" y="2820797"/>
+            <a:ext cx="17191" cy="2811653"/>
+          </a:xfrm>
+          <a:prstGeom prst="straightConnector1">
+            <a:avLst/>
+          </a:prstGeom>
+          <a:ln w="57150">
+            <a:solidFill>
+              <a:schemeClr val="tx1"/>
+            </a:solidFill>
+            <a:prstDash val="sysDot"/>
+          </a:ln>
+        </p:spPr>
+        <p:style>
+          <a:lnRef idx="1">
+            <a:schemeClr val="accent1"/>
+          </a:lnRef>
+          <a:fillRef idx="0">
+            <a:schemeClr val="accent1"/>
+          </a:fillRef>
+          <a:effectRef idx="0">
+            <a:schemeClr val="accent1"/>
+          </a:effectRef>
+          <a:fontRef idx="minor">
+            <a:schemeClr val="tx1"/>
+          </a:fontRef>
+        </p:style>
+      </p:cxnSp>
+      <p:pic>
+        <p:nvPicPr>
+          <p:cNvPr id="72" name="Picture 38" descr="A picture containing shape&#10;&#10;Description automatically generated">
+            <a:extLst>
+              <a:ext uri="{FF2B5EF4-FFF2-40B4-BE49-F238E27FC236}">
+                <a16:creationId xmlns:a16="http://schemas.microsoft.com/office/drawing/2014/main" id="{7330A166-44B3-4D9C-8549-E1940F5C6182}"/>
+              </a:ext>
+            </a:extLst>
+          </p:cNvPr>
+          <p:cNvPicPr>
+            <a:picLocks noChangeAspect="1"/>
+          </p:cNvPicPr>
+          <p:nvPr/>
+        </p:nvPicPr>
+        <p:blipFill>
+          <a:blip r:embed="rId10"/>
+          <a:stretch>
+            <a:fillRect/>
+          </a:stretch>
+        </p:blipFill>
+        <p:spPr>
+          <a:xfrm>
+            <a:off x="7223473" y="3757389"/>
+            <a:ext cx="1341403" cy="1291403"/>
+          </a:xfrm>
+          <a:prstGeom prst="rect">
+            <a:avLst/>
+          </a:prstGeom>
+        </p:spPr>
+      </p:pic>
+      <p:pic>
+        <p:nvPicPr>
+          <p:cNvPr id="73" name="Picture 43" descr="A picture containing shape&#10;&#10;Description automatically generated">
+            <a:extLst>
+              <a:ext uri="{FF2B5EF4-FFF2-40B4-BE49-F238E27FC236}">
+                <a16:creationId xmlns:a16="http://schemas.microsoft.com/office/drawing/2014/main" id="{A036B776-A76B-4EEB-83D5-6B37E67D6E47}"/>
+              </a:ext>
+            </a:extLst>
+          </p:cNvPr>
+          <p:cNvPicPr>
+            <a:picLocks noChangeAspect="1"/>
+          </p:cNvPicPr>
+          <p:nvPr/>
+        </p:nvPicPr>
+        <p:blipFill>
+          <a:blip r:embed="rId11"/>
+          <a:stretch>
+            <a:fillRect/>
+          </a:stretch>
+        </p:blipFill>
+        <p:spPr>
+          <a:xfrm>
+            <a:off x="11042839" y="3700645"/>
+            <a:ext cx="933693" cy="945386"/>
+          </a:xfrm>
+          <a:prstGeom prst="rect">
+            <a:avLst/>
+          </a:prstGeom>
+        </p:spPr>
+      </p:pic>
+      <p:pic>
+        <p:nvPicPr>
+          <p:cNvPr id="75" name="Picture 39" descr="A picture containing shape&#10;&#10;Description automatically generated">
+            <a:extLst>
+              <a:ext uri="{FF2B5EF4-FFF2-40B4-BE49-F238E27FC236}">
+                <a16:creationId xmlns:a16="http://schemas.microsoft.com/office/drawing/2014/main" id="{F7BFC04D-972D-421A-85A5-0138AC030618}"/>
+              </a:ext>
+            </a:extLst>
+          </p:cNvPr>
+          <p:cNvPicPr>
+            <a:picLocks noChangeAspect="1"/>
+          </p:cNvPicPr>
+          <p:nvPr/>
+        </p:nvPicPr>
+        <p:blipFill>
+          <a:blip r:embed="rId12"/>
+          <a:stretch>
+            <a:fillRect/>
+          </a:stretch>
+        </p:blipFill>
+        <p:spPr>
+          <a:xfrm>
+            <a:off x="9659918" y="3989576"/>
+            <a:ext cx="675429" cy="666793"/>
+          </a:xfrm>
+          <a:prstGeom prst="rect">
+            <a:avLst/>
+          </a:prstGeom>
+        </p:spPr>
+      </p:pic>
+      <p:sp>
+        <p:nvSpPr>
+          <p:cNvPr id="76" name="TextBox 75">
+            <a:extLst>
+              <a:ext uri="{FF2B5EF4-FFF2-40B4-BE49-F238E27FC236}">
+                <a16:creationId xmlns:a16="http://schemas.microsoft.com/office/drawing/2014/main" id="{3379ECE9-F13B-4C8A-8E26-9D5E9717C233}"/>
+              </a:ext>
+            </a:extLst>
+          </p:cNvPr>
+          <p:cNvSpPr txBox="1"/>
+          <p:nvPr/>
+        </p:nvSpPr>
+        <p:spPr>
+          <a:xfrm>
+            <a:off x="11016156" y="3150955"/>
+            <a:ext cx="1144658" cy="584775"/>
+          </a:xfrm>
+          <a:prstGeom prst="rect">
+            <a:avLst/>
+          </a:prstGeom>
+          <a:noFill/>
+        </p:spPr>
+        <p:txBody>
+          <a:bodyPr rot="0" spcFirstLastPara="0" vertOverflow="overflow" horzOverflow="overflow" vert="horz" wrap="square" lIns="91440" tIns="45720" rIns="91440" bIns="45720" numCol="1" spcCol="0" rtlCol="0" fromWordArt="0" anchor="t" anchorCtr="0" forceAA="0" compatLnSpc="1">
+            <a:prstTxWarp prst="textNoShape">
+              <a:avLst/>
+            </a:prstTxWarp>
+            <a:spAutoFit/>
+          </a:bodyPr>
+          <a:lstStyle/>
+          <a:p>
+            <a:pPr algn="ctr"/>
+            <a:r>
+              <a:rPr lang="en-US" sz="1600" dirty="0">
+                <a:latin typeface="Calibri"/>
+                <a:ea typeface="+mn-lt"/>
+                <a:cs typeface="+mn-lt"/>
+              </a:rPr>
+              <a:t>Android 4+</a:t>
+            </a:r>
+          </a:p>
+          <a:p>
+            <a:pPr algn="ctr"/>
+            <a:r>
+              <a:rPr lang="en-US" sz="1600" dirty="0">
+                <a:latin typeface="Calibri"/>
+                <a:cs typeface="Calibri"/>
+              </a:rPr>
+              <a:t>IOS 7+</a:t>
+            </a:r>
+            <a:endParaRPr lang="en-US" sz="1600" b="1" dirty="0">
+              <a:latin typeface="Arial Rounded MT Bold"/>
+              <a:cs typeface="Calibri"/>
+            </a:endParaRPr>
+          </a:p>
+        </p:txBody>
+      </p:sp>
+      <p:sp>
+        <p:nvSpPr>
+          <p:cNvPr id="77" name="TextBox 76">
+            <a:extLst>
+              <a:ext uri="{FF2B5EF4-FFF2-40B4-BE49-F238E27FC236}">
+                <a16:creationId xmlns:a16="http://schemas.microsoft.com/office/drawing/2014/main" id="{E42E8EFC-450E-4DDB-81A4-720023CD803C}"/>
+              </a:ext>
+            </a:extLst>
+          </p:cNvPr>
+          <p:cNvSpPr txBox="1"/>
+          <p:nvPr/>
+        </p:nvSpPr>
+        <p:spPr>
+          <a:xfrm>
+            <a:off x="7101580" y="3172463"/>
+            <a:ext cx="1554650" cy="830997"/>
+          </a:xfrm>
+          <a:prstGeom prst="rect">
+            <a:avLst/>
+          </a:prstGeom>
+          <a:noFill/>
+        </p:spPr>
+        <p:txBody>
+          <a:bodyPr rot="0" spcFirstLastPara="0" vertOverflow="overflow" horzOverflow="overflow" vert="horz" wrap="square" lIns="91440" tIns="45720" rIns="91440" bIns="45720" numCol="1" spcCol="0" rtlCol="0" fromWordArt="0" anchor="t" anchorCtr="0" forceAA="0" compatLnSpc="1">
+            <a:prstTxWarp prst="textNoShape">
+              <a:avLst/>
+            </a:prstTxWarp>
+            <a:spAutoFit/>
+          </a:bodyPr>
+          <a:lstStyle/>
+          <a:p>
+            <a:pPr algn="ctr"/>
+            <a:r>
+              <a:rPr lang="en-US" sz="1600" dirty="0">
+                <a:latin typeface="Calibri"/>
+                <a:ea typeface="+mn-lt"/>
+                <a:cs typeface="+mn-lt"/>
+              </a:rPr>
+              <a:t>Windows XP +</a:t>
+            </a:r>
+          </a:p>
+          <a:p>
+            <a:pPr algn="ctr"/>
+            <a:r>
+              <a:rPr lang="en-US" sz="1600" dirty="0">
+                <a:cs typeface="Calibri"/>
+              </a:rPr>
+              <a:t>com qualquer navegador</a:t>
+            </a:r>
+          </a:p>
+        </p:txBody>
+      </p:sp>
+      <p:pic>
+        <p:nvPicPr>
+          <p:cNvPr id="78" name="Picture 78" descr="A picture containing shape&#10;&#10;Description automatically generated">
+            <a:extLst>
+              <a:ext uri="{FF2B5EF4-FFF2-40B4-BE49-F238E27FC236}">
+                <a16:creationId xmlns:a16="http://schemas.microsoft.com/office/drawing/2014/main" id="{E66ED071-CA96-4F26-8F03-7EB521F0A6F4}"/>
+              </a:ext>
+            </a:extLst>
+          </p:cNvPr>
+          <p:cNvPicPr>
+            <a:picLocks noChangeAspect="1"/>
+          </p:cNvPicPr>
+          <p:nvPr/>
+        </p:nvPicPr>
+        <p:blipFill>
+          <a:blip r:embed="rId13"/>
+          <a:stretch>
+            <a:fillRect/>
+          </a:stretch>
+        </p:blipFill>
+        <p:spPr>
+          <a:xfrm>
+            <a:off x="9659918" y="4783556"/>
+            <a:ext cx="729065" cy="684731"/>
+          </a:xfrm>
+          <a:prstGeom prst="rect">
+            <a:avLst/>
+          </a:prstGeom>
+        </p:spPr>
+      </p:pic>
+      <p:sp>
+        <p:nvSpPr>
+          <p:cNvPr id="79" name="TextBox 78">
+            <a:extLst>
+              <a:ext uri="{FF2B5EF4-FFF2-40B4-BE49-F238E27FC236}">
+                <a16:creationId xmlns:a16="http://schemas.microsoft.com/office/drawing/2014/main" id="{18C57864-832C-4900-B346-80D6EE2EDC13}"/>
+              </a:ext>
+            </a:extLst>
+          </p:cNvPr>
+          <p:cNvSpPr txBox="1"/>
+          <p:nvPr/>
+        </p:nvSpPr>
+        <p:spPr>
+          <a:xfrm>
+            <a:off x="8466599" y="4995292"/>
+            <a:ext cx="1166191" cy="461665"/>
+          </a:xfrm>
+          <a:prstGeom prst="rect">
+            <a:avLst/>
+          </a:prstGeom>
+          <a:noFill/>
+        </p:spPr>
+        <p:txBody>
+          <a:bodyPr rot="0" spcFirstLastPara="0" vertOverflow="overflow" horzOverflow="overflow" vert="horz" wrap="square" lIns="91440" tIns="45720" rIns="91440" bIns="45720" numCol="1" spcCol="0" rtlCol="0" fromWordArt="0" anchor="t" anchorCtr="0" forceAA="0" compatLnSpc="1">
+            <a:prstTxWarp prst="textNoShape">
+              <a:avLst/>
+            </a:prstTxWarp>
+            <a:spAutoFit/>
+          </a:bodyPr>
+          <a:lstStyle/>
+          <a:p>
+            <a:pPr algn="ctr"/>
+            <a:r>
+              <a:rPr lang="en-US" sz="1200" dirty="0">
+                <a:latin typeface="Rockwell Nova Extra Bold"/>
+                <a:ea typeface="+mn-lt"/>
+                <a:cs typeface="+mn-lt"/>
+              </a:rPr>
+              <a:t>LAN/Wi-Fi</a:t>
+            </a:r>
+          </a:p>
+          <a:p>
+            <a:pPr algn="ctr"/>
+            <a:r>
+              <a:rPr lang="en-US" sz="1200" dirty="0">
+                <a:latin typeface="Rockwell Nova Extra Bold"/>
+                <a:cs typeface="Calibri"/>
+              </a:rPr>
+              <a:t>Network</a:t>
+            </a:r>
+            <a:endParaRPr lang="en-US" sz="1200" dirty="0" err="1">
+              <a:latin typeface="Calibri"/>
+              <a:cs typeface="Calibri"/>
+            </a:endParaRPr>
+          </a:p>
+        </p:txBody>
+      </p:sp>
+      <p:cxnSp>
+        <p:nvCxnSpPr>
+          <p:cNvPr id="83" name="Straight Arrow Connector 82">
+            <a:extLst>
+              <a:ext uri="{FF2B5EF4-FFF2-40B4-BE49-F238E27FC236}">
+                <a16:creationId xmlns:a16="http://schemas.microsoft.com/office/drawing/2014/main" id="{45B29C3F-C321-4823-8B06-7F5C8F073656}"/>
+              </a:ext>
+            </a:extLst>
+          </p:cNvPr>
+          <p:cNvCxnSpPr>
+            <a:cxnSpLocks/>
+          </p:cNvCxnSpPr>
+          <p:nvPr/>
+        </p:nvCxnSpPr>
+        <p:spPr>
+          <a:xfrm>
+            <a:off x="8923564" y="4369214"/>
+            <a:ext cx="625814" cy="0"/>
+          </a:xfrm>
+          <a:prstGeom prst="straightConnector1">
+            <a:avLst/>
+          </a:prstGeom>
+          <a:ln w="57150">
+            <a:solidFill>
+              <a:schemeClr val="tx1"/>
+            </a:solidFill>
+            <a:prstDash val="sysDot"/>
+          </a:ln>
+        </p:spPr>
+        <p:style>
+          <a:lnRef idx="1">
+            <a:schemeClr val="accent1"/>
+          </a:lnRef>
+          <a:fillRef idx="0">
+            <a:schemeClr val="accent1"/>
+          </a:fillRef>
+          <a:effectRef idx="0">
+            <a:schemeClr val="accent1"/>
+          </a:effectRef>
+          <a:fontRef idx="minor">
+            <a:schemeClr val="tx1"/>
+          </a:fontRef>
+        </p:style>
+      </p:cxnSp>
+      <p:cxnSp>
+        <p:nvCxnSpPr>
+          <p:cNvPr id="85" name="Straight Arrow Connector 84">
+            <a:extLst>
+              <a:ext uri="{FF2B5EF4-FFF2-40B4-BE49-F238E27FC236}">
+                <a16:creationId xmlns:a16="http://schemas.microsoft.com/office/drawing/2014/main" id="{56CCACEA-DCF4-4786-8E54-07D83B3C93FC}"/>
+              </a:ext>
+            </a:extLst>
+          </p:cNvPr>
+          <p:cNvCxnSpPr>
+            <a:cxnSpLocks/>
+          </p:cNvCxnSpPr>
+          <p:nvPr/>
+        </p:nvCxnSpPr>
+        <p:spPr>
+          <a:xfrm>
+            <a:off x="6468758" y="6378239"/>
+            <a:ext cx="937107" cy="0"/>
+          </a:xfrm>
+          <a:prstGeom prst="straightConnector1">
+            <a:avLst/>
+          </a:prstGeom>
+          <a:ln w="57150">
+            <a:solidFill>
+              <a:schemeClr val="tx1"/>
+            </a:solidFill>
+            <a:prstDash val="sysDot"/>
+          </a:ln>
+        </p:spPr>
+        <p:style>
+          <a:lnRef idx="1">
+            <a:schemeClr val="accent1"/>
+          </a:lnRef>
+          <a:fillRef idx="0">
+            <a:schemeClr val="accent1"/>
+          </a:fillRef>
+          <a:effectRef idx="0">
+            <a:schemeClr val="accent1"/>
+          </a:effectRef>
+          <a:fontRef idx="minor">
+            <a:schemeClr val="tx1"/>
+          </a:fontRef>
+        </p:style>
+      </p:cxnSp>
+      <p:cxnSp>
+        <p:nvCxnSpPr>
+          <p:cNvPr id="86" name="Straight Arrow Connector 85">
+            <a:extLst>
+              <a:ext uri="{FF2B5EF4-FFF2-40B4-BE49-F238E27FC236}">
+                <a16:creationId xmlns:a16="http://schemas.microsoft.com/office/drawing/2014/main" id="{3F9AD3AB-AD45-4D9E-BBC0-851EBB18DEFC}"/>
+              </a:ext>
+            </a:extLst>
+          </p:cNvPr>
+          <p:cNvCxnSpPr>
+            <a:cxnSpLocks/>
+          </p:cNvCxnSpPr>
+          <p:nvPr/>
+        </p:nvCxnSpPr>
+        <p:spPr>
+          <a:xfrm flipH="1">
+            <a:off x="4114021" y="2155606"/>
+            <a:ext cx="1211511" cy="0"/>
+          </a:xfrm>
+          <a:prstGeom prst="straightConnector1">
+            <a:avLst/>
+          </a:prstGeom>
+          <a:ln w="57150">
+            <a:solidFill>
+              <a:schemeClr val="tx1"/>
+            </a:solidFill>
+            <a:prstDash val="sysDot"/>
+          </a:ln>
+        </p:spPr>
+        <p:style>
+          <a:lnRef idx="1">
+            <a:schemeClr val="accent1"/>
+          </a:lnRef>
+          <a:fillRef idx="0">
+            <a:schemeClr val="accent1"/>
+          </a:fillRef>
+          <a:effectRef idx="0">
+            <a:schemeClr val="accent1"/>
+          </a:effectRef>
+          <a:fontRef idx="minor">
+            <a:schemeClr val="tx1"/>
+          </a:fontRef>
+        </p:style>
+      </p:cxnSp>
+      <p:pic>
+        <p:nvPicPr>
+          <p:cNvPr id="5" name="Picture 8" descr="A picture containing sitting&#10;&#10;Description automatically generated">
+            <a:extLst>
+              <a:ext uri="{FF2B5EF4-FFF2-40B4-BE49-F238E27FC236}">
+                <a16:creationId xmlns:a16="http://schemas.microsoft.com/office/drawing/2014/main" id="{BD1AEAD9-C2B5-43BB-828D-A6CB9803E338}"/>
+              </a:ext>
+            </a:extLst>
+          </p:cNvPr>
+          <p:cNvPicPr>
+            <a:picLocks noChangeAspect="1"/>
+          </p:cNvPicPr>
+          <p:nvPr/>
+        </p:nvPicPr>
+        <p:blipFill>
+          <a:blip r:embed="rId14"/>
+          <a:stretch>
+            <a:fillRect/>
+          </a:stretch>
+        </p:blipFill>
+        <p:spPr>
+          <a:xfrm>
+            <a:off x="3929169" y="3340268"/>
+            <a:ext cx="546896" cy="597674"/>
+          </a:xfrm>
+          <a:prstGeom prst="rect">
+            <a:avLst/>
+          </a:prstGeom>
+        </p:spPr>
+      </p:pic>
+      <p:grpSp>
+        <p:nvGrpSpPr>
+          <p:cNvPr id="36" name="Agrupar 35">
+            <a:extLst>
+              <a:ext uri="{FF2B5EF4-FFF2-40B4-BE49-F238E27FC236}">
+                <a16:creationId xmlns:a16="http://schemas.microsoft.com/office/drawing/2014/main" id="{FE4B6C22-DABA-4A2E-BDE2-45EC4BC0A0FB}"/>
+              </a:ext>
+            </a:extLst>
+          </p:cNvPr>
+          <p:cNvGrpSpPr/>
+          <p:nvPr/>
+        </p:nvGrpSpPr>
+        <p:grpSpPr>
+          <a:xfrm>
+            <a:off x="8170040" y="1227019"/>
+            <a:ext cx="1450309" cy="1554241"/>
+            <a:chOff x="5541097" y="2417385"/>
+            <a:chExt cx="1140928" cy="1493653"/>
+          </a:xfrm>
+        </p:grpSpPr>
+        <p:pic>
+          <p:nvPicPr>
+            <p:cNvPr id="34" name="Picture 34" descr="A picture containing shape&#10;&#10;Description automatically generated">
+              <a:extLst>
+                <a:ext uri="{FF2B5EF4-FFF2-40B4-BE49-F238E27FC236}">
+                  <a16:creationId xmlns:a16="http://schemas.microsoft.com/office/drawing/2014/main" id="{EF2BD021-160C-4184-892F-4958B5FC9D65}"/>
+                </a:ext>
+              </a:extLst>
+            </p:cNvPr>
+            <p:cNvPicPr>
+              <a:picLocks noChangeAspect="1"/>
+            </p:cNvPicPr>
+            <p:nvPr/>
+          </p:nvPicPr>
+          <p:blipFill>
+            <a:blip r:embed="rId15"/>
+            <a:stretch>
+              <a:fillRect/>
+            </a:stretch>
+          </p:blipFill>
+          <p:spPr>
+            <a:xfrm>
+              <a:off x="5541097" y="2786675"/>
+              <a:ext cx="1140928" cy="1124363"/>
+            </a:xfrm>
+            <a:prstGeom prst="rect">
+              <a:avLst/>
+            </a:prstGeom>
+          </p:spPr>
+        </p:pic>
+        <p:pic>
+          <p:nvPicPr>
+            <p:cNvPr id="7" name="Picture 8" descr="A picture containing shape&#10;&#10;Description automatically generated">
+              <a:extLst>
+                <a:ext uri="{FF2B5EF4-FFF2-40B4-BE49-F238E27FC236}">
+                  <a16:creationId xmlns:a16="http://schemas.microsoft.com/office/drawing/2014/main" id="{5D49106B-58DC-466D-8F1D-F6B9C7163F09}"/>
+                </a:ext>
+              </a:extLst>
+            </p:cNvPr>
+            <p:cNvPicPr>
+              <a:picLocks noChangeAspect="1"/>
+            </p:cNvPicPr>
+            <p:nvPr/>
+          </p:nvPicPr>
+          <p:blipFill>
+            <a:blip r:embed="rId16"/>
+            <a:stretch>
+              <a:fillRect/>
+            </a:stretch>
+          </p:blipFill>
+          <p:spPr>
+            <a:xfrm>
+              <a:off x="5787225" y="2417385"/>
+              <a:ext cx="721933" cy="643479"/>
+            </a:xfrm>
+            <a:prstGeom prst="rect">
+              <a:avLst/>
+            </a:prstGeom>
+          </p:spPr>
+        </p:pic>
+      </p:grpSp>
+      <p:pic>
+        <p:nvPicPr>
+          <p:cNvPr id="24" name="Imagem 23" descr="Uma imagem contendo Forma&#10;&#10;Descrição gerada automaticamente">
+            <a:extLst>
+              <a:ext uri="{FF2B5EF4-FFF2-40B4-BE49-F238E27FC236}">
+                <a16:creationId xmlns:a16="http://schemas.microsoft.com/office/drawing/2014/main" id="{4F0B98C3-308D-4067-9172-6376F3D09617}"/>
+              </a:ext>
+            </a:extLst>
+          </p:cNvPr>
+          <p:cNvPicPr>
+            <a:picLocks noChangeAspect="1"/>
+          </p:cNvPicPr>
+          <p:nvPr/>
+        </p:nvPicPr>
+        <p:blipFill>
+          <a:blip r:embed="rId17">
+            <a:extLst>
+              <a:ext uri="{28A0092B-C50C-407E-A947-70E740481C1C}">
+                <a14:useLocalDpi xmlns:a14="http://schemas.microsoft.com/office/drawing/2010/main" val="0"/>
+              </a:ext>
+            </a:extLst>
+          </a:blip>
+          <a:stretch>
+            <a:fillRect/>
+          </a:stretch>
+        </p:blipFill>
+        <p:spPr>
+          <a:xfrm>
+            <a:off x="5813607" y="2120055"/>
+            <a:ext cx="622765" cy="652082"/>
+          </a:xfrm>
+          <a:prstGeom prst="rect">
+            <a:avLst/>
+          </a:prstGeom>
+        </p:spPr>
+      </p:pic>
+      <p:pic>
+        <p:nvPicPr>
+          <p:cNvPr id="25" name="Imagem 24" descr="Logotipo, Ícone&#10;&#10;Descrição gerada automaticamente">
+            <a:extLst>
+              <a:ext uri="{FF2B5EF4-FFF2-40B4-BE49-F238E27FC236}">
+                <a16:creationId xmlns:a16="http://schemas.microsoft.com/office/drawing/2014/main" id="{EE4BCA58-5034-4993-8D9C-3A3B782817C7}"/>
+              </a:ext>
+            </a:extLst>
+          </p:cNvPr>
+          <p:cNvPicPr>
+            <a:picLocks noChangeAspect="1"/>
+          </p:cNvPicPr>
+          <p:nvPr/>
+        </p:nvPicPr>
+        <p:blipFill>
+          <a:blip r:embed="rId18">
+            <a:extLst>
+              <a:ext uri="{28A0092B-C50C-407E-A947-70E740481C1C}">
+                <a14:useLocalDpi xmlns:a14="http://schemas.microsoft.com/office/drawing/2010/main" val="0"/>
+              </a:ext>
+            </a:extLst>
+          </a:blip>
+          <a:stretch>
+            <a:fillRect/>
+          </a:stretch>
+        </p:blipFill>
+        <p:spPr>
+          <a:xfrm>
+            <a:off x="5795199" y="1498067"/>
+            <a:ext cx="643987" cy="634354"/>
+          </a:xfrm>
+          <a:prstGeom prst="rect">
+            <a:avLst/>
+          </a:prstGeom>
+        </p:spPr>
+      </p:pic>
+      <p:sp>
+        <p:nvSpPr>
+          <p:cNvPr id="48" name="Elipse 47">
+            <a:extLst>
+              <a:ext uri="{FF2B5EF4-FFF2-40B4-BE49-F238E27FC236}">
+                <a16:creationId xmlns:a16="http://schemas.microsoft.com/office/drawing/2014/main" id="{D13B01CF-9673-448C-864C-1AA584CBBF88}"/>
+              </a:ext>
+            </a:extLst>
+          </p:cNvPr>
+          <p:cNvSpPr/>
+          <p:nvPr/>
+        </p:nvSpPr>
+        <p:spPr>
+          <a:xfrm>
+            <a:off x="2420486" y="1312593"/>
+            <a:ext cx="1693535" cy="1690695"/>
+          </a:xfrm>
+          <a:prstGeom prst="ellipse">
+            <a:avLst/>
+          </a:prstGeom>
+          <a:noFill/>
+          <a:ln w="38100">
+            <a:solidFill>
+              <a:schemeClr val="tx1"/>
+            </a:solidFill>
+            <a:prstDash val="solid"/>
+          </a:ln>
+        </p:spPr>
+        <p:style>
+          <a:lnRef idx="2">
+            <a:schemeClr val="accent1">
+              <a:shade val="50000"/>
+            </a:schemeClr>
+          </a:lnRef>
+          <a:fillRef idx="1">
+            <a:schemeClr val="accent1"/>
+          </a:fillRef>
+          <a:effectRef idx="0">
+            <a:schemeClr val="accent1"/>
+          </a:effectRef>
+          <a:fontRef idx="minor">
+            <a:schemeClr val="lt1"/>
+          </a:fontRef>
+        </p:style>
+        <p:txBody>
+          <a:bodyPr rtlCol="0" anchor="ctr"/>
+          <a:lstStyle/>
+          <a:p>
+            <a:pPr algn="ctr"/>
+            <a:endParaRPr lang="pt-BR" dirty="0"/>
+          </a:p>
+        </p:txBody>
+      </p:sp>
+      <p:pic>
+        <p:nvPicPr>
+          <p:cNvPr id="74" name="Picture 54" descr="A picture containing shape&#10;&#10;Description automatically generated">
+            <a:extLst>
+              <a:ext uri="{FF2B5EF4-FFF2-40B4-BE49-F238E27FC236}">
+                <a16:creationId xmlns:a16="http://schemas.microsoft.com/office/drawing/2014/main" id="{8D9534B9-1D34-4438-A092-7EA034148421}"/>
+              </a:ext>
+            </a:extLst>
+          </p:cNvPr>
+          <p:cNvPicPr>
+            <a:picLocks noChangeAspect="1"/>
+          </p:cNvPicPr>
+          <p:nvPr/>
+        </p:nvPicPr>
+        <p:blipFill>
+          <a:blip r:embed="rId19"/>
+          <a:stretch>
+            <a:fillRect/>
+          </a:stretch>
+        </p:blipFill>
+        <p:spPr>
+          <a:xfrm>
+            <a:off x="2734297" y="1431854"/>
+            <a:ext cx="972945" cy="966247"/>
+          </a:xfrm>
+          <a:prstGeom prst="rect">
+            <a:avLst/>
+          </a:prstGeom>
+        </p:spPr>
+      </p:pic>
+      <p:pic>
+        <p:nvPicPr>
+          <p:cNvPr id="12" name="Imagem 11" descr="Uma imagem contendo Forma&#10;&#10;Descrição gerada automaticamente">
+            <a:extLst>
+              <a:ext uri="{FF2B5EF4-FFF2-40B4-BE49-F238E27FC236}">
+                <a16:creationId xmlns:a16="http://schemas.microsoft.com/office/drawing/2014/main" id="{0E0FD7EC-A21F-42FD-A776-8CBB747396F9}"/>
+              </a:ext>
+            </a:extLst>
+          </p:cNvPr>
+          <p:cNvPicPr>
+            <a:picLocks noChangeAspect="1"/>
+          </p:cNvPicPr>
+          <p:nvPr/>
+        </p:nvPicPr>
+        <p:blipFill>
+          <a:blip r:embed="rId20">
+            <a:extLst>
+              <a:ext uri="{28A0092B-C50C-407E-A947-70E740481C1C}">
+                <a14:useLocalDpi xmlns:a14="http://schemas.microsoft.com/office/drawing/2010/main" val="0"/>
+              </a:ext>
+            </a:extLst>
+          </a:blip>
+          <a:stretch>
+            <a:fillRect/>
+          </a:stretch>
+        </p:blipFill>
+        <p:spPr>
+          <a:xfrm>
+            <a:off x="2757024" y="2444732"/>
+            <a:ext cx="376065" cy="376065"/>
+          </a:xfrm>
+          <a:prstGeom prst="rect">
+            <a:avLst/>
+          </a:prstGeom>
+        </p:spPr>
+      </p:pic>
+      <p:pic>
+        <p:nvPicPr>
+          <p:cNvPr id="18" name="Imagem 17" descr="Uma imagem contendo Forma&#10;&#10;Descrição gerada automaticamente">
+            <a:extLst>
+              <a:ext uri="{FF2B5EF4-FFF2-40B4-BE49-F238E27FC236}">
+                <a16:creationId xmlns:a16="http://schemas.microsoft.com/office/drawing/2014/main" id="{07EDE71C-DD65-4D4A-84D1-17FCFF0DD43E}"/>
+              </a:ext>
+            </a:extLst>
+          </p:cNvPr>
+          <p:cNvPicPr>
+            <a:picLocks noChangeAspect="1"/>
+          </p:cNvPicPr>
+          <p:nvPr/>
+        </p:nvPicPr>
+        <p:blipFill>
+          <a:blip r:embed="rId21">
+            <a:extLst>
+              <a:ext uri="{28A0092B-C50C-407E-A947-70E740481C1C}">
+                <a14:useLocalDpi xmlns:a14="http://schemas.microsoft.com/office/drawing/2010/main" val="0"/>
+              </a:ext>
+            </a:extLst>
+          </a:blip>
+          <a:stretch>
+            <a:fillRect/>
+          </a:stretch>
+        </p:blipFill>
+        <p:spPr>
+          <a:xfrm>
+            <a:off x="3085642" y="2444732"/>
+            <a:ext cx="376065" cy="376065"/>
+          </a:xfrm>
+          <a:prstGeom prst="rect">
+            <a:avLst/>
+          </a:prstGeom>
+        </p:spPr>
+      </p:pic>
+      <p:pic>
+        <p:nvPicPr>
+          <p:cNvPr id="20" name="Imagem 19" descr="Uma imagem contendo Forma&#10;&#10;Descrição gerada automaticamente">
+            <a:extLst>
+              <a:ext uri="{FF2B5EF4-FFF2-40B4-BE49-F238E27FC236}">
+                <a16:creationId xmlns:a16="http://schemas.microsoft.com/office/drawing/2014/main" id="{5799E8D8-3987-4C80-88C1-B675558DE1EE}"/>
+              </a:ext>
+            </a:extLst>
+          </p:cNvPr>
+          <p:cNvPicPr>
+            <a:picLocks noChangeAspect="1"/>
+          </p:cNvPicPr>
+          <p:nvPr/>
+        </p:nvPicPr>
+        <p:blipFill>
+          <a:blip r:embed="rId22">
+            <a:extLst>
+              <a:ext uri="{28A0092B-C50C-407E-A947-70E740481C1C}">
+                <a14:useLocalDpi xmlns:a14="http://schemas.microsoft.com/office/drawing/2010/main" val="0"/>
+              </a:ext>
+            </a:extLst>
+          </a:blip>
+          <a:stretch>
+            <a:fillRect/>
+          </a:stretch>
+        </p:blipFill>
+        <p:spPr>
+          <a:xfrm>
+            <a:off x="3440349" y="2444732"/>
+            <a:ext cx="376065" cy="376065"/>
+          </a:xfrm>
+          <a:prstGeom prst="rect">
+            <a:avLst/>
+          </a:prstGeom>
+        </p:spPr>
+      </p:pic>
+      <p:cxnSp>
+        <p:nvCxnSpPr>
+          <p:cNvPr id="90" name="Straight Arrow Connector 85">
+            <a:extLst>
+              <a:ext uri="{FF2B5EF4-FFF2-40B4-BE49-F238E27FC236}">
+                <a16:creationId xmlns:a16="http://schemas.microsoft.com/office/drawing/2014/main" id="{92135A6B-7A88-4673-86E5-E9729BE40D72}"/>
+              </a:ext>
+            </a:extLst>
+          </p:cNvPr>
+          <p:cNvCxnSpPr>
+            <a:cxnSpLocks/>
+          </p:cNvCxnSpPr>
+          <p:nvPr/>
+        </p:nvCxnSpPr>
+        <p:spPr>
+          <a:xfrm flipH="1">
+            <a:off x="7373479" y="2170192"/>
+            <a:ext cx="708337" cy="0"/>
+          </a:xfrm>
+          <a:prstGeom prst="straightConnector1">
+            <a:avLst/>
+          </a:prstGeom>
+          <a:ln w="57150">
+            <a:solidFill>
+              <a:schemeClr val="tx1"/>
+            </a:solidFill>
+            <a:prstDash val="sysDot"/>
+          </a:ln>
+        </p:spPr>
+        <p:style>
+          <a:lnRef idx="1">
+            <a:schemeClr val="accent1"/>
+          </a:lnRef>
+          <a:fillRef idx="0">
+            <a:schemeClr val="accent1"/>
+          </a:fillRef>
+          <a:effectRef idx="0">
+            <a:schemeClr val="accent1"/>
+          </a:effectRef>
+          <a:fontRef idx="minor">
+            <a:schemeClr val="tx1"/>
+          </a:fontRef>
+        </p:style>
+      </p:cxnSp>
+      <p:sp>
+        <p:nvSpPr>
+          <p:cNvPr id="92" name="TextBox 80">
+            <a:extLst>
+              <a:ext uri="{FF2B5EF4-FFF2-40B4-BE49-F238E27FC236}">
+                <a16:creationId xmlns:a16="http://schemas.microsoft.com/office/drawing/2014/main" id="{AA11C705-C7A4-4D53-81A1-3F09D19647B0}"/>
+              </a:ext>
+            </a:extLst>
+          </p:cNvPr>
+          <p:cNvSpPr txBox="1"/>
+          <p:nvPr/>
+        </p:nvSpPr>
+        <p:spPr>
+          <a:xfrm>
+            <a:off x="2898775" y="1065631"/>
+            <a:ext cx="643987" cy="276999"/>
+          </a:xfrm>
+          <a:prstGeom prst="rect">
+            <a:avLst/>
+          </a:prstGeom>
+          <a:noFill/>
+        </p:spPr>
+        <p:txBody>
+          <a:bodyPr rot="0" spcFirstLastPara="0" vertOverflow="overflow" horzOverflow="overflow" vert="horz" wrap="square" lIns="91440" tIns="45720" rIns="91440" bIns="45720" numCol="1" spcCol="0" rtlCol="0" fromWordArt="0" anchor="t" anchorCtr="0" forceAA="0" compatLnSpc="1">
+            <a:prstTxWarp prst="textNoShape">
+              <a:avLst/>
+            </a:prstTxWarp>
+            <a:spAutoFit/>
+          </a:bodyPr>
+          <a:lstStyle/>
+          <a:p>
+            <a:pPr algn="ctr"/>
+            <a:r>
+              <a:rPr lang="en-US" sz="1200" dirty="0">
+                <a:latin typeface="Rockwell Nova Extra Bold"/>
+                <a:ea typeface="+mn-lt"/>
+                <a:cs typeface="+mn-lt"/>
+              </a:rPr>
+              <a:t>SITE</a:t>
+            </a:r>
+          </a:p>
+        </p:txBody>
+      </p:sp>
+      <p:sp>
+        <p:nvSpPr>
+          <p:cNvPr id="94" name="TextBox 80">
+            <a:extLst>
+              <a:ext uri="{FF2B5EF4-FFF2-40B4-BE49-F238E27FC236}">
+                <a16:creationId xmlns:a16="http://schemas.microsoft.com/office/drawing/2014/main" id="{066F455B-5B4C-4689-B65B-EC2A166AF368}"/>
+              </a:ext>
+            </a:extLst>
+          </p:cNvPr>
+          <p:cNvSpPr txBox="1"/>
+          <p:nvPr/>
+        </p:nvSpPr>
+        <p:spPr>
+          <a:xfrm>
+            <a:off x="5527525" y="1103768"/>
+            <a:ext cx="1179333" cy="276999"/>
+          </a:xfrm>
+          <a:prstGeom prst="rect">
+            <a:avLst/>
+          </a:prstGeom>
+          <a:noFill/>
+        </p:spPr>
+        <p:txBody>
+          <a:bodyPr rot="0" spcFirstLastPara="0" vertOverflow="overflow" horzOverflow="overflow" vert="horz" wrap="square" lIns="91440" tIns="45720" rIns="91440" bIns="45720" numCol="1" spcCol="0" rtlCol="0" fromWordArt="0" anchor="t" anchorCtr="0" forceAA="0" compatLnSpc="1">
+            <a:prstTxWarp prst="textNoShape">
+              <a:avLst/>
+            </a:prstTxWarp>
+            <a:spAutoFit/>
+          </a:bodyPr>
+          <a:lstStyle/>
+          <a:p>
+            <a:pPr algn="ctr"/>
+            <a:r>
+              <a:rPr lang="en-US" sz="1200" dirty="0">
+                <a:latin typeface="Rockwell Nova Extra Bold"/>
+                <a:ea typeface="+mn-lt"/>
+                <a:cs typeface="+mn-lt"/>
+              </a:rPr>
+              <a:t>SERVIDOR</a:t>
+            </a:r>
+          </a:p>
+        </p:txBody>
+      </p:sp>
+      <p:sp>
+        <p:nvSpPr>
+          <p:cNvPr id="96" name="TextBox 80">
+            <a:extLst>
+              <a:ext uri="{FF2B5EF4-FFF2-40B4-BE49-F238E27FC236}">
+                <a16:creationId xmlns:a16="http://schemas.microsoft.com/office/drawing/2014/main" id="{3FE1DB60-A1B8-470B-BB42-6FDB27ABDFB4}"/>
+              </a:ext>
+            </a:extLst>
+          </p:cNvPr>
+          <p:cNvSpPr txBox="1"/>
+          <p:nvPr/>
+        </p:nvSpPr>
+        <p:spPr>
+          <a:xfrm>
+            <a:off x="8411041" y="1062374"/>
+            <a:ext cx="1202264" cy="276999"/>
+          </a:xfrm>
+          <a:prstGeom prst="rect">
+            <a:avLst/>
+          </a:prstGeom>
+          <a:noFill/>
+        </p:spPr>
+        <p:txBody>
+          <a:bodyPr rot="0" spcFirstLastPara="0" vertOverflow="overflow" horzOverflow="overflow" vert="horz" wrap="square" lIns="91440" tIns="45720" rIns="91440" bIns="45720" numCol="1" spcCol="0" rtlCol="0" fromWordArt="0" anchor="t" anchorCtr="0" forceAA="0" compatLnSpc="1">
+            <a:prstTxWarp prst="textNoShape">
+              <a:avLst/>
+            </a:prstTxWarp>
+            <a:spAutoFit/>
+          </a:bodyPr>
+          <a:lstStyle/>
+          <a:p>
+            <a:pPr algn="ctr"/>
+            <a:r>
+              <a:rPr lang="en-US" sz="1200" dirty="0">
+                <a:latin typeface="Rockwell Nova Extra Bold"/>
+                <a:ea typeface="+mn-lt"/>
+                <a:cs typeface="+mn-lt"/>
+              </a:rPr>
+              <a:t>DATABASE</a:t>
+            </a:r>
+          </a:p>
+        </p:txBody>
+      </p:sp>
+      <p:sp>
+        <p:nvSpPr>
+          <p:cNvPr id="98" name="Retângulo 97">
+            <a:extLst>
+              <a:ext uri="{FF2B5EF4-FFF2-40B4-BE49-F238E27FC236}">
+                <a16:creationId xmlns:a16="http://schemas.microsoft.com/office/drawing/2014/main" id="{E62424E0-B2E0-4609-8951-12F8222B3EC3}"/>
+              </a:ext>
+            </a:extLst>
+          </p:cNvPr>
+          <p:cNvSpPr/>
+          <p:nvPr/>
+        </p:nvSpPr>
+        <p:spPr>
+          <a:xfrm>
+            <a:off x="2812519" y="3269152"/>
+            <a:ext cx="2284547" cy="2801970"/>
+          </a:xfrm>
+          <a:prstGeom prst="rect">
+            <a:avLst/>
+          </a:prstGeom>
+          <a:noFill/>
+          <a:ln w="38100">
+            <a:solidFill>
+              <a:schemeClr val="tx1"/>
+            </a:solidFill>
+            <a:prstDash val="solid"/>
+          </a:ln>
+        </p:spPr>
+        <p:style>
+          <a:lnRef idx="2">
+            <a:schemeClr val="accent1">
+              <a:shade val="50000"/>
+            </a:schemeClr>
+          </a:lnRef>
+          <a:fillRef idx="1">
+            <a:schemeClr val="accent1"/>
+          </a:fillRef>
+          <a:effectRef idx="0">
+            <a:schemeClr val="accent1"/>
+          </a:effectRef>
+          <a:fontRef idx="minor">
+            <a:schemeClr val="lt1"/>
+          </a:fontRef>
+        </p:style>
+        <p:txBody>
+          <a:bodyPr rtlCol="0" anchor="ctr"/>
+          <a:lstStyle/>
+          <a:p>
+            <a:pPr algn="ctr"/>
+            <a:endParaRPr lang="pt-BR" dirty="0"/>
+          </a:p>
+        </p:txBody>
+      </p:sp>
+      <p:pic>
+        <p:nvPicPr>
+          <p:cNvPr id="106" name="Picture 15" descr="A picture containing drawing&#10;&#10;Description automatically generated">
+            <a:extLst>
+              <a:ext uri="{FF2B5EF4-FFF2-40B4-BE49-F238E27FC236}">
+                <a16:creationId xmlns:a16="http://schemas.microsoft.com/office/drawing/2014/main" id="{E88F7783-1F94-4591-9CA3-EFE5D8A358CF}"/>
+              </a:ext>
+            </a:extLst>
+          </p:cNvPr>
+          <p:cNvPicPr>
+            <a:picLocks noChangeAspect="1"/>
+          </p:cNvPicPr>
+          <p:nvPr/>
+        </p:nvPicPr>
+        <p:blipFill>
+          <a:blip r:embed="rId23"/>
+          <a:stretch>
+            <a:fillRect/>
+          </a:stretch>
+        </p:blipFill>
+        <p:spPr>
+          <a:xfrm>
+            <a:off x="2075665" y="4249705"/>
+            <a:ext cx="675996" cy="1004932"/>
+          </a:xfrm>
+          <a:prstGeom prst="rect">
+            <a:avLst/>
+          </a:prstGeom>
+        </p:spPr>
+      </p:pic>
+      <p:cxnSp>
+        <p:nvCxnSpPr>
+          <p:cNvPr id="134" name="Straight Arrow Connector 82">
+            <a:extLst>
+              <a:ext uri="{FF2B5EF4-FFF2-40B4-BE49-F238E27FC236}">
+                <a16:creationId xmlns:a16="http://schemas.microsoft.com/office/drawing/2014/main" id="{4E3F8C50-4DF3-41BB-8C86-A02032721E67}"/>
+              </a:ext>
+            </a:extLst>
+          </p:cNvPr>
+          <p:cNvCxnSpPr>
+            <a:cxnSpLocks/>
+          </p:cNvCxnSpPr>
+          <p:nvPr/>
+        </p:nvCxnSpPr>
+        <p:spPr>
+          <a:xfrm flipH="1">
+            <a:off x="10388984" y="4338098"/>
+            <a:ext cx="755266" cy="0"/>
+          </a:xfrm>
+          <a:prstGeom prst="straightConnector1">
+            <a:avLst/>
+          </a:prstGeom>
+          <a:ln w="57150">
+            <a:solidFill>
+              <a:schemeClr val="tx1"/>
+            </a:solidFill>
+            <a:prstDash val="sysDot"/>
+          </a:ln>
+        </p:spPr>
+        <p:style>
+          <a:lnRef idx="1">
+            <a:schemeClr val="accent1"/>
+          </a:lnRef>
+          <a:fillRef idx="0">
+            <a:schemeClr val="accent1"/>
+          </a:fillRef>
+          <a:effectRef idx="0">
+            <a:schemeClr val="accent1"/>
+          </a:effectRef>
+          <a:fontRef idx="minor">
+            <a:schemeClr val="tx1"/>
+          </a:fontRef>
+        </p:style>
+      </p:cxnSp>
+      <p:cxnSp>
+        <p:nvCxnSpPr>
+          <p:cNvPr id="147" name="Straight Arrow Connector 82">
+            <a:extLst>
+              <a:ext uri="{FF2B5EF4-FFF2-40B4-BE49-F238E27FC236}">
+                <a16:creationId xmlns:a16="http://schemas.microsoft.com/office/drawing/2014/main" id="{379E41AA-5457-4AA6-AC13-A8C0EEC1788A}"/>
+              </a:ext>
+            </a:extLst>
+          </p:cNvPr>
+          <p:cNvCxnSpPr>
+            <a:cxnSpLocks/>
+          </p:cNvCxnSpPr>
+          <p:nvPr/>
+        </p:nvCxnSpPr>
+        <p:spPr>
+          <a:xfrm flipH="1" flipV="1">
+            <a:off x="10007885" y="4672147"/>
+            <a:ext cx="6003" cy="384069"/>
+          </a:xfrm>
+          <a:prstGeom prst="straightConnector1">
+            <a:avLst/>
+          </a:prstGeom>
+          <a:ln w="57150">
+            <a:solidFill>
+              <a:schemeClr val="tx1"/>
+            </a:solidFill>
+            <a:prstDash val="sysDot"/>
+          </a:ln>
+        </p:spPr>
+        <p:style>
+          <a:lnRef idx="1">
+            <a:schemeClr val="accent1"/>
+          </a:lnRef>
+          <a:fillRef idx="0">
+            <a:schemeClr val="accent1"/>
+          </a:fillRef>
+          <a:effectRef idx="0">
+            <a:schemeClr val="accent1"/>
+          </a:effectRef>
+          <a:fontRef idx="minor">
+            <a:schemeClr val="tx1"/>
+          </a:fontRef>
+        </p:style>
+      </p:cxnSp>
+      <p:cxnSp>
+        <p:nvCxnSpPr>
+          <p:cNvPr id="149" name="Straight Arrow Connector 82">
+            <a:extLst>
+              <a:ext uri="{FF2B5EF4-FFF2-40B4-BE49-F238E27FC236}">
+                <a16:creationId xmlns:a16="http://schemas.microsoft.com/office/drawing/2014/main" id="{72880C41-4EB3-425E-9E7F-712B92F15A61}"/>
+              </a:ext>
+            </a:extLst>
+          </p:cNvPr>
+          <p:cNvCxnSpPr>
+            <a:cxnSpLocks/>
+          </p:cNvCxnSpPr>
+          <p:nvPr/>
+        </p:nvCxnSpPr>
+        <p:spPr>
+          <a:xfrm flipV="1">
+            <a:off x="11498683" y="4672147"/>
+            <a:ext cx="1" cy="349225"/>
+          </a:xfrm>
+          <a:prstGeom prst="straightConnector1">
+            <a:avLst/>
+          </a:prstGeom>
+          <a:ln w="57150">
+            <a:solidFill>
+              <a:schemeClr val="tx1"/>
+            </a:solidFill>
+            <a:prstDash val="sysDot"/>
+          </a:ln>
+        </p:spPr>
+        <p:style>
+          <a:lnRef idx="1">
+            <a:schemeClr val="accent1"/>
+          </a:lnRef>
+          <a:fillRef idx="0">
+            <a:schemeClr val="accent1"/>
+          </a:fillRef>
+          <a:effectRef idx="0">
+            <a:schemeClr val="accent1"/>
+          </a:effectRef>
+          <a:fontRef idx="minor">
+            <a:schemeClr val="tx1"/>
+          </a:fontRef>
+        </p:style>
+      </p:cxnSp>
+      <p:cxnSp>
+        <p:nvCxnSpPr>
+          <p:cNvPr id="150" name="Straight Arrow Connector 84">
+            <a:extLst>
+              <a:ext uri="{FF2B5EF4-FFF2-40B4-BE49-F238E27FC236}">
+                <a16:creationId xmlns:a16="http://schemas.microsoft.com/office/drawing/2014/main" id="{8EE6CD65-4A97-4D54-AACF-085C859C2439}"/>
+              </a:ext>
+            </a:extLst>
+          </p:cNvPr>
+          <p:cNvCxnSpPr>
+            <a:cxnSpLocks/>
+          </p:cNvCxnSpPr>
+          <p:nvPr/>
+        </p:nvCxnSpPr>
+        <p:spPr>
+          <a:xfrm flipV="1">
+            <a:off x="11482355" y="5568968"/>
+            <a:ext cx="0" cy="836695"/>
+          </a:xfrm>
+          <a:prstGeom prst="straightConnector1">
+            <a:avLst/>
+          </a:prstGeom>
+          <a:ln w="57150">
+            <a:solidFill>
+              <a:schemeClr val="tx1"/>
+            </a:solidFill>
+            <a:prstDash val="sysDot"/>
+          </a:ln>
+        </p:spPr>
+        <p:style>
+          <a:lnRef idx="1">
+            <a:schemeClr val="accent1"/>
+          </a:lnRef>
+          <a:fillRef idx="0">
+            <a:schemeClr val="accent1"/>
+          </a:fillRef>
+          <a:effectRef idx="0">
+            <a:schemeClr val="accent1"/>
+          </a:effectRef>
+          <a:fontRef idx="minor">
+            <a:schemeClr val="tx1"/>
+          </a:fontRef>
+        </p:style>
+      </p:cxnSp>
+      <p:cxnSp>
+        <p:nvCxnSpPr>
+          <p:cNvPr id="154" name="Straight Arrow Connector 84">
+            <a:extLst>
+              <a:ext uri="{FF2B5EF4-FFF2-40B4-BE49-F238E27FC236}">
+                <a16:creationId xmlns:a16="http://schemas.microsoft.com/office/drawing/2014/main" id="{4D83C761-FB00-4A6E-8262-910F8E86B3EE}"/>
+              </a:ext>
+            </a:extLst>
+          </p:cNvPr>
+          <p:cNvCxnSpPr>
+            <a:cxnSpLocks/>
+          </p:cNvCxnSpPr>
+          <p:nvPr/>
+        </p:nvCxnSpPr>
+        <p:spPr>
+          <a:xfrm flipV="1">
+            <a:off x="9991557" y="5568968"/>
+            <a:ext cx="0" cy="836695"/>
+          </a:xfrm>
+          <a:prstGeom prst="straightConnector1">
+            <a:avLst/>
+          </a:prstGeom>
+          <a:ln w="57150">
+            <a:solidFill>
+              <a:schemeClr val="tx1"/>
+            </a:solidFill>
+            <a:prstDash val="sysDot"/>
+          </a:ln>
+        </p:spPr>
+        <p:style>
+          <a:lnRef idx="1">
+            <a:schemeClr val="accent1"/>
+          </a:lnRef>
+          <a:fillRef idx="0">
+            <a:schemeClr val="accent1"/>
+          </a:fillRef>
+          <a:effectRef idx="0">
+            <a:schemeClr val="accent1"/>
+          </a:effectRef>
+          <a:fontRef idx="minor">
+            <a:schemeClr val="tx1"/>
+          </a:fontRef>
+        </p:style>
+      </p:cxnSp>
+      <p:cxnSp>
+        <p:nvCxnSpPr>
+          <p:cNvPr id="161" name="Straight Arrow Connector 84">
+            <a:extLst>
+              <a:ext uri="{FF2B5EF4-FFF2-40B4-BE49-F238E27FC236}">
+                <a16:creationId xmlns:a16="http://schemas.microsoft.com/office/drawing/2014/main" id="{913D2535-F159-4AF1-9072-7F01EB8EC72E}"/>
+              </a:ext>
+            </a:extLst>
+          </p:cNvPr>
+          <p:cNvCxnSpPr>
+            <a:cxnSpLocks/>
+          </p:cNvCxnSpPr>
+          <p:nvPr/>
+        </p:nvCxnSpPr>
+        <p:spPr>
+          <a:xfrm flipV="1">
+            <a:off x="2865763" y="6185189"/>
+            <a:ext cx="0" cy="238850"/>
+          </a:xfrm>
+          <a:prstGeom prst="straightConnector1">
+            <a:avLst/>
+          </a:prstGeom>
+          <a:ln w="57150">
+            <a:solidFill>
+              <a:schemeClr val="tx1"/>
+            </a:solidFill>
+            <a:prstDash val="sysDot"/>
+          </a:ln>
+        </p:spPr>
+        <p:style>
+          <a:lnRef idx="1">
+            <a:schemeClr val="accent1"/>
+          </a:lnRef>
+          <a:fillRef idx="0">
+            <a:schemeClr val="accent1"/>
+          </a:fillRef>
+          <a:effectRef idx="0">
+            <a:schemeClr val="accent1"/>
+          </a:effectRef>
+          <a:fontRef idx="minor">
+            <a:schemeClr val="tx1"/>
+          </a:fontRef>
+        </p:style>
+      </p:cxnSp>
+      <p:cxnSp>
+        <p:nvCxnSpPr>
+          <p:cNvPr id="163" name="Straight Arrow Connector 44">
+            <a:extLst>
+              <a:ext uri="{FF2B5EF4-FFF2-40B4-BE49-F238E27FC236}">
+                <a16:creationId xmlns:a16="http://schemas.microsoft.com/office/drawing/2014/main" id="{0A8E0351-6B21-4720-A657-15E915300647}"/>
+              </a:ext>
+            </a:extLst>
+          </p:cNvPr>
+          <p:cNvCxnSpPr>
+            <a:cxnSpLocks/>
+          </p:cNvCxnSpPr>
+          <p:nvPr/>
+        </p:nvCxnSpPr>
+        <p:spPr>
+          <a:xfrm>
+            <a:off x="4181048" y="6388026"/>
+            <a:ext cx="1151591" cy="0"/>
+          </a:xfrm>
+          <a:prstGeom prst="straightConnector1">
+            <a:avLst/>
+          </a:prstGeom>
+          <a:ln w="57150">
+            <a:solidFill>
+              <a:schemeClr val="tx1"/>
+            </a:solidFill>
+            <a:prstDash val="sysDot"/>
+          </a:ln>
+        </p:spPr>
+        <p:style>
+          <a:lnRef idx="1">
+            <a:schemeClr val="accent1"/>
+          </a:lnRef>
+          <a:fillRef idx="0">
+            <a:schemeClr val="accent1"/>
+          </a:fillRef>
+          <a:effectRef idx="0">
+            <a:schemeClr val="accent1"/>
+          </a:effectRef>
+          <a:fontRef idx="minor">
+            <a:schemeClr val="tx1"/>
+          </a:fontRef>
+        </p:style>
+      </p:cxnSp>
+      <p:pic>
+        <p:nvPicPr>
+          <p:cNvPr id="172" name="Picture 41" descr="A picture containing shape&#10;&#10;Description automatically generated">
+            <a:extLst>
+              <a:ext uri="{FF2B5EF4-FFF2-40B4-BE49-F238E27FC236}">
+                <a16:creationId xmlns:a16="http://schemas.microsoft.com/office/drawing/2014/main" id="{630207AE-374D-4004-B824-8D52DDD97821}"/>
+              </a:ext>
+            </a:extLst>
+          </p:cNvPr>
+          <p:cNvPicPr>
+            <a:picLocks noChangeAspect="1"/>
+          </p:cNvPicPr>
+          <p:nvPr/>
+        </p:nvPicPr>
+        <p:blipFill>
+          <a:blip r:embed="rId8"/>
+          <a:stretch>
+            <a:fillRect/>
+          </a:stretch>
+        </p:blipFill>
+        <p:spPr>
+          <a:xfrm>
+            <a:off x="3726770" y="6185189"/>
+            <a:ext cx="340435" cy="326349"/>
+          </a:xfrm>
+          <a:prstGeom prst="rect">
+            <a:avLst/>
+          </a:prstGeom>
+        </p:spPr>
+      </p:pic>
+      <p:pic>
+        <p:nvPicPr>
+          <p:cNvPr id="174" name="Picture 42" descr="A picture containing shape&#10;&#10;Description automatically generated">
+            <a:extLst>
+              <a:ext uri="{FF2B5EF4-FFF2-40B4-BE49-F238E27FC236}">
+                <a16:creationId xmlns:a16="http://schemas.microsoft.com/office/drawing/2014/main" id="{A53EE9E3-9E6E-49A0-A796-C8F7BE325139}"/>
+              </a:ext>
+            </a:extLst>
+          </p:cNvPr>
+          <p:cNvPicPr>
+            <a:picLocks noChangeAspect="1"/>
+          </p:cNvPicPr>
+          <p:nvPr/>
+        </p:nvPicPr>
+        <p:blipFill>
+          <a:blip r:embed="rId9"/>
+          <a:stretch>
+            <a:fillRect/>
+          </a:stretch>
+        </p:blipFill>
+        <p:spPr>
+          <a:xfrm>
+            <a:off x="3338128" y="6185189"/>
+            <a:ext cx="317335" cy="326349"/>
+          </a:xfrm>
+          <a:prstGeom prst="rect">
+            <a:avLst/>
+          </a:prstGeom>
+        </p:spPr>
+      </p:pic>
+      <p:cxnSp>
+        <p:nvCxnSpPr>
+          <p:cNvPr id="178" name="Straight Arrow Connector 44">
+            <a:extLst>
+              <a:ext uri="{FF2B5EF4-FFF2-40B4-BE49-F238E27FC236}">
+                <a16:creationId xmlns:a16="http://schemas.microsoft.com/office/drawing/2014/main" id="{1CE7FF56-EAE9-492E-AB09-7B565A9BDB17}"/>
+              </a:ext>
+            </a:extLst>
+          </p:cNvPr>
+          <p:cNvCxnSpPr>
+            <a:cxnSpLocks/>
+          </p:cNvCxnSpPr>
+          <p:nvPr/>
+        </p:nvCxnSpPr>
+        <p:spPr>
+          <a:xfrm>
+            <a:off x="2834395" y="6399177"/>
+            <a:ext cx="390664" cy="0"/>
+          </a:xfrm>
+          <a:prstGeom prst="straightConnector1">
+            <a:avLst/>
+          </a:prstGeom>
+          <a:ln w="57150">
+            <a:solidFill>
+              <a:schemeClr val="tx1"/>
+            </a:solidFill>
+            <a:prstDash val="sysDot"/>
+          </a:ln>
+        </p:spPr>
+        <p:style>
+          <a:lnRef idx="1">
+            <a:schemeClr val="accent1"/>
+          </a:lnRef>
+          <a:fillRef idx="0">
+            <a:schemeClr val="accent1"/>
+          </a:fillRef>
+          <a:effectRef idx="0">
+            <a:schemeClr val="accent1"/>
+          </a:effectRef>
+          <a:fontRef idx="minor">
+            <a:schemeClr val="tx1"/>
+          </a:fontRef>
+        </p:style>
+      </p:cxnSp>
+      <p:sp>
+        <p:nvSpPr>
+          <p:cNvPr id="210" name="Elipse 209">
+            <a:extLst>
+              <a:ext uri="{FF2B5EF4-FFF2-40B4-BE49-F238E27FC236}">
+                <a16:creationId xmlns:a16="http://schemas.microsoft.com/office/drawing/2014/main" id="{F6F3C5C9-AA7B-4B72-88A5-217E86CEB7BC}"/>
+              </a:ext>
+            </a:extLst>
+          </p:cNvPr>
+          <p:cNvSpPr/>
+          <p:nvPr/>
+        </p:nvSpPr>
+        <p:spPr>
+          <a:xfrm>
+            <a:off x="8149978" y="1310259"/>
+            <a:ext cx="1693535" cy="1690695"/>
+          </a:xfrm>
+          <a:prstGeom prst="ellipse">
+            <a:avLst/>
+          </a:prstGeom>
+          <a:noFill/>
+          <a:ln w="38100">
+            <a:solidFill>
+              <a:schemeClr val="tx1"/>
+            </a:solidFill>
+            <a:prstDash val="solid"/>
+          </a:ln>
+        </p:spPr>
+        <p:style>
+          <a:lnRef idx="2">
+            <a:schemeClr val="accent1">
+              <a:shade val="50000"/>
+            </a:schemeClr>
+          </a:lnRef>
+          <a:fillRef idx="1">
+            <a:schemeClr val="accent1"/>
+          </a:fillRef>
+          <a:effectRef idx="0">
+            <a:schemeClr val="accent1"/>
+          </a:effectRef>
+          <a:fontRef idx="minor">
+            <a:schemeClr val="lt1"/>
+          </a:fontRef>
+        </p:style>
+        <p:txBody>
+          <a:bodyPr rtlCol="0" anchor="ctr"/>
+          <a:lstStyle/>
+          <a:p>
+            <a:pPr algn="ctr"/>
+            <a:endParaRPr lang="pt-BR" dirty="0"/>
+          </a:p>
+        </p:txBody>
+      </p:sp>
+      <p:pic>
+        <p:nvPicPr>
+          <p:cNvPr id="10" name="Imagem 9" descr="Ícone&#10;&#10;Descrição gerada automaticamente">
+            <a:extLst>
+              <a:ext uri="{FF2B5EF4-FFF2-40B4-BE49-F238E27FC236}">
+                <a16:creationId xmlns:a16="http://schemas.microsoft.com/office/drawing/2014/main" id="{98AF867B-20A2-4072-9EB7-A20580105100}"/>
+              </a:ext>
+            </a:extLst>
+          </p:cNvPr>
+          <p:cNvPicPr>
+            <a:picLocks noChangeAspect="1"/>
+          </p:cNvPicPr>
+          <p:nvPr/>
+        </p:nvPicPr>
+        <p:blipFill>
+          <a:blip r:embed="rId24">
+            <a:extLst>
+              <a:ext uri="{28A0092B-C50C-407E-A947-70E740481C1C}">
+                <a14:useLocalDpi xmlns:a14="http://schemas.microsoft.com/office/drawing/2010/main" val="0"/>
+              </a:ext>
+            </a:extLst>
+          </a:blip>
+          <a:stretch>
+            <a:fillRect/>
+          </a:stretch>
+        </p:blipFill>
+        <p:spPr>
+          <a:xfrm>
+            <a:off x="6151214" y="2194683"/>
+            <a:ext cx="1372427" cy="514660"/>
+          </a:xfrm>
+          <a:prstGeom prst="rect">
+            <a:avLst/>
+          </a:prstGeom>
+        </p:spPr>
+      </p:pic>
+      <p:pic>
+        <p:nvPicPr>
+          <p:cNvPr id="14" name="Imagem 13">
+            <a:extLst>
+              <a:ext uri="{FF2B5EF4-FFF2-40B4-BE49-F238E27FC236}">
+                <a16:creationId xmlns:a16="http://schemas.microsoft.com/office/drawing/2014/main" id="{34D2E6EE-C392-4AD0-A5C3-D53C4ADD2599}"/>
+              </a:ext>
+            </a:extLst>
+          </p:cNvPr>
+          <p:cNvPicPr>
+            <a:picLocks noChangeAspect="1"/>
+          </p:cNvPicPr>
+          <p:nvPr/>
+        </p:nvPicPr>
+        <p:blipFill>
+          <a:blip r:embed="rId25">
+            <a:extLst>
+              <a:ext uri="{28A0092B-C50C-407E-A947-70E740481C1C}">
+                <a14:useLocalDpi xmlns:a14="http://schemas.microsoft.com/office/drawing/2010/main" val="0"/>
+              </a:ext>
+            </a:extLst>
+          </a:blip>
+          <a:stretch>
+            <a:fillRect/>
+          </a:stretch>
+        </p:blipFill>
+        <p:spPr>
+          <a:xfrm>
+            <a:off x="3890614" y="3848882"/>
+            <a:ext cx="1163145" cy="1163145"/>
+          </a:xfrm>
+          <a:prstGeom prst="rect">
+            <a:avLst/>
+          </a:prstGeom>
+        </p:spPr>
+      </p:pic>
+      <p:pic>
+        <p:nvPicPr>
+          <p:cNvPr id="80" name="Imagem 79" descr="Ícone&#10;&#10;Descrição gerada automaticamente">
+            <a:extLst>
+              <a:ext uri="{FF2B5EF4-FFF2-40B4-BE49-F238E27FC236}">
+                <a16:creationId xmlns:a16="http://schemas.microsoft.com/office/drawing/2014/main" id="{91C4E5E6-3353-401F-9E5C-A2873F6E08E2}"/>
+              </a:ext>
+            </a:extLst>
+          </p:cNvPr>
+          <p:cNvPicPr>
+            <a:picLocks noChangeAspect="1"/>
+          </p:cNvPicPr>
+          <p:nvPr/>
+        </p:nvPicPr>
+        <p:blipFill>
+          <a:blip r:embed="rId24">
+            <a:extLst>
+              <a:ext uri="{28A0092B-C50C-407E-A947-70E740481C1C}">
+                <a14:useLocalDpi xmlns:a14="http://schemas.microsoft.com/office/drawing/2010/main" val="0"/>
+              </a:ext>
+            </a:extLst>
+          </a:blip>
+          <a:stretch>
+            <a:fillRect/>
+          </a:stretch>
+        </p:blipFill>
+        <p:spPr>
+          <a:xfrm>
+            <a:off x="3913339" y="4175659"/>
+            <a:ext cx="1188902" cy="445838"/>
+          </a:xfrm>
+          <a:prstGeom prst="rect">
+            <a:avLst/>
+          </a:prstGeom>
+        </p:spPr>
+      </p:pic>
+      <p:pic>
+        <p:nvPicPr>
+          <p:cNvPr id="38" name="Imagem 37">
+            <a:extLst>
+              <a:ext uri="{FF2B5EF4-FFF2-40B4-BE49-F238E27FC236}">
+                <a16:creationId xmlns:a16="http://schemas.microsoft.com/office/drawing/2014/main" id="{5772E4D5-1405-4914-BDA4-FD2AFBF606EA}"/>
+              </a:ext>
+            </a:extLst>
+          </p:cNvPr>
+          <p:cNvPicPr>
+            <a:picLocks noChangeAspect="1"/>
+          </p:cNvPicPr>
+          <p:nvPr/>
+        </p:nvPicPr>
+        <p:blipFill>
+          <a:blip r:embed="rId26">
+            <a:extLst>
+              <a:ext uri="{28A0092B-C50C-407E-A947-70E740481C1C}">
+                <a14:useLocalDpi xmlns:a14="http://schemas.microsoft.com/office/drawing/2010/main" val="0"/>
+              </a:ext>
+            </a:extLst>
+          </a:blip>
+          <a:stretch>
+            <a:fillRect/>
+          </a:stretch>
+        </p:blipFill>
+        <p:spPr>
+          <a:xfrm>
+            <a:off x="3428237" y="4452713"/>
+            <a:ext cx="534717" cy="256664"/>
+          </a:xfrm>
+          <a:prstGeom prst="rect">
+            <a:avLst/>
+          </a:prstGeom>
+        </p:spPr>
+      </p:pic>
+      <p:cxnSp>
+        <p:nvCxnSpPr>
+          <p:cNvPr id="40" name="Conector reto 39">
+            <a:extLst>
+              <a:ext uri="{FF2B5EF4-FFF2-40B4-BE49-F238E27FC236}">
+                <a16:creationId xmlns:a16="http://schemas.microsoft.com/office/drawing/2014/main" id="{4B4865A6-9A3D-4FC5-AFCF-D8260A00A55B}"/>
+              </a:ext>
+            </a:extLst>
+          </p:cNvPr>
+          <p:cNvCxnSpPr>
+            <a:cxnSpLocks/>
+          </p:cNvCxnSpPr>
+          <p:nvPr/>
+        </p:nvCxnSpPr>
+        <p:spPr>
+          <a:xfrm>
+            <a:off x="3100237" y="3931113"/>
+            <a:ext cx="196" cy="664983"/>
+          </a:xfrm>
+          <a:prstGeom prst="line">
+            <a:avLst/>
+          </a:prstGeom>
+          <a:ln w="38100"/>
+        </p:spPr>
+        <p:style>
+          <a:lnRef idx="1">
+            <a:schemeClr val="dk1"/>
+          </a:lnRef>
+          <a:fillRef idx="0">
+            <a:schemeClr val="dk1"/>
+          </a:fillRef>
+          <a:effectRef idx="0">
+            <a:schemeClr val="dk1"/>
+          </a:effectRef>
+          <a:fontRef idx="minor">
+            <a:schemeClr val="tx1"/>
+          </a:fontRef>
+        </p:style>
+      </p:cxnSp>
+      <p:cxnSp>
+        <p:nvCxnSpPr>
+          <p:cNvPr id="84" name="Conector reto 83">
+            <a:extLst>
+              <a:ext uri="{FF2B5EF4-FFF2-40B4-BE49-F238E27FC236}">
+                <a16:creationId xmlns:a16="http://schemas.microsoft.com/office/drawing/2014/main" id="{4F104B22-7E88-46F2-AE0B-5C559268A04F}"/>
+              </a:ext>
+            </a:extLst>
+          </p:cNvPr>
+          <p:cNvCxnSpPr>
+            <a:cxnSpLocks/>
+          </p:cNvCxnSpPr>
+          <p:nvPr/>
+        </p:nvCxnSpPr>
+        <p:spPr>
+          <a:xfrm flipH="1">
+            <a:off x="3102015" y="4581045"/>
+            <a:ext cx="362124" cy="0"/>
+          </a:xfrm>
+          <a:prstGeom prst="line">
+            <a:avLst/>
+          </a:prstGeom>
+          <a:ln w="38100"/>
+        </p:spPr>
+        <p:style>
+          <a:lnRef idx="1">
+            <a:schemeClr val="dk1"/>
+          </a:lnRef>
+          <a:fillRef idx="0">
+            <a:schemeClr val="dk1"/>
+          </a:fillRef>
+          <a:effectRef idx="0">
+            <a:schemeClr val="dk1"/>
+          </a:effectRef>
+          <a:fontRef idx="minor">
+            <a:schemeClr val="tx1"/>
+          </a:fontRef>
+        </p:style>
+      </p:cxnSp>
+      <p:cxnSp>
+        <p:nvCxnSpPr>
+          <p:cNvPr id="107" name="Conector reto 106">
+            <a:extLst>
+              <a:ext uri="{FF2B5EF4-FFF2-40B4-BE49-F238E27FC236}">
+                <a16:creationId xmlns:a16="http://schemas.microsoft.com/office/drawing/2014/main" id="{95FBE718-CA1C-452B-B289-21E7D9E76998}"/>
+              </a:ext>
+            </a:extLst>
+          </p:cNvPr>
+          <p:cNvCxnSpPr>
+            <a:cxnSpLocks/>
+          </p:cNvCxnSpPr>
+          <p:nvPr/>
+        </p:nvCxnSpPr>
+        <p:spPr>
+          <a:xfrm flipH="1">
+            <a:off x="3542038" y="3622646"/>
+            <a:ext cx="429325" cy="0"/>
+          </a:xfrm>
+          <a:prstGeom prst="line">
+            <a:avLst/>
+          </a:prstGeom>
+          <a:ln w="38100"/>
+        </p:spPr>
+        <p:style>
+          <a:lnRef idx="1">
+            <a:schemeClr val="dk1"/>
+          </a:lnRef>
+          <a:fillRef idx="0">
+            <a:schemeClr val="dk1"/>
+          </a:fillRef>
+          <a:effectRef idx="0">
+            <a:schemeClr val="dk1"/>
+          </a:effectRef>
+          <a:fontRef idx="minor">
+            <a:schemeClr val="tx1"/>
+          </a:fontRef>
+        </p:style>
+      </p:cxnSp>
+      <p:sp>
+        <p:nvSpPr>
+          <p:cNvPr id="88" name="Fluxograma: Conector 87">
+            <a:extLst>
+              <a:ext uri="{FF2B5EF4-FFF2-40B4-BE49-F238E27FC236}">
+                <a16:creationId xmlns:a16="http://schemas.microsoft.com/office/drawing/2014/main" id="{D62C2533-0703-4DD6-B29E-88662FBE62B7}"/>
+              </a:ext>
+            </a:extLst>
+          </p:cNvPr>
+          <p:cNvSpPr/>
+          <p:nvPr/>
+        </p:nvSpPr>
+        <p:spPr>
+          <a:xfrm>
+            <a:off x="3975888" y="3567878"/>
+            <a:ext cx="103486" cy="103486"/>
+          </a:xfrm>
+          <a:prstGeom prst="flowChartConnector">
+            <a:avLst/>
+          </a:prstGeom>
+          <a:solidFill>
+            <a:schemeClr val="tx1"/>
+          </a:solidFill>
+          <a:ln>
+            <a:noFill/>
+          </a:ln>
+        </p:spPr>
+        <p:style>
+          <a:lnRef idx="2">
+            <a:schemeClr val="accent1">
+              <a:shade val="50000"/>
+            </a:schemeClr>
+          </a:lnRef>
+          <a:fillRef idx="1">
+            <a:schemeClr val="accent1"/>
+          </a:fillRef>
+          <a:effectRef idx="0">
+            <a:schemeClr val="accent1"/>
+          </a:effectRef>
+          <a:fontRef idx="minor">
+            <a:schemeClr val="lt1"/>
+          </a:fontRef>
+        </p:style>
+        <p:txBody>
+          <a:bodyPr rtlCol="0" anchor="ctr"/>
+          <a:lstStyle/>
+          <a:p>
+            <a:pPr algn="ctr"/>
+            <a:endParaRPr lang="pt-BR" dirty="0"/>
           </a:p>
         </p:txBody>
       </p:sp>
     </p:spTree>
     <p:extLst>
       <p:ext uri="{BB962C8B-B14F-4D97-AF65-F5344CB8AC3E}">
-        <p14:creationId xmlns:p14="http://schemas.microsoft.com/office/powerpoint/2010/main" val="1295834335"/>
+        <p14:creationId xmlns:p14="http://schemas.microsoft.com/office/powerpoint/2010/main" val="893602430"/>
       </p:ext>
     </p:extLst>
   </p:cSld>

</xml_diff>

<commit_message>
att do power point final
</commit_message>
<xml_diff>
--- a/documentacao/Slide de apresentação sprint 3.pptx
+++ b/documentacao/Slide de apresentação sprint 3.pptx
@@ -9,15 +9,17 @@
     <p:sldId id="258" r:id="rId3"/>
     <p:sldId id="273" r:id="rId4"/>
     <p:sldId id="274" r:id="rId5"/>
-    <p:sldId id="275" r:id="rId6"/>
-    <p:sldId id="264" r:id="rId7"/>
-    <p:sldId id="277" r:id="rId8"/>
-    <p:sldId id="278" r:id="rId9"/>
-    <p:sldId id="281" r:id="rId10"/>
-    <p:sldId id="282" r:id="rId11"/>
-    <p:sldId id="279" r:id="rId12"/>
-    <p:sldId id="280" r:id="rId13"/>
-    <p:sldId id="272" r:id="rId14"/>
+    <p:sldId id="284" r:id="rId6"/>
+    <p:sldId id="275" r:id="rId7"/>
+    <p:sldId id="264" r:id="rId8"/>
+    <p:sldId id="277" r:id="rId9"/>
+    <p:sldId id="278" r:id="rId10"/>
+    <p:sldId id="281" r:id="rId11"/>
+    <p:sldId id="282" r:id="rId12"/>
+    <p:sldId id="279" r:id="rId13"/>
+    <p:sldId id="280" r:id="rId14"/>
+    <p:sldId id="283" r:id="rId15"/>
+    <p:sldId id="272" r:id="rId16"/>
   </p:sldIdLst>
   <p:sldSz cx="12192000" cy="6858000"/>
   <p:notesSz cx="6858000" cy="9144000"/>
@@ -271,7 +273,7 @@
           <a:p>
             <a:fld id="{96453F18-3A00-43D2-805F-3C2E3B4A04D2}" type="datetimeFigureOut">
               <a:rPr lang="pt-BR" smtClean="0"/>
-              <a:t>09/12/2020</a:t>
+              <a:t>10/12/2020</a:t>
             </a:fld>
             <a:endParaRPr lang="pt-BR"/>
           </a:p>
@@ -469,7 +471,7 @@
           <a:p>
             <a:fld id="{96453F18-3A00-43D2-805F-3C2E3B4A04D2}" type="datetimeFigureOut">
               <a:rPr lang="pt-BR" smtClean="0"/>
-              <a:t>09/12/2020</a:t>
+              <a:t>10/12/2020</a:t>
             </a:fld>
             <a:endParaRPr lang="pt-BR"/>
           </a:p>
@@ -677,7 +679,7 @@
           <a:p>
             <a:fld id="{96453F18-3A00-43D2-805F-3C2E3B4A04D2}" type="datetimeFigureOut">
               <a:rPr lang="pt-BR" smtClean="0"/>
-              <a:t>09/12/2020</a:t>
+              <a:t>10/12/2020</a:t>
             </a:fld>
             <a:endParaRPr lang="pt-BR"/>
           </a:p>
@@ -875,7 +877,7 @@
           <a:p>
             <a:fld id="{96453F18-3A00-43D2-805F-3C2E3B4A04D2}" type="datetimeFigureOut">
               <a:rPr lang="pt-BR" smtClean="0"/>
-              <a:t>09/12/2020</a:t>
+              <a:t>10/12/2020</a:t>
             </a:fld>
             <a:endParaRPr lang="pt-BR"/>
           </a:p>
@@ -1150,7 +1152,7 @@
           <a:p>
             <a:fld id="{96453F18-3A00-43D2-805F-3C2E3B4A04D2}" type="datetimeFigureOut">
               <a:rPr lang="pt-BR" smtClean="0"/>
-              <a:t>09/12/2020</a:t>
+              <a:t>10/12/2020</a:t>
             </a:fld>
             <a:endParaRPr lang="pt-BR"/>
           </a:p>
@@ -1415,7 +1417,7 @@
           <a:p>
             <a:fld id="{96453F18-3A00-43D2-805F-3C2E3B4A04D2}" type="datetimeFigureOut">
               <a:rPr lang="pt-BR" smtClean="0"/>
-              <a:t>09/12/2020</a:t>
+              <a:t>10/12/2020</a:t>
             </a:fld>
             <a:endParaRPr lang="pt-BR"/>
           </a:p>
@@ -1827,7 +1829,7 @@
           <a:p>
             <a:fld id="{96453F18-3A00-43D2-805F-3C2E3B4A04D2}" type="datetimeFigureOut">
               <a:rPr lang="pt-BR" smtClean="0"/>
-              <a:t>09/12/2020</a:t>
+              <a:t>10/12/2020</a:t>
             </a:fld>
             <a:endParaRPr lang="pt-BR"/>
           </a:p>
@@ -1968,7 +1970,7 @@
           <a:p>
             <a:fld id="{96453F18-3A00-43D2-805F-3C2E3B4A04D2}" type="datetimeFigureOut">
               <a:rPr lang="pt-BR" smtClean="0"/>
-              <a:t>09/12/2020</a:t>
+              <a:t>10/12/2020</a:t>
             </a:fld>
             <a:endParaRPr lang="pt-BR"/>
           </a:p>
@@ -2081,7 +2083,7 @@
           <a:p>
             <a:fld id="{96453F18-3A00-43D2-805F-3C2E3B4A04D2}" type="datetimeFigureOut">
               <a:rPr lang="pt-BR" smtClean="0"/>
-              <a:t>09/12/2020</a:t>
+              <a:t>10/12/2020</a:t>
             </a:fld>
             <a:endParaRPr lang="pt-BR"/>
           </a:p>
@@ -2392,7 +2394,7 @@
           <a:p>
             <a:fld id="{96453F18-3A00-43D2-805F-3C2E3B4A04D2}" type="datetimeFigureOut">
               <a:rPr lang="pt-BR" smtClean="0"/>
-              <a:t>09/12/2020</a:t>
+              <a:t>10/12/2020</a:t>
             </a:fld>
             <a:endParaRPr lang="pt-BR"/>
           </a:p>
@@ -2680,7 +2682,7 @@
           <a:p>
             <a:fld id="{96453F18-3A00-43D2-805F-3C2E3B4A04D2}" type="datetimeFigureOut">
               <a:rPr lang="pt-BR" smtClean="0"/>
-              <a:t>09/12/2020</a:t>
+              <a:t>10/12/2020</a:t>
             </a:fld>
             <a:endParaRPr lang="pt-BR"/>
           </a:p>
@@ -2921,7 +2923,7 @@
           <a:p>
             <a:fld id="{96453F18-3A00-43D2-805F-3C2E3B4A04D2}" type="datetimeFigureOut">
               <a:rPr lang="pt-BR" smtClean="0"/>
-              <a:t>09/12/2020</a:t>
+              <a:t>10/12/2020</a:t>
             </a:fld>
             <a:endParaRPr lang="pt-BR"/>
           </a:p>
@@ -3465,8 +3467,8 @@
         </p:nvSpPr>
         <p:spPr>
           <a:xfrm>
-            <a:off x="1223487" y="150470"/>
-            <a:ext cx="9985287" cy="1061863"/>
+            <a:off x="2949048" y="486847"/>
+            <a:ext cx="6293903" cy="1530752"/>
           </a:xfrm>
           <a:prstGeom prst="rect">
             <a:avLst/>
@@ -3515,6 +3517,402 @@
           </a:p>
         </p:txBody>
       </p:sp>
+      <p:sp>
+        <p:nvSpPr>
+          <p:cNvPr id="4" name="Retângulo 3">
+            <a:extLst>
+              <a:ext uri="{FF2B5EF4-FFF2-40B4-BE49-F238E27FC236}">
+                <a16:creationId xmlns:a16="http://schemas.microsoft.com/office/drawing/2014/main" id="{04D1503A-EB65-44A0-A236-EB049C0F2FDA}"/>
+              </a:ext>
+            </a:extLst>
+          </p:cNvPr>
+          <p:cNvSpPr/>
+          <p:nvPr/>
+        </p:nvSpPr>
+        <p:spPr>
+          <a:xfrm>
+            <a:off x="2281650" y="2800350"/>
+            <a:ext cx="2473452" cy="628650"/>
+          </a:xfrm>
+          <a:prstGeom prst="rect">
+            <a:avLst/>
+          </a:prstGeom>
+          <a:solidFill>
+            <a:srgbClr val="FF0000"/>
+          </a:solidFill>
+          <a:ln>
+            <a:solidFill>
+              <a:srgbClr val="363636"/>
+            </a:solidFill>
+          </a:ln>
+        </p:spPr>
+        <p:style>
+          <a:lnRef idx="2">
+            <a:schemeClr val="accent1">
+              <a:shade val="50000"/>
+            </a:schemeClr>
+          </a:lnRef>
+          <a:fillRef idx="1">
+            <a:schemeClr val="accent1"/>
+          </a:fillRef>
+          <a:effectRef idx="0">
+            <a:schemeClr val="accent1"/>
+          </a:effectRef>
+          <a:fontRef idx="minor">
+            <a:schemeClr val="lt1"/>
+          </a:fontRef>
+        </p:style>
+        <p:txBody>
+          <a:bodyPr rtlCol="0" anchor="ctr"/>
+          <a:lstStyle/>
+          <a:p>
+            <a:pPr algn="ctr"/>
+            <a:r>
+              <a:rPr lang="pt-BR" sz="2400" b="1" dirty="0">
+                <a:solidFill>
+                  <a:schemeClr val="tx1"/>
+                </a:solidFill>
+              </a:rPr>
+              <a:t>Crítico</a:t>
+            </a:r>
+          </a:p>
+        </p:txBody>
+      </p:sp>
+      <p:sp>
+        <p:nvSpPr>
+          <p:cNvPr id="6" name="Retângulo 5">
+            <a:extLst>
+              <a:ext uri="{FF2B5EF4-FFF2-40B4-BE49-F238E27FC236}">
+                <a16:creationId xmlns:a16="http://schemas.microsoft.com/office/drawing/2014/main" id="{AC918E13-703C-45B4-9DD2-8A7F58A286EA}"/>
+              </a:ext>
+            </a:extLst>
+          </p:cNvPr>
+          <p:cNvSpPr/>
+          <p:nvPr/>
+        </p:nvSpPr>
+        <p:spPr>
+          <a:xfrm>
+            <a:off x="4755102" y="2800350"/>
+            <a:ext cx="2473452" cy="628650"/>
+          </a:xfrm>
+          <a:prstGeom prst="rect">
+            <a:avLst/>
+          </a:prstGeom>
+          <a:solidFill>
+            <a:srgbClr val="FFFF00"/>
+          </a:solidFill>
+          <a:ln>
+            <a:solidFill>
+              <a:srgbClr val="363636"/>
+            </a:solidFill>
+          </a:ln>
+        </p:spPr>
+        <p:style>
+          <a:lnRef idx="2">
+            <a:schemeClr val="accent1">
+              <a:shade val="50000"/>
+            </a:schemeClr>
+          </a:lnRef>
+          <a:fillRef idx="1">
+            <a:schemeClr val="accent1"/>
+          </a:fillRef>
+          <a:effectRef idx="0">
+            <a:schemeClr val="accent1"/>
+          </a:effectRef>
+          <a:fontRef idx="minor">
+            <a:schemeClr val="lt1"/>
+          </a:fontRef>
+        </p:style>
+        <p:txBody>
+          <a:bodyPr rtlCol="0" anchor="ctr"/>
+          <a:lstStyle/>
+          <a:p>
+            <a:pPr algn="ctr"/>
+            <a:r>
+              <a:rPr lang="pt-BR" sz="2400" b="1" dirty="0">
+                <a:solidFill>
+                  <a:schemeClr val="tx1"/>
+                </a:solidFill>
+              </a:rPr>
+              <a:t>Alerta</a:t>
+            </a:r>
+          </a:p>
+        </p:txBody>
+      </p:sp>
+      <p:sp>
+        <p:nvSpPr>
+          <p:cNvPr id="7" name="Retângulo 6">
+            <a:extLst>
+              <a:ext uri="{FF2B5EF4-FFF2-40B4-BE49-F238E27FC236}">
+                <a16:creationId xmlns:a16="http://schemas.microsoft.com/office/drawing/2014/main" id="{931C8D76-76CC-4B2F-97BF-3F2B3250FCC2}"/>
+              </a:ext>
+            </a:extLst>
+          </p:cNvPr>
+          <p:cNvSpPr/>
+          <p:nvPr/>
+        </p:nvSpPr>
+        <p:spPr>
+          <a:xfrm>
+            <a:off x="7228554" y="2800350"/>
+            <a:ext cx="2473452" cy="628650"/>
+          </a:xfrm>
+          <a:prstGeom prst="rect">
+            <a:avLst/>
+          </a:prstGeom>
+          <a:solidFill>
+            <a:srgbClr val="92D050"/>
+          </a:solidFill>
+          <a:ln>
+            <a:solidFill>
+              <a:srgbClr val="363636"/>
+            </a:solidFill>
+          </a:ln>
+        </p:spPr>
+        <p:style>
+          <a:lnRef idx="2">
+            <a:schemeClr val="accent1">
+              <a:shade val="50000"/>
+            </a:schemeClr>
+          </a:lnRef>
+          <a:fillRef idx="1">
+            <a:schemeClr val="accent1"/>
+          </a:fillRef>
+          <a:effectRef idx="0">
+            <a:schemeClr val="accent1"/>
+          </a:effectRef>
+          <a:fontRef idx="minor">
+            <a:schemeClr val="lt1"/>
+          </a:fontRef>
+        </p:style>
+        <p:txBody>
+          <a:bodyPr rtlCol="0" anchor="ctr"/>
+          <a:lstStyle/>
+          <a:p>
+            <a:pPr algn="ctr"/>
+            <a:r>
+              <a:rPr lang="pt-BR" sz="2400" b="1" dirty="0">
+                <a:solidFill>
+                  <a:schemeClr val="tx1"/>
+                </a:solidFill>
+              </a:rPr>
+              <a:t>Ideal</a:t>
+            </a:r>
+          </a:p>
+        </p:txBody>
+      </p:sp>
+      <p:sp>
+        <p:nvSpPr>
+          <p:cNvPr id="8" name="CaixaDeTexto 7">
+            <a:extLst>
+              <a:ext uri="{FF2B5EF4-FFF2-40B4-BE49-F238E27FC236}">
+                <a16:creationId xmlns:a16="http://schemas.microsoft.com/office/drawing/2014/main" id="{6B74AEB9-051D-4614-9B92-172E0A2A2A10}"/>
+              </a:ext>
+            </a:extLst>
+          </p:cNvPr>
+          <p:cNvSpPr txBox="1"/>
+          <p:nvPr/>
+        </p:nvSpPr>
+        <p:spPr>
+          <a:xfrm>
+            <a:off x="2281650" y="3429000"/>
+            <a:ext cx="2473452" cy="1569660"/>
+          </a:xfrm>
+          <a:prstGeom prst="rect">
+            <a:avLst/>
+          </a:prstGeom>
+          <a:noFill/>
+        </p:spPr>
+        <p:txBody>
+          <a:bodyPr wrap="square" rtlCol="0">
+            <a:spAutoFit/>
+          </a:bodyPr>
+          <a:lstStyle/>
+          <a:p>
+            <a:pPr marL="285750" indent="-285750">
+              <a:buFont typeface="Arial" panose="020B0604020202020204" pitchFamily="34" charset="0"/>
+              <a:buChar char="•"/>
+            </a:pPr>
+            <a:r>
+              <a:rPr lang="pt-BR" sz="1600" dirty="0"/>
+              <a:t>Armazenamento de órgão em risco com perda acelerada da capacidade isotérmica da caixa (temperaturas como 1,5ºC ou 7,4ºC)</a:t>
+            </a:r>
+          </a:p>
+        </p:txBody>
+      </p:sp>
+      <p:sp>
+        <p:nvSpPr>
+          <p:cNvPr id="9" name="CaixaDeTexto 8">
+            <a:extLst>
+              <a:ext uri="{FF2B5EF4-FFF2-40B4-BE49-F238E27FC236}">
+                <a16:creationId xmlns:a16="http://schemas.microsoft.com/office/drawing/2014/main" id="{FFC10006-4CEA-4F64-AB76-27F35ADDFB7D}"/>
+              </a:ext>
+            </a:extLst>
+          </p:cNvPr>
+          <p:cNvSpPr txBox="1"/>
+          <p:nvPr/>
+        </p:nvSpPr>
+        <p:spPr>
+          <a:xfrm>
+            <a:off x="4755102" y="3409890"/>
+            <a:ext cx="2473452" cy="1815882"/>
+          </a:xfrm>
+          <a:prstGeom prst="rect">
+            <a:avLst/>
+          </a:prstGeom>
+          <a:noFill/>
+        </p:spPr>
+        <p:txBody>
+          <a:bodyPr wrap="square" rtlCol="0">
+            <a:spAutoFit/>
+          </a:bodyPr>
+          <a:lstStyle/>
+          <a:p>
+            <a:pPr marL="285750" indent="-285750">
+              <a:buFont typeface="Arial" panose="020B0604020202020204" pitchFamily="34" charset="0"/>
+              <a:buChar char="•"/>
+            </a:pPr>
+            <a:r>
+              <a:rPr lang="pt-BR" sz="1600" dirty="0"/>
+              <a:t>Armazenamento de órgão em fase de atenção com risco de perda da capacidade isotérmica da caixa (temperaturas como 2,2ºC ou 5,6ºC)</a:t>
+            </a:r>
+          </a:p>
+        </p:txBody>
+      </p:sp>
+      <p:sp>
+        <p:nvSpPr>
+          <p:cNvPr id="10" name="CaixaDeTexto 9">
+            <a:extLst>
+              <a:ext uri="{FF2B5EF4-FFF2-40B4-BE49-F238E27FC236}">
+                <a16:creationId xmlns:a16="http://schemas.microsoft.com/office/drawing/2014/main" id="{43855983-95F8-48D4-852E-AC556D09EDF2}"/>
+              </a:ext>
+            </a:extLst>
+          </p:cNvPr>
+          <p:cNvSpPr txBox="1"/>
+          <p:nvPr/>
+        </p:nvSpPr>
+        <p:spPr>
+          <a:xfrm>
+            <a:off x="7228554" y="3409889"/>
+            <a:ext cx="2473452" cy="1569660"/>
+          </a:xfrm>
+          <a:prstGeom prst="rect">
+            <a:avLst/>
+          </a:prstGeom>
+          <a:noFill/>
+        </p:spPr>
+        <p:txBody>
+          <a:bodyPr wrap="square" rtlCol="0">
+            <a:spAutoFit/>
+          </a:bodyPr>
+          <a:lstStyle/>
+          <a:p>
+            <a:pPr marL="285750" indent="-285750">
+              <a:buFont typeface="Arial" panose="020B0604020202020204" pitchFamily="34" charset="0"/>
+              <a:buChar char="•"/>
+            </a:pPr>
+            <a:r>
+              <a:rPr lang="pt-BR" sz="1600" dirty="0"/>
+              <a:t>Armazenamento de órgão em fase ideal, sem risco de perda da capacidade isotérmica da caixa, mantendo-se entre 3,5ºC e 4ºC</a:t>
+            </a:r>
+          </a:p>
+        </p:txBody>
+      </p:sp>
+    </p:spTree>
+    <p:extLst>
+      <p:ext uri="{BB962C8B-B14F-4D97-AF65-F5344CB8AC3E}">
+        <p14:creationId xmlns:p14="http://schemas.microsoft.com/office/powerpoint/2010/main" val="3144355391"/>
+      </p:ext>
+    </p:extLst>
+  </p:cSld>
+  <p:clrMapOvr>
+    <a:masterClrMapping/>
+  </p:clrMapOvr>
+</p:sld>
+</file>
+
+<file path=ppt/slides/slide11.xml><?xml version="1.0" encoding="utf-8"?>
+<p:sld xmlns:a="http://schemas.openxmlformats.org/drawingml/2006/main" xmlns:r="http://schemas.openxmlformats.org/officeDocument/2006/relationships" xmlns:p="http://schemas.openxmlformats.org/presentationml/2006/main">
+  <p:cSld>
+    <p:spTree>
+      <p:nvGrpSpPr>
+        <p:cNvPr id="1" name=""/>
+        <p:cNvGrpSpPr/>
+        <p:nvPr/>
+      </p:nvGrpSpPr>
+      <p:grpSpPr>
+        <a:xfrm>
+          <a:off x="0" y="0"/>
+          <a:ext cx="0" cy="0"/>
+          <a:chOff x="0" y="0"/>
+          <a:chExt cx="0" cy="0"/>
+        </a:xfrm>
+      </p:grpSpPr>
+      <p:sp>
+        <p:nvSpPr>
+          <p:cNvPr id="3" name="Título 1">
+            <a:extLst>
+              <a:ext uri="{FF2B5EF4-FFF2-40B4-BE49-F238E27FC236}">
+                <a16:creationId xmlns:a16="http://schemas.microsoft.com/office/drawing/2014/main" id="{DFD9C863-A9BC-4FF0-8CE9-D051DC0BF048}"/>
+              </a:ext>
+            </a:extLst>
+          </p:cNvPr>
+          <p:cNvSpPr txBox="1">
+            <a:spLocks/>
+          </p:cNvSpPr>
+          <p:nvPr/>
+        </p:nvSpPr>
+        <p:spPr>
+          <a:xfrm>
+            <a:off x="1223487" y="150470"/>
+            <a:ext cx="9985287" cy="1061863"/>
+          </a:xfrm>
+          <a:prstGeom prst="rect">
+            <a:avLst/>
+          </a:prstGeom>
+        </p:spPr>
+        <p:txBody>
+          <a:bodyPr vert="horz" lIns="91440" tIns="45720" rIns="91440" bIns="45720" rtlCol="0" anchor="b">
+            <a:noAutofit/>
+          </a:bodyPr>
+          <a:lstStyle>
+            <a:lvl1pPr algn="l" defTabSz="914400" rtl="0" eaLnBrk="1" latinLnBrk="0" hangingPunct="1">
+              <a:lnSpc>
+                <a:spcPct val="90000"/>
+              </a:lnSpc>
+              <a:spcBef>
+                <a:spcPct val="0"/>
+              </a:spcBef>
+              <a:buNone/>
+              <a:defRPr sz="4400" kern="1200">
+                <a:solidFill>
+                  <a:schemeClr val="tx1"/>
+                </a:solidFill>
+                <a:latin typeface="+mj-lt"/>
+                <a:ea typeface="+mj-ea"/>
+                <a:cs typeface="+mj-cs"/>
+              </a:defRPr>
+            </a:lvl1pPr>
+          </a:lstStyle>
+          <a:p>
+            <a:pPr algn="ctr"/>
+            <a:r>
+              <a:rPr lang="en-US" sz="5400" b="1" dirty="0">
+                <a:latin typeface="Neue Haas Grotesk Text Pro (Títulos)"/>
+              </a:rPr>
+              <a:t>Parâmetros dos </a:t>
+            </a:r>
+            <a:r>
+              <a:rPr lang="en-US" sz="5400" b="1" dirty="0">
+                <a:solidFill>
+                  <a:srgbClr val="66CDAA"/>
+                </a:solidFill>
+                <a:latin typeface="Neue Haas Grotesk Text Pro (Títulos)"/>
+              </a:rPr>
+              <a:t>Analytics</a:t>
+            </a:r>
+          </a:p>
+        </p:txBody>
+      </p:sp>
       <p:pic>
         <p:nvPicPr>
           <p:cNvPr id="4" name="Picture 4">
@@ -3605,7 +4003,7 @@
 </p:sld>
 </file>
 
-<file path=ppt/slides/slide11.xml><?xml version="1.0" encoding="utf-8"?>
+<file path=ppt/slides/slide12.xml><?xml version="1.0" encoding="utf-8"?>
 <p:sld xmlns:a="http://schemas.openxmlformats.org/drawingml/2006/main" xmlns:r="http://schemas.openxmlformats.org/officeDocument/2006/relationships" xmlns:p="http://schemas.openxmlformats.org/presentationml/2006/main">
   <p:cSld>
     <p:bg>
@@ -3745,7 +4143,7 @@
 </p:sld>
 </file>
 
-<file path=ppt/slides/slide12.xml><?xml version="1.0" encoding="utf-8"?>
+<file path=ppt/slides/slide13.xml><?xml version="1.0" encoding="utf-8"?>
 <p:sld xmlns:a="http://schemas.openxmlformats.org/drawingml/2006/main" xmlns:r="http://schemas.openxmlformats.org/officeDocument/2006/relationships" xmlns:p="http://schemas.openxmlformats.org/presentationml/2006/main">
   <p:cSld>
     <p:spTree>
@@ -3933,7 +4331,174 @@
 </p:sld>
 </file>
 
-<file path=ppt/slides/slide13.xml><?xml version="1.0" encoding="utf-8"?>
+<file path=ppt/slides/slide14.xml><?xml version="1.0" encoding="utf-8"?>
+<p:sld xmlns:a="http://schemas.openxmlformats.org/drawingml/2006/main" xmlns:r="http://schemas.openxmlformats.org/officeDocument/2006/relationships" xmlns:p="http://schemas.openxmlformats.org/presentationml/2006/main">
+  <p:cSld>
+    <p:spTree>
+      <p:nvGrpSpPr>
+        <p:cNvPr id="1" name=""/>
+        <p:cNvGrpSpPr/>
+        <p:nvPr/>
+      </p:nvGrpSpPr>
+      <p:grpSpPr>
+        <a:xfrm>
+          <a:off x="0" y="0"/>
+          <a:ext cx="0" cy="0"/>
+          <a:chOff x="0" y="0"/>
+          <a:chExt cx="0" cy="0"/>
+        </a:xfrm>
+      </p:grpSpPr>
+      <p:sp>
+        <p:nvSpPr>
+          <p:cNvPr id="2" name="Título 1">
+            <a:extLst>
+              <a:ext uri="{FF2B5EF4-FFF2-40B4-BE49-F238E27FC236}">
+                <a16:creationId xmlns:a16="http://schemas.microsoft.com/office/drawing/2014/main" id="{E272AD94-E967-4DDE-96C9-3FA2C5EE2B07}"/>
+              </a:ext>
+            </a:extLst>
+          </p:cNvPr>
+          <p:cNvSpPr txBox="1">
+            <a:spLocks/>
+          </p:cNvSpPr>
+          <p:nvPr/>
+        </p:nvSpPr>
+        <p:spPr>
+          <a:xfrm>
+            <a:off x="3181689" y="356167"/>
+            <a:ext cx="5828622" cy="1727795"/>
+          </a:xfrm>
+          <a:prstGeom prst="rect">
+            <a:avLst/>
+          </a:prstGeom>
+        </p:spPr>
+        <p:txBody>
+          <a:bodyPr vert="horz" lIns="91440" tIns="45720" rIns="91440" bIns="45720" rtlCol="0" anchor="b">
+            <a:normAutofit fontScale="92500" lnSpcReduction="20000"/>
+          </a:bodyPr>
+          <a:lstStyle>
+            <a:lvl1pPr algn="l" defTabSz="914400" rtl="0" eaLnBrk="1" latinLnBrk="0" hangingPunct="1">
+              <a:lnSpc>
+                <a:spcPct val="90000"/>
+              </a:lnSpc>
+              <a:spcBef>
+                <a:spcPct val="0"/>
+              </a:spcBef>
+              <a:buNone/>
+              <a:defRPr sz="4400" kern="1200">
+                <a:solidFill>
+                  <a:schemeClr val="tx1"/>
+                </a:solidFill>
+                <a:latin typeface="+mj-lt"/>
+                <a:ea typeface="+mj-ea"/>
+                <a:cs typeface="+mj-cs"/>
+              </a:defRPr>
+            </a:lvl1pPr>
+          </a:lstStyle>
+          <a:p>
+            <a:pPr algn="ctr"/>
+            <a:r>
+              <a:rPr lang="en-US" sz="7200" b="1" dirty="0">
+                <a:latin typeface="Neue Haas Grotesk Text Pro (Títulos)"/>
+              </a:rPr>
+              <a:t>Perspectivas </a:t>
+            </a:r>
+            <a:r>
+              <a:rPr lang="en-US" sz="7200" b="1" dirty="0">
+                <a:solidFill>
+                  <a:srgbClr val="66CDAA"/>
+                </a:solidFill>
+                <a:latin typeface="Neue Haas Grotesk Text Pro (Títulos)"/>
+              </a:rPr>
+              <a:t>futuras</a:t>
+            </a:r>
+          </a:p>
+        </p:txBody>
+      </p:sp>
+      <p:pic>
+        <p:nvPicPr>
+          <p:cNvPr id="4" name="Imagem 3" descr="Uma imagem contendo Ícone&#10;&#10;Descrição gerada automaticamente">
+            <a:extLst>
+              <a:ext uri="{FF2B5EF4-FFF2-40B4-BE49-F238E27FC236}">
+                <a16:creationId xmlns:a16="http://schemas.microsoft.com/office/drawing/2014/main" id="{F2D51159-3583-467B-AF70-D9193083DF48}"/>
+              </a:ext>
+            </a:extLst>
+          </p:cNvPr>
+          <p:cNvPicPr>
+            <a:picLocks noChangeAspect="1"/>
+          </p:cNvPicPr>
+          <p:nvPr/>
+        </p:nvPicPr>
+        <p:blipFill>
+          <a:blip r:embed="rId2">
+            <a:extLst>
+              <a:ext uri="{28A0092B-C50C-407E-A947-70E740481C1C}">
+                <a14:useLocalDpi xmlns:a14="http://schemas.microsoft.com/office/drawing/2010/main" val="0"/>
+              </a:ext>
+            </a:extLst>
+          </a:blip>
+          <a:stretch>
+            <a:fillRect/>
+          </a:stretch>
+        </p:blipFill>
+        <p:spPr>
+          <a:xfrm>
+            <a:off x="1218709" y="2575873"/>
+            <a:ext cx="3925960" cy="3925960"/>
+          </a:xfrm>
+          <a:prstGeom prst="rect">
+            <a:avLst/>
+          </a:prstGeom>
+        </p:spPr>
+      </p:pic>
+      <p:pic>
+        <p:nvPicPr>
+          <p:cNvPr id="5" name="Imagem 4" descr="Ícone&#10;&#10;Descrição gerada automaticamente">
+            <a:extLst>
+              <a:ext uri="{FF2B5EF4-FFF2-40B4-BE49-F238E27FC236}">
+                <a16:creationId xmlns:a16="http://schemas.microsoft.com/office/drawing/2014/main" id="{BA1FE78A-D5B5-4D1D-8179-7E41FB80D84E}"/>
+              </a:ext>
+            </a:extLst>
+          </p:cNvPr>
+          <p:cNvPicPr>
+            <a:picLocks noChangeAspect="1"/>
+          </p:cNvPicPr>
+          <p:nvPr/>
+        </p:nvPicPr>
+        <p:blipFill rotWithShape="1">
+          <a:blip r:embed="rId3">
+            <a:extLst>
+              <a:ext uri="{28A0092B-C50C-407E-A947-70E740481C1C}">
+                <a14:useLocalDpi xmlns:a14="http://schemas.microsoft.com/office/drawing/2010/main" val="0"/>
+              </a:ext>
+            </a:extLst>
+          </a:blip>
+          <a:srcRect r="1" b="6358"/>
+          <a:stretch/>
+        </p:blipFill>
+        <p:spPr>
+          <a:xfrm>
+            <a:off x="6825614" y="2410182"/>
+            <a:ext cx="4369394" cy="4091651"/>
+          </a:xfrm>
+          <a:prstGeom prst="rect">
+            <a:avLst/>
+          </a:prstGeom>
+        </p:spPr>
+      </p:pic>
+    </p:spTree>
+    <p:extLst>
+      <p:ext uri="{BB962C8B-B14F-4D97-AF65-F5344CB8AC3E}">
+        <p14:creationId xmlns:p14="http://schemas.microsoft.com/office/powerpoint/2010/main" val="904968317"/>
+      </p:ext>
+    </p:extLst>
+  </p:cSld>
+  <p:clrMapOvr>
+    <a:masterClrMapping/>
+  </p:clrMapOvr>
+</p:sld>
+</file>
+
+<file path=ppt/slides/slide15.xml><?xml version="1.0" encoding="utf-8"?>
 <p:sld xmlns:a="http://schemas.openxmlformats.org/drawingml/2006/main" xmlns:r="http://schemas.openxmlformats.org/officeDocument/2006/relationships" xmlns:p="http://schemas.openxmlformats.org/presentationml/2006/main">
   <p:cSld>
     <p:spTree>
@@ -4626,8 +5191,8 @@
         </p:nvSpPr>
         <p:spPr>
           <a:xfrm>
-            <a:off x="3320518" y="365817"/>
-            <a:ext cx="5761567" cy="1107996"/>
+            <a:off x="3762710" y="339236"/>
+            <a:ext cx="4877184" cy="1107996"/>
           </a:xfrm>
           <a:prstGeom prst="rect">
             <a:avLst/>
@@ -4641,25 +5206,17 @@
           <a:lstStyle/>
           <a:p>
             <a:r>
+              <a:rPr lang="pt-BR" sz="6600" b="1" dirty="0"/>
+              <a:t>Nossa</a:t>
+            </a:r>
+            <a:r>
+              <a:rPr lang="pt-BR" sz="6600" dirty="0"/>
+              <a:t> </a:t>
+            </a:r>
+            <a:r>
               <a:rPr lang="pt-BR" sz="6600" b="1" dirty="0">
                 <a:solidFill>
-                  <a:srgbClr val="363636"/>
-                </a:solidFill>
-              </a:rPr>
-              <a:t>Nossa</a:t>
-            </a:r>
-            <a:r>
-              <a:rPr lang="pt-BR" sz="6600" dirty="0">
-                <a:solidFill>
-                  <a:srgbClr val="363636"/>
-                </a:solidFill>
-              </a:rPr>
-              <a:t> </a:t>
-            </a:r>
-            <a:r>
-              <a:rPr lang="pt-BR" sz="6600" b="1" dirty="0">
-                <a:solidFill>
-                  <a:srgbClr val="363636"/>
+                  <a:srgbClr val="66CDAA"/>
                 </a:solidFill>
               </a:rPr>
               <a:t>equipe</a:t>
@@ -5190,6 +5747,606 @@
           <a:chExt cx="0" cy="0"/>
         </a:xfrm>
       </p:grpSpPr>
+      <p:sp>
+        <p:nvSpPr>
+          <p:cNvPr id="2" name="CaixaDeTexto 1">
+            <a:extLst>
+              <a:ext uri="{FF2B5EF4-FFF2-40B4-BE49-F238E27FC236}">
+                <a16:creationId xmlns:a16="http://schemas.microsoft.com/office/drawing/2014/main" id="{EA95E37E-EA2B-44FE-BA3E-FA7B8C22D048}"/>
+              </a:ext>
+            </a:extLst>
+          </p:cNvPr>
+          <p:cNvSpPr txBox="1"/>
+          <p:nvPr/>
+        </p:nvSpPr>
+        <p:spPr>
+          <a:xfrm>
+            <a:off x="3027896" y="181152"/>
+            <a:ext cx="6136203" cy="2123658"/>
+          </a:xfrm>
+          <a:prstGeom prst="rect">
+            <a:avLst/>
+          </a:prstGeom>
+          <a:noFill/>
+        </p:spPr>
+        <p:txBody>
+          <a:bodyPr wrap="square" rtlCol="0">
+            <a:spAutoFit/>
+          </a:bodyPr>
+          <a:lstStyle/>
+          <a:p>
+            <a:r>
+              <a:rPr lang="pt-BR" sz="6600" b="1" dirty="0"/>
+              <a:t>Nossa</a:t>
+            </a:r>
+            <a:r>
+              <a:rPr lang="pt-BR" sz="6600" dirty="0"/>
+              <a:t> </a:t>
+            </a:r>
+            <a:r>
+              <a:rPr lang="pt-BR" sz="6600" b="1" dirty="0"/>
+              <a:t>equipe na </a:t>
+            </a:r>
+            <a:r>
+              <a:rPr lang="pt-BR" sz="6600" b="1" dirty="0">
+                <a:solidFill>
+                  <a:srgbClr val="66CDAA"/>
+                </a:solidFill>
+              </a:rPr>
+              <a:t>metodologia ágil</a:t>
+            </a:r>
+          </a:p>
+        </p:txBody>
+      </p:sp>
+      <p:pic>
+        <p:nvPicPr>
+          <p:cNvPr id="3" name="Imagem 2" descr="Pessoa sorrindo e posando para foto&#10;&#10;Descrição gerada automaticamente">
+            <a:extLst>
+              <a:ext uri="{FF2B5EF4-FFF2-40B4-BE49-F238E27FC236}">
+                <a16:creationId xmlns:a16="http://schemas.microsoft.com/office/drawing/2014/main" id="{18D68D99-E27E-46AD-BE26-9A35C243EA4A}"/>
+              </a:ext>
+            </a:extLst>
+          </p:cNvPr>
+          <p:cNvPicPr>
+            <a:picLocks noChangeAspect="1"/>
+          </p:cNvPicPr>
+          <p:nvPr/>
+        </p:nvPicPr>
+        <p:blipFill>
+          <a:blip r:embed="rId2">
+            <a:extLst>
+              <a:ext uri="{28A0092B-C50C-407E-A947-70E740481C1C}">
+                <a14:useLocalDpi xmlns:a14="http://schemas.microsoft.com/office/drawing/2010/main" val="0"/>
+              </a:ext>
+            </a:extLst>
+          </a:blip>
+          <a:stretch>
+            <a:fillRect/>
+          </a:stretch>
+        </p:blipFill>
+        <p:spPr>
+          <a:xfrm>
+            <a:off x="10271731" y="3835702"/>
+            <a:ext cx="1647619" cy="1647619"/>
+          </a:xfrm>
+          <a:prstGeom prst="rect">
+            <a:avLst/>
+          </a:prstGeom>
+        </p:spPr>
+      </p:pic>
+      <p:pic>
+        <p:nvPicPr>
+          <p:cNvPr id="4" name="Imagem 3" descr="Menino de camisa preta&#10;&#10;Descrição gerada automaticamente">
+            <a:extLst>
+              <a:ext uri="{FF2B5EF4-FFF2-40B4-BE49-F238E27FC236}">
+                <a16:creationId xmlns:a16="http://schemas.microsoft.com/office/drawing/2014/main" id="{C020A28B-6F21-45C9-82E2-1E7F99EB8B84}"/>
+              </a:ext>
+            </a:extLst>
+          </p:cNvPr>
+          <p:cNvPicPr>
+            <a:picLocks noChangeAspect="1"/>
+          </p:cNvPicPr>
+          <p:nvPr/>
+        </p:nvPicPr>
+        <p:blipFill>
+          <a:blip r:embed="rId3">
+            <a:extLst>
+              <a:ext uri="{28A0092B-C50C-407E-A947-70E740481C1C}">
+                <a14:useLocalDpi xmlns:a14="http://schemas.microsoft.com/office/drawing/2010/main" val="0"/>
+              </a:ext>
+            </a:extLst>
+          </a:blip>
+          <a:stretch>
+            <a:fillRect/>
+          </a:stretch>
+        </p:blipFill>
+        <p:spPr>
+          <a:xfrm>
+            <a:off x="5261558" y="3835702"/>
+            <a:ext cx="1647619" cy="1647619"/>
+          </a:xfrm>
+          <a:prstGeom prst="rect">
+            <a:avLst/>
+          </a:prstGeom>
+        </p:spPr>
+      </p:pic>
+      <p:pic>
+        <p:nvPicPr>
+          <p:cNvPr id="5" name="Imagem 4" descr="Homem com camiseta preta&#10;&#10;Descrição gerada automaticamente">
+            <a:extLst>
+              <a:ext uri="{FF2B5EF4-FFF2-40B4-BE49-F238E27FC236}">
+                <a16:creationId xmlns:a16="http://schemas.microsoft.com/office/drawing/2014/main" id="{3959DA1A-F784-4114-96DB-6BDD1D974C8D}"/>
+              </a:ext>
+            </a:extLst>
+          </p:cNvPr>
+          <p:cNvPicPr>
+            <a:picLocks noChangeAspect="1"/>
+          </p:cNvPicPr>
+          <p:nvPr/>
+        </p:nvPicPr>
+        <p:blipFill>
+          <a:blip r:embed="rId4">
+            <a:extLst>
+              <a:ext uri="{28A0092B-C50C-407E-A947-70E740481C1C}">
+                <a14:useLocalDpi xmlns:a14="http://schemas.microsoft.com/office/drawing/2010/main" val="0"/>
+              </a:ext>
+            </a:extLst>
+          </a:blip>
+          <a:stretch>
+            <a:fillRect/>
+          </a:stretch>
+        </p:blipFill>
+        <p:spPr>
+          <a:xfrm>
+            <a:off x="7699807" y="3835702"/>
+            <a:ext cx="1647619" cy="1647619"/>
+          </a:xfrm>
+          <a:prstGeom prst="rect">
+            <a:avLst/>
+          </a:prstGeom>
+        </p:spPr>
+      </p:pic>
+      <p:pic>
+        <p:nvPicPr>
+          <p:cNvPr id="6" name="Imagem 5" descr="Homem de óculos e blusa azul&#10;&#10;Descrição gerada automaticamente">
+            <a:extLst>
+              <a:ext uri="{FF2B5EF4-FFF2-40B4-BE49-F238E27FC236}">
+                <a16:creationId xmlns:a16="http://schemas.microsoft.com/office/drawing/2014/main" id="{24ECC3DC-DFCB-4443-B100-D207A29428B5}"/>
+              </a:ext>
+            </a:extLst>
+          </p:cNvPr>
+          <p:cNvPicPr>
+            <a:picLocks noChangeAspect="1"/>
+          </p:cNvPicPr>
+          <p:nvPr/>
+        </p:nvPicPr>
+        <p:blipFill>
+          <a:blip r:embed="rId5">
+            <a:extLst>
+              <a:ext uri="{28A0092B-C50C-407E-A947-70E740481C1C}">
+                <a14:useLocalDpi xmlns:a14="http://schemas.microsoft.com/office/drawing/2010/main" val="0"/>
+              </a:ext>
+            </a:extLst>
+          </a:blip>
+          <a:stretch>
+            <a:fillRect/>
+          </a:stretch>
+        </p:blipFill>
+        <p:spPr>
+          <a:xfrm>
+            <a:off x="2884177" y="3862282"/>
+            <a:ext cx="1647619" cy="1647619"/>
+          </a:xfrm>
+          <a:prstGeom prst="rect">
+            <a:avLst/>
+          </a:prstGeom>
+        </p:spPr>
+      </p:pic>
+      <p:pic>
+        <p:nvPicPr>
+          <p:cNvPr id="7" name="Imagem 6" descr="Pessoa com cabelo curto&#10;&#10;Descrição gerada automaticamente">
+            <a:extLst>
+              <a:ext uri="{FF2B5EF4-FFF2-40B4-BE49-F238E27FC236}">
+                <a16:creationId xmlns:a16="http://schemas.microsoft.com/office/drawing/2014/main" id="{4885C21D-6F92-4B44-A0C3-64DDE02093AC}"/>
+              </a:ext>
+            </a:extLst>
+          </p:cNvPr>
+          <p:cNvPicPr>
+            <a:picLocks noChangeAspect="1"/>
+          </p:cNvPicPr>
+          <p:nvPr/>
+        </p:nvPicPr>
+        <p:blipFill>
+          <a:blip r:embed="rId6">
+            <a:extLst>
+              <a:ext uri="{28A0092B-C50C-407E-A947-70E740481C1C}">
+                <a14:useLocalDpi xmlns:a14="http://schemas.microsoft.com/office/drawing/2010/main" val="0"/>
+              </a:ext>
+            </a:extLst>
+          </a:blip>
+          <a:stretch>
+            <a:fillRect/>
+          </a:stretch>
+        </p:blipFill>
+        <p:spPr>
+          <a:xfrm>
+            <a:off x="501826" y="3862282"/>
+            <a:ext cx="1647619" cy="1647619"/>
+          </a:xfrm>
+          <a:prstGeom prst="rect">
+            <a:avLst/>
+          </a:prstGeom>
+        </p:spPr>
+      </p:pic>
+      <p:sp>
+        <p:nvSpPr>
+          <p:cNvPr id="8" name="CaixaDeTexto 7">
+            <a:extLst>
+              <a:ext uri="{FF2B5EF4-FFF2-40B4-BE49-F238E27FC236}">
+                <a16:creationId xmlns:a16="http://schemas.microsoft.com/office/drawing/2014/main" id="{30CAA172-2466-4818-AEB7-AC7012794A08}"/>
+              </a:ext>
+            </a:extLst>
+          </p:cNvPr>
+          <p:cNvSpPr txBox="1"/>
+          <p:nvPr/>
+        </p:nvSpPr>
+        <p:spPr>
+          <a:xfrm>
+            <a:off x="501826" y="5509901"/>
+            <a:ext cx="1647619" cy="830997"/>
+          </a:xfrm>
+          <a:prstGeom prst="rect">
+            <a:avLst/>
+          </a:prstGeom>
+          <a:noFill/>
+        </p:spPr>
+        <p:txBody>
+          <a:bodyPr wrap="square" rtlCol="0">
+            <a:spAutoFit/>
+          </a:bodyPr>
+          <a:lstStyle/>
+          <a:p>
+            <a:pPr algn="ctr"/>
+            <a:r>
+              <a:rPr lang="pt-BR" sz="2400" b="1" dirty="0">
+                <a:solidFill>
+                  <a:srgbClr val="363636"/>
+                </a:solidFill>
+              </a:rPr>
+              <a:t>Jorge </a:t>
+            </a:r>
+          </a:p>
+          <a:p>
+            <a:pPr algn="ctr"/>
+            <a:r>
+              <a:rPr lang="pt-BR" sz="2400" b="1" dirty="0">
+                <a:solidFill>
+                  <a:srgbClr val="363636"/>
+                </a:solidFill>
+              </a:rPr>
+              <a:t>Uliam</a:t>
+            </a:r>
+          </a:p>
+        </p:txBody>
+      </p:sp>
+      <p:sp>
+        <p:nvSpPr>
+          <p:cNvPr id="9" name="CaixaDeTexto 8">
+            <a:extLst>
+              <a:ext uri="{FF2B5EF4-FFF2-40B4-BE49-F238E27FC236}">
+                <a16:creationId xmlns:a16="http://schemas.microsoft.com/office/drawing/2014/main" id="{D64B4279-D99E-4F82-9237-9A58087B0CB1}"/>
+              </a:ext>
+            </a:extLst>
+          </p:cNvPr>
+          <p:cNvSpPr txBox="1"/>
+          <p:nvPr/>
+        </p:nvSpPr>
+        <p:spPr>
+          <a:xfrm>
+            <a:off x="10271730" y="5509902"/>
+            <a:ext cx="1647619" cy="1200329"/>
+          </a:xfrm>
+          <a:prstGeom prst="rect">
+            <a:avLst/>
+          </a:prstGeom>
+          <a:noFill/>
+        </p:spPr>
+        <p:txBody>
+          <a:bodyPr wrap="square" rtlCol="0">
+            <a:spAutoFit/>
+          </a:bodyPr>
+          <a:lstStyle/>
+          <a:p>
+            <a:pPr algn="ctr"/>
+            <a:r>
+              <a:rPr lang="pt-BR" sz="2400" b="1" dirty="0">
+                <a:solidFill>
+                  <a:srgbClr val="363636"/>
+                </a:solidFill>
+              </a:rPr>
+              <a:t>Bruno Ricardo</a:t>
+            </a:r>
+          </a:p>
+          <a:p>
+            <a:pPr algn="ctr"/>
+            <a:endParaRPr lang="pt-BR" sz="2400" b="1" dirty="0">
+              <a:solidFill>
+                <a:srgbClr val="363636"/>
+              </a:solidFill>
+            </a:endParaRPr>
+          </a:p>
+        </p:txBody>
+      </p:sp>
+      <p:sp>
+        <p:nvSpPr>
+          <p:cNvPr id="10" name="CaixaDeTexto 9">
+            <a:extLst>
+              <a:ext uri="{FF2B5EF4-FFF2-40B4-BE49-F238E27FC236}">
+                <a16:creationId xmlns:a16="http://schemas.microsoft.com/office/drawing/2014/main" id="{92E856D9-E31D-4B6C-87A8-32AC67319A87}"/>
+              </a:ext>
+            </a:extLst>
+          </p:cNvPr>
+          <p:cNvSpPr txBox="1"/>
+          <p:nvPr/>
+        </p:nvSpPr>
+        <p:spPr>
+          <a:xfrm>
+            <a:off x="7643909" y="5483321"/>
+            <a:ext cx="1759414" cy="830997"/>
+          </a:xfrm>
+          <a:prstGeom prst="rect">
+            <a:avLst/>
+          </a:prstGeom>
+          <a:noFill/>
+        </p:spPr>
+        <p:txBody>
+          <a:bodyPr wrap="square" rtlCol="0">
+            <a:spAutoFit/>
+          </a:bodyPr>
+          <a:lstStyle/>
+          <a:p>
+            <a:pPr algn="ctr"/>
+            <a:r>
+              <a:rPr lang="pt-BR" sz="2400" b="1" dirty="0">
+                <a:solidFill>
+                  <a:srgbClr val="363636"/>
+                </a:solidFill>
+              </a:rPr>
+              <a:t>Guilherme Miranda</a:t>
+            </a:r>
+          </a:p>
+        </p:txBody>
+      </p:sp>
+      <p:sp>
+        <p:nvSpPr>
+          <p:cNvPr id="11" name="CaixaDeTexto 10">
+            <a:extLst>
+              <a:ext uri="{FF2B5EF4-FFF2-40B4-BE49-F238E27FC236}">
+                <a16:creationId xmlns:a16="http://schemas.microsoft.com/office/drawing/2014/main" id="{5830569A-5A1C-4AC0-B09C-72179680E7D9}"/>
+              </a:ext>
+            </a:extLst>
+          </p:cNvPr>
+          <p:cNvSpPr txBox="1"/>
+          <p:nvPr/>
+        </p:nvSpPr>
+        <p:spPr>
+          <a:xfrm>
+            <a:off x="2884177" y="5483321"/>
+            <a:ext cx="1647619" cy="830997"/>
+          </a:xfrm>
+          <a:prstGeom prst="rect">
+            <a:avLst/>
+          </a:prstGeom>
+          <a:noFill/>
+        </p:spPr>
+        <p:txBody>
+          <a:bodyPr wrap="square" rtlCol="0">
+            <a:spAutoFit/>
+          </a:bodyPr>
+          <a:lstStyle/>
+          <a:p>
+            <a:pPr algn="ctr"/>
+            <a:r>
+              <a:rPr lang="pt-BR" sz="2400" b="1" dirty="0">
+                <a:solidFill>
+                  <a:srgbClr val="363636"/>
+                </a:solidFill>
+              </a:rPr>
+              <a:t>Matheus Pinheiro</a:t>
+            </a:r>
+          </a:p>
+        </p:txBody>
+      </p:sp>
+      <p:sp>
+        <p:nvSpPr>
+          <p:cNvPr id="12" name="CaixaDeTexto 11">
+            <a:extLst>
+              <a:ext uri="{FF2B5EF4-FFF2-40B4-BE49-F238E27FC236}">
+                <a16:creationId xmlns:a16="http://schemas.microsoft.com/office/drawing/2014/main" id="{102B56D7-01FB-4BDA-8087-654B5B546D3B}"/>
+              </a:ext>
+            </a:extLst>
+          </p:cNvPr>
+          <p:cNvSpPr txBox="1"/>
+          <p:nvPr/>
+        </p:nvSpPr>
+        <p:spPr>
+          <a:xfrm>
+            <a:off x="5261558" y="5483321"/>
+            <a:ext cx="1647619" cy="830997"/>
+          </a:xfrm>
+          <a:prstGeom prst="rect">
+            <a:avLst/>
+          </a:prstGeom>
+          <a:noFill/>
+        </p:spPr>
+        <p:txBody>
+          <a:bodyPr wrap="square" rtlCol="0">
+            <a:spAutoFit/>
+          </a:bodyPr>
+          <a:lstStyle/>
+          <a:p>
+            <a:pPr algn="ctr"/>
+            <a:r>
+              <a:rPr lang="pt-BR" sz="2400" b="1" dirty="0">
+                <a:solidFill>
+                  <a:srgbClr val="363636"/>
+                </a:solidFill>
+              </a:rPr>
+              <a:t>Gabriel Alvares</a:t>
+            </a:r>
+          </a:p>
+        </p:txBody>
+      </p:sp>
+      <p:sp>
+        <p:nvSpPr>
+          <p:cNvPr id="13" name="CaixaDeTexto 12">
+            <a:extLst>
+              <a:ext uri="{FF2B5EF4-FFF2-40B4-BE49-F238E27FC236}">
+                <a16:creationId xmlns:a16="http://schemas.microsoft.com/office/drawing/2014/main" id="{F9CEA640-2114-4170-BB21-61EE51731B54}"/>
+              </a:ext>
+            </a:extLst>
+          </p:cNvPr>
+          <p:cNvSpPr txBox="1"/>
+          <p:nvPr/>
+        </p:nvSpPr>
+        <p:spPr>
+          <a:xfrm>
+            <a:off x="501826" y="2785064"/>
+            <a:ext cx="1647619" cy="1077218"/>
+          </a:xfrm>
+          <a:prstGeom prst="rect">
+            <a:avLst/>
+          </a:prstGeom>
+          <a:noFill/>
+        </p:spPr>
+        <p:txBody>
+          <a:bodyPr wrap="square" rtlCol="0">
+            <a:spAutoFit/>
+          </a:bodyPr>
+          <a:lstStyle/>
+          <a:p>
+            <a:pPr algn="ctr"/>
+            <a:r>
+              <a:rPr lang="pt-BR" sz="3200" b="1" dirty="0">
+                <a:solidFill>
+                  <a:srgbClr val="66CDAA"/>
+                </a:solidFill>
+              </a:rPr>
+              <a:t>Product Owner</a:t>
+            </a:r>
+          </a:p>
+        </p:txBody>
+      </p:sp>
+      <p:sp>
+        <p:nvSpPr>
+          <p:cNvPr id="15" name="CaixaDeTexto 14">
+            <a:extLst>
+              <a:ext uri="{FF2B5EF4-FFF2-40B4-BE49-F238E27FC236}">
+                <a16:creationId xmlns:a16="http://schemas.microsoft.com/office/drawing/2014/main" id="{E7D5F39C-46B8-4991-A93A-53A2FEC2DEF5}"/>
+              </a:ext>
+            </a:extLst>
+          </p:cNvPr>
+          <p:cNvSpPr txBox="1"/>
+          <p:nvPr/>
+        </p:nvSpPr>
+        <p:spPr>
+          <a:xfrm>
+            <a:off x="2884177" y="2758484"/>
+            <a:ext cx="1647619" cy="1077218"/>
+          </a:xfrm>
+          <a:prstGeom prst="rect">
+            <a:avLst/>
+          </a:prstGeom>
+          <a:noFill/>
+        </p:spPr>
+        <p:txBody>
+          <a:bodyPr wrap="square" rtlCol="0">
+            <a:spAutoFit/>
+          </a:bodyPr>
+          <a:lstStyle/>
+          <a:p>
+            <a:pPr algn="ctr"/>
+            <a:r>
+              <a:rPr lang="pt-BR" sz="3200" b="1" dirty="0">
+                <a:solidFill>
+                  <a:srgbClr val="66CDAA"/>
+                </a:solidFill>
+              </a:rPr>
+              <a:t>SCRUM Master</a:t>
+            </a:r>
+          </a:p>
+        </p:txBody>
+      </p:sp>
+      <p:sp>
+        <p:nvSpPr>
+          <p:cNvPr id="16" name="CaixaDeTexto 15">
+            <a:extLst>
+              <a:ext uri="{FF2B5EF4-FFF2-40B4-BE49-F238E27FC236}">
+                <a16:creationId xmlns:a16="http://schemas.microsoft.com/office/drawing/2014/main" id="{F6671294-E992-405B-BECC-5434DE6A8C6A}"/>
+              </a:ext>
+            </a:extLst>
+          </p:cNvPr>
+          <p:cNvSpPr txBox="1"/>
+          <p:nvPr/>
+        </p:nvSpPr>
+        <p:spPr>
+          <a:xfrm>
+            <a:off x="5261558" y="2832236"/>
+            <a:ext cx="6657792" cy="707886"/>
+          </a:xfrm>
+          <a:prstGeom prst="rect">
+            <a:avLst/>
+          </a:prstGeom>
+          <a:noFill/>
+        </p:spPr>
+        <p:txBody>
+          <a:bodyPr wrap="square" rtlCol="0">
+            <a:spAutoFit/>
+          </a:bodyPr>
+          <a:lstStyle/>
+          <a:p>
+            <a:pPr algn="ctr"/>
+            <a:r>
+              <a:rPr lang="pt-BR" sz="4000" b="1" dirty="0">
+                <a:solidFill>
+                  <a:srgbClr val="66CDAA"/>
+                </a:solidFill>
+              </a:rPr>
+              <a:t>Equipe de desenvolvimento</a:t>
+            </a:r>
+          </a:p>
+        </p:txBody>
+      </p:sp>
+    </p:spTree>
+    <p:extLst>
+      <p:ext uri="{BB962C8B-B14F-4D97-AF65-F5344CB8AC3E}">
+        <p14:creationId xmlns:p14="http://schemas.microsoft.com/office/powerpoint/2010/main" val="1482053358"/>
+      </p:ext>
+    </p:extLst>
+  </p:cSld>
+  <p:clrMapOvr>
+    <a:masterClrMapping/>
+  </p:clrMapOvr>
+</p:sld>
+</file>
+
+<file path=ppt/slides/slide6.xml><?xml version="1.0" encoding="utf-8"?>
+<p:sld xmlns:a="http://schemas.openxmlformats.org/drawingml/2006/main" xmlns:r="http://schemas.openxmlformats.org/officeDocument/2006/relationships" xmlns:p="http://schemas.openxmlformats.org/presentationml/2006/main">
+  <p:cSld>
+    <p:spTree>
+      <p:nvGrpSpPr>
+        <p:cNvPr id="1" name=""/>
+        <p:cNvGrpSpPr/>
+        <p:nvPr/>
+      </p:nvGrpSpPr>
+      <p:grpSpPr>
+        <a:xfrm>
+          <a:off x="0" y="0"/>
+          <a:ext cx="0" cy="0"/>
+          <a:chOff x="0" y="0"/>
+          <a:chExt cx="0" cy="0"/>
+        </a:xfrm>
+      </p:grpSpPr>
       <p:pic>
         <p:nvPicPr>
           <p:cNvPr id="3" name="Imagem 2" descr="Uma imagem contendo Forma&#10;&#10;Descrição gerada automaticamente">
@@ -5373,7 +6530,7 @@
 </p:sld>
 </file>
 
-<file path=ppt/slides/slide6.xml><?xml version="1.0" encoding="utf-8"?>
+<file path=ppt/slides/slide7.xml><?xml version="1.0" encoding="utf-8"?>
 <p:sld xmlns:a="http://schemas.openxmlformats.org/drawingml/2006/main" xmlns:r="http://schemas.openxmlformats.org/officeDocument/2006/relationships" xmlns:p="http://schemas.openxmlformats.org/presentationml/2006/main">
   <p:cSld>
     <p:spTree>
@@ -8063,7 +9220,7 @@
 </p:sld>
 </file>
 
-<file path=ppt/slides/slide7.xml><?xml version="1.0" encoding="utf-8"?>
+<file path=ppt/slides/slide8.xml><?xml version="1.0" encoding="utf-8"?>
 <p:sld xmlns:a="http://schemas.openxmlformats.org/drawingml/2006/main" xmlns:r="http://schemas.openxmlformats.org/officeDocument/2006/relationships" xmlns:p="http://schemas.openxmlformats.org/presentationml/2006/main">
   <p:cSld>
     <p:spTree>
@@ -8233,132 +9390,6 @@
     <p:extLst>
       <p:ext uri="{BB962C8B-B14F-4D97-AF65-F5344CB8AC3E}">
         <p14:creationId xmlns:p14="http://schemas.microsoft.com/office/powerpoint/2010/main" val="590807213"/>
-      </p:ext>
-    </p:extLst>
-  </p:cSld>
-  <p:clrMapOvr>
-    <a:masterClrMapping/>
-  </p:clrMapOvr>
-</p:sld>
-</file>
-
-<file path=ppt/slides/slide8.xml><?xml version="1.0" encoding="utf-8"?>
-<p:sld xmlns:a="http://schemas.openxmlformats.org/drawingml/2006/main" xmlns:r="http://schemas.openxmlformats.org/officeDocument/2006/relationships" xmlns:p="http://schemas.openxmlformats.org/presentationml/2006/main">
-  <p:cSld>
-    <p:spTree>
-      <p:nvGrpSpPr>
-        <p:cNvPr id="1" name=""/>
-        <p:cNvGrpSpPr/>
-        <p:nvPr/>
-      </p:nvGrpSpPr>
-      <p:grpSpPr>
-        <a:xfrm>
-          <a:off x="0" y="0"/>
-          <a:ext cx="0" cy="0"/>
-          <a:chOff x="0" y="0"/>
-          <a:chExt cx="0" cy="0"/>
-        </a:xfrm>
-      </p:grpSpPr>
-      <p:sp>
-        <p:nvSpPr>
-          <p:cNvPr id="3" name="Título 1">
-            <a:extLst>
-              <a:ext uri="{FF2B5EF4-FFF2-40B4-BE49-F238E27FC236}">
-                <a16:creationId xmlns:a16="http://schemas.microsoft.com/office/drawing/2014/main" id="{DFD9C863-A9BC-4FF0-8CE9-D051DC0BF048}"/>
-              </a:ext>
-            </a:extLst>
-          </p:cNvPr>
-          <p:cNvSpPr txBox="1">
-            <a:spLocks/>
-          </p:cNvSpPr>
-          <p:nvPr/>
-        </p:nvSpPr>
-        <p:spPr>
-          <a:xfrm>
-            <a:off x="2949048" y="486847"/>
-            <a:ext cx="6293903" cy="1530752"/>
-          </a:xfrm>
-          <a:prstGeom prst="rect">
-            <a:avLst/>
-          </a:prstGeom>
-        </p:spPr>
-        <p:txBody>
-          <a:bodyPr vert="horz" lIns="91440" tIns="45720" rIns="91440" bIns="45720" rtlCol="0" anchor="b">
-            <a:noAutofit/>
-          </a:bodyPr>
-          <a:lstStyle>
-            <a:lvl1pPr algn="l" defTabSz="914400" rtl="0" eaLnBrk="1" latinLnBrk="0" hangingPunct="1">
-              <a:lnSpc>
-                <a:spcPct val="90000"/>
-              </a:lnSpc>
-              <a:spcBef>
-                <a:spcPct val="0"/>
-              </a:spcBef>
-              <a:buNone/>
-              <a:defRPr sz="4400" kern="1200">
-                <a:solidFill>
-                  <a:schemeClr val="tx1"/>
-                </a:solidFill>
-                <a:latin typeface="+mj-lt"/>
-                <a:ea typeface="+mj-ea"/>
-                <a:cs typeface="+mj-cs"/>
-              </a:defRPr>
-            </a:lvl1pPr>
-          </a:lstStyle>
-          <a:p>
-            <a:pPr algn="ctr"/>
-            <a:r>
-              <a:rPr lang="en-US" sz="5400" b="1" dirty="0">
-                <a:latin typeface="Neue Haas Grotesk Text Pro (Títulos)"/>
-              </a:rPr>
-              <a:t>Parâmetros dos </a:t>
-            </a:r>
-            <a:r>
-              <a:rPr lang="en-US" sz="5400" b="1" dirty="0">
-                <a:solidFill>
-                  <a:srgbClr val="66CDAA"/>
-                </a:solidFill>
-                <a:latin typeface="Neue Haas Grotesk Text Pro (Títulos)"/>
-              </a:rPr>
-              <a:t>Analytics</a:t>
-            </a:r>
-          </a:p>
-        </p:txBody>
-      </p:sp>
-      <p:pic>
-        <p:nvPicPr>
-          <p:cNvPr id="5" name="Imagem 4">
-            <a:extLst>
-              <a:ext uri="{FF2B5EF4-FFF2-40B4-BE49-F238E27FC236}">
-                <a16:creationId xmlns:a16="http://schemas.microsoft.com/office/drawing/2014/main" id="{AE4465B0-C683-4D9D-A4C1-E31270CEAAB7}"/>
-              </a:ext>
-            </a:extLst>
-          </p:cNvPr>
-          <p:cNvPicPr>
-            <a:picLocks noChangeAspect="1"/>
-          </p:cNvPicPr>
-          <p:nvPr/>
-        </p:nvPicPr>
-        <p:blipFill>
-          <a:blip r:embed="rId2"/>
-          <a:stretch>
-            <a:fillRect/>
-          </a:stretch>
-        </p:blipFill>
-        <p:spPr>
-          <a:xfrm>
-            <a:off x="1020003" y="2190991"/>
-            <a:ext cx="10146276" cy="4261434"/>
-          </a:xfrm>
-          <a:prstGeom prst="rect">
-            <a:avLst/>
-          </a:prstGeom>
-        </p:spPr>
-      </p:pic>
-    </p:spTree>
-    <p:extLst>
-      <p:ext uri="{BB962C8B-B14F-4D97-AF65-F5344CB8AC3E}">
-        <p14:creationId xmlns:p14="http://schemas.microsoft.com/office/powerpoint/2010/main" val="3181802433"/>
       </p:ext>
     </p:extLst>
   </p:cSld>
@@ -8451,310 +9482,40 @@
           </a:p>
         </p:txBody>
       </p:sp>
-      <p:sp>
-        <p:nvSpPr>
-          <p:cNvPr id="4" name="Retângulo 3">
-            <a:extLst>
-              <a:ext uri="{FF2B5EF4-FFF2-40B4-BE49-F238E27FC236}">
-                <a16:creationId xmlns:a16="http://schemas.microsoft.com/office/drawing/2014/main" id="{04D1503A-EB65-44A0-A236-EB049C0F2FDA}"/>
-              </a:ext>
-            </a:extLst>
-          </p:cNvPr>
-          <p:cNvSpPr/>
-          <p:nvPr/>
-        </p:nvSpPr>
-        <p:spPr>
-          <a:xfrm>
-            <a:off x="2281650" y="2800350"/>
-            <a:ext cx="2473452" cy="628650"/>
-          </a:xfrm>
-          <a:prstGeom prst="rect">
-            <a:avLst/>
-          </a:prstGeom>
-          <a:solidFill>
-            <a:srgbClr val="FF0000"/>
-          </a:solidFill>
-          <a:ln>
-            <a:solidFill>
-              <a:srgbClr val="363636"/>
-            </a:solidFill>
-          </a:ln>
-        </p:spPr>
-        <p:style>
-          <a:lnRef idx="2">
-            <a:schemeClr val="accent1">
-              <a:shade val="50000"/>
-            </a:schemeClr>
-          </a:lnRef>
-          <a:fillRef idx="1">
-            <a:schemeClr val="accent1"/>
-          </a:fillRef>
-          <a:effectRef idx="0">
-            <a:schemeClr val="accent1"/>
-          </a:effectRef>
-          <a:fontRef idx="minor">
-            <a:schemeClr val="lt1"/>
-          </a:fontRef>
-        </p:style>
-        <p:txBody>
-          <a:bodyPr rtlCol="0" anchor="ctr"/>
-          <a:lstStyle/>
-          <a:p>
-            <a:pPr algn="ctr"/>
-            <a:r>
-              <a:rPr lang="pt-BR" sz="2400" b="1" dirty="0">
-                <a:solidFill>
-                  <a:schemeClr val="tx1"/>
-                </a:solidFill>
-              </a:rPr>
-              <a:t>Crítico</a:t>
-            </a:r>
-          </a:p>
-        </p:txBody>
-      </p:sp>
-      <p:sp>
-        <p:nvSpPr>
-          <p:cNvPr id="6" name="Retângulo 5">
-            <a:extLst>
-              <a:ext uri="{FF2B5EF4-FFF2-40B4-BE49-F238E27FC236}">
-                <a16:creationId xmlns:a16="http://schemas.microsoft.com/office/drawing/2014/main" id="{AC918E13-703C-45B4-9DD2-8A7F58A286EA}"/>
-              </a:ext>
-            </a:extLst>
-          </p:cNvPr>
-          <p:cNvSpPr/>
-          <p:nvPr/>
-        </p:nvSpPr>
-        <p:spPr>
-          <a:xfrm>
-            <a:off x="4755102" y="2800350"/>
-            <a:ext cx="2473452" cy="628650"/>
-          </a:xfrm>
-          <a:prstGeom prst="rect">
-            <a:avLst/>
-          </a:prstGeom>
-          <a:solidFill>
-            <a:srgbClr val="FFFF00"/>
-          </a:solidFill>
-          <a:ln>
-            <a:solidFill>
-              <a:srgbClr val="363636"/>
-            </a:solidFill>
-          </a:ln>
-        </p:spPr>
-        <p:style>
-          <a:lnRef idx="2">
-            <a:schemeClr val="accent1">
-              <a:shade val="50000"/>
-            </a:schemeClr>
-          </a:lnRef>
-          <a:fillRef idx="1">
-            <a:schemeClr val="accent1"/>
-          </a:fillRef>
-          <a:effectRef idx="0">
-            <a:schemeClr val="accent1"/>
-          </a:effectRef>
-          <a:fontRef idx="minor">
-            <a:schemeClr val="lt1"/>
-          </a:fontRef>
-        </p:style>
-        <p:txBody>
-          <a:bodyPr rtlCol="0" anchor="ctr"/>
-          <a:lstStyle/>
-          <a:p>
-            <a:pPr algn="ctr"/>
-            <a:r>
-              <a:rPr lang="pt-BR" sz="2400" b="1" dirty="0">
-                <a:solidFill>
-                  <a:schemeClr val="tx1"/>
-                </a:solidFill>
-              </a:rPr>
-              <a:t>Alerta</a:t>
-            </a:r>
-          </a:p>
-        </p:txBody>
-      </p:sp>
-      <p:sp>
-        <p:nvSpPr>
-          <p:cNvPr id="7" name="Retângulo 6">
-            <a:extLst>
-              <a:ext uri="{FF2B5EF4-FFF2-40B4-BE49-F238E27FC236}">
-                <a16:creationId xmlns:a16="http://schemas.microsoft.com/office/drawing/2014/main" id="{931C8D76-76CC-4B2F-97BF-3F2B3250FCC2}"/>
-              </a:ext>
-            </a:extLst>
-          </p:cNvPr>
-          <p:cNvSpPr/>
-          <p:nvPr/>
-        </p:nvSpPr>
-        <p:spPr>
-          <a:xfrm>
-            <a:off x="7228554" y="2800350"/>
-            <a:ext cx="2473452" cy="628650"/>
-          </a:xfrm>
-          <a:prstGeom prst="rect">
-            <a:avLst/>
-          </a:prstGeom>
-          <a:solidFill>
-            <a:srgbClr val="92D050"/>
-          </a:solidFill>
-          <a:ln>
-            <a:solidFill>
-              <a:srgbClr val="363636"/>
-            </a:solidFill>
-          </a:ln>
-        </p:spPr>
-        <p:style>
-          <a:lnRef idx="2">
-            <a:schemeClr val="accent1">
-              <a:shade val="50000"/>
-            </a:schemeClr>
-          </a:lnRef>
-          <a:fillRef idx="1">
-            <a:schemeClr val="accent1"/>
-          </a:fillRef>
-          <a:effectRef idx="0">
-            <a:schemeClr val="accent1"/>
-          </a:effectRef>
-          <a:fontRef idx="minor">
-            <a:schemeClr val="lt1"/>
-          </a:fontRef>
-        </p:style>
-        <p:txBody>
-          <a:bodyPr rtlCol="0" anchor="ctr"/>
-          <a:lstStyle/>
-          <a:p>
-            <a:pPr algn="ctr"/>
-            <a:r>
-              <a:rPr lang="pt-BR" sz="2400" b="1" dirty="0">
-                <a:solidFill>
-                  <a:schemeClr val="tx1"/>
-                </a:solidFill>
-              </a:rPr>
-              <a:t>Ideal</a:t>
-            </a:r>
-          </a:p>
-        </p:txBody>
-      </p:sp>
-      <p:sp>
-        <p:nvSpPr>
-          <p:cNvPr id="8" name="CaixaDeTexto 7">
-            <a:extLst>
-              <a:ext uri="{FF2B5EF4-FFF2-40B4-BE49-F238E27FC236}">
-                <a16:creationId xmlns:a16="http://schemas.microsoft.com/office/drawing/2014/main" id="{6B74AEB9-051D-4614-9B92-172E0A2A2A10}"/>
-              </a:ext>
-            </a:extLst>
-          </p:cNvPr>
-          <p:cNvSpPr txBox="1"/>
-          <p:nvPr/>
-        </p:nvSpPr>
-        <p:spPr>
-          <a:xfrm>
-            <a:off x="2281650" y="3429000"/>
-            <a:ext cx="2473452" cy="1569660"/>
-          </a:xfrm>
-          <a:prstGeom prst="rect">
-            <a:avLst/>
-          </a:prstGeom>
-          <a:noFill/>
-        </p:spPr>
-        <p:txBody>
-          <a:bodyPr wrap="square" rtlCol="0">
-            <a:spAutoFit/>
-          </a:bodyPr>
-          <a:lstStyle/>
-          <a:p>
-            <a:pPr marL="285750" indent="-285750">
-              <a:buFont typeface="Arial" panose="020B0604020202020204" pitchFamily="34" charset="0"/>
-              <a:buChar char="•"/>
-            </a:pPr>
-            <a:r>
-              <a:rPr lang="pt-BR" sz="1600" dirty="0"/>
-              <a:t>Armazenamento de órgão em risco com perda acelerada da capacidade isotérmica da caixa (temperaturas como 1,5ºC ou 7,4ºC)</a:t>
-            </a:r>
-          </a:p>
-        </p:txBody>
-      </p:sp>
-      <p:sp>
-        <p:nvSpPr>
-          <p:cNvPr id="9" name="CaixaDeTexto 8">
-            <a:extLst>
-              <a:ext uri="{FF2B5EF4-FFF2-40B4-BE49-F238E27FC236}">
-                <a16:creationId xmlns:a16="http://schemas.microsoft.com/office/drawing/2014/main" id="{FFC10006-4CEA-4F64-AB76-27F35ADDFB7D}"/>
-              </a:ext>
-            </a:extLst>
-          </p:cNvPr>
-          <p:cNvSpPr txBox="1"/>
-          <p:nvPr/>
-        </p:nvSpPr>
-        <p:spPr>
-          <a:xfrm>
-            <a:off x="4755102" y="3409890"/>
-            <a:ext cx="2473452" cy="1815882"/>
-          </a:xfrm>
-          <a:prstGeom prst="rect">
-            <a:avLst/>
-          </a:prstGeom>
-          <a:noFill/>
-        </p:spPr>
-        <p:txBody>
-          <a:bodyPr wrap="square" rtlCol="0">
-            <a:spAutoFit/>
-          </a:bodyPr>
-          <a:lstStyle/>
-          <a:p>
-            <a:pPr marL="285750" indent="-285750">
-              <a:buFont typeface="Arial" panose="020B0604020202020204" pitchFamily="34" charset="0"/>
-              <a:buChar char="•"/>
-            </a:pPr>
-            <a:r>
-              <a:rPr lang="pt-BR" sz="1600" dirty="0"/>
-              <a:t>Armazenamento de órgão em fase de atenção com risco de perda da capacidade isotérmica da caixa (temperaturas como 2,2ºC ou 5,6ºC)</a:t>
-            </a:r>
-          </a:p>
-        </p:txBody>
-      </p:sp>
-      <p:sp>
-        <p:nvSpPr>
-          <p:cNvPr id="10" name="CaixaDeTexto 9">
-            <a:extLst>
-              <a:ext uri="{FF2B5EF4-FFF2-40B4-BE49-F238E27FC236}">
-                <a16:creationId xmlns:a16="http://schemas.microsoft.com/office/drawing/2014/main" id="{43855983-95F8-48D4-852E-AC556D09EDF2}"/>
-              </a:ext>
-            </a:extLst>
-          </p:cNvPr>
-          <p:cNvSpPr txBox="1"/>
-          <p:nvPr/>
-        </p:nvSpPr>
-        <p:spPr>
-          <a:xfrm>
-            <a:off x="7228554" y="3409889"/>
-            <a:ext cx="2473452" cy="1569660"/>
-          </a:xfrm>
-          <a:prstGeom prst="rect">
-            <a:avLst/>
-          </a:prstGeom>
-          <a:noFill/>
-        </p:spPr>
-        <p:txBody>
-          <a:bodyPr wrap="square" rtlCol="0">
-            <a:spAutoFit/>
-          </a:bodyPr>
-          <a:lstStyle/>
-          <a:p>
-            <a:pPr marL="285750" indent="-285750">
-              <a:buFont typeface="Arial" panose="020B0604020202020204" pitchFamily="34" charset="0"/>
-              <a:buChar char="•"/>
-            </a:pPr>
-            <a:r>
-              <a:rPr lang="pt-BR" sz="1600" dirty="0"/>
-              <a:t>Armazenamento de órgão em fase ideal, sem risco de perda da capacidade isotérmica da caixa, mantendo-se entre 3,5ºC e 4ºC</a:t>
-            </a:r>
-          </a:p>
-        </p:txBody>
-      </p:sp>
+      <p:pic>
+        <p:nvPicPr>
+          <p:cNvPr id="5" name="Imagem 4">
+            <a:extLst>
+              <a:ext uri="{FF2B5EF4-FFF2-40B4-BE49-F238E27FC236}">
+                <a16:creationId xmlns:a16="http://schemas.microsoft.com/office/drawing/2014/main" id="{AE4465B0-C683-4D9D-A4C1-E31270CEAAB7}"/>
+              </a:ext>
+            </a:extLst>
+          </p:cNvPr>
+          <p:cNvPicPr>
+            <a:picLocks noChangeAspect="1"/>
+          </p:cNvPicPr>
+          <p:nvPr/>
+        </p:nvPicPr>
+        <p:blipFill>
+          <a:blip r:embed="rId2"/>
+          <a:stretch>
+            <a:fillRect/>
+          </a:stretch>
+        </p:blipFill>
+        <p:spPr>
+          <a:xfrm>
+            <a:off x="1020003" y="2190991"/>
+            <a:ext cx="10146276" cy="4261434"/>
+          </a:xfrm>
+          <a:prstGeom prst="rect">
+            <a:avLst/>
+          </a:prstGeom>
+        </p:spPr>
+      </p:pic>
     </p:spTree>
     <p:extLst>
       <p:ext uri="{BB962C8B-B14F-4D97-AF65-F5344CB8AC3E}">
-        <p14:creationId xmlns:p14="http://schemas.microsoft.com/office/powerpoint/2010/main" val="3144355391"/>
+        <p14:creationId xmlns:p14="http://schemas.microsoft.com/office/powerpoint/2010/main" val="3181802433"/>
       </p:ext>
     </p:extLst>
   </p:cSld>

</xml_diff>

<commit_message>
ultimos ajustes do projeto
</commit_message>
<xml_diff>
--- a/documentacao/Slide de apresentação sprint 3.pptx
+++ b/documentacao/Slide de apresentação sprint 3.pptx
@@ -17,9 +17,8 @@
     <p:sldId id="281" r:id="rId11"/>
     <p:sldId id="282" r:id="rId12"/>
     <p:sldId id="279" r:id="rId13"/>
-    <p:sldId id="280" r:id="rId14"/>
-    <p:sldId id="283" r:id="rId15"/>
-    <p:sldId id="272" r:id="rId16"/>
+    <p:sldId id="283" r:id="rId14"/>
+    <p:sldId id="272" r:id="rId15"/>
   </p:sldIdLst>
   <p:sldSz cx="12192000" cy="6858000"/>
   <p:notesSz cx="6858000" cy="9144000"/>
@@ -4160,194 +4159,6 @@
           <a:chExt cx="0" cy="0"/>
         </a:xfrm>
       </p:grpSpPr>
-      <p:pic>
-        <p:nvPicPr>
-          <p:cNvPr id="3" name="Imagem 2" descr="Ícone&#10;&#10;Descrição gerada automaticamente">
-            <a:extLst>
-              <a:ext uri="{FF2B5EF4-FFF2-40B4-BE49-F238E27FC236}">
-                <a16:creationId xmlns:a16="http://schemas.microsoft.com/office/drawing/2014/main" id="{E104A307-72F5-41D9-B5A8-9AFF91B33820}"/>
-              </a:ext>
-            </a:extLst>
-          </p:cNvPr>
-          <p:cNvPicPr>
-            <a:picLocks noChangeAspect="1"/>
-          </p:cNvPicPr>
-          <p:nvPr/>
-        </p:nvPicPr>
-        <p:blipFill>
-          <a:blip r:embed="rId2">
-            <a:extLst>
-              <a:ext uri="{28A0092B-C50C-407E-A947-70E740481C1C}">
-                <a14:useLocalDpi xmlns:a14="http://schemas.microsoft.com/office/drawing/2010/main" val="0"/>
-              </a:ext>
-            </a:extLst>
-          </a:blip>
-          <a:stretch>
-            <a:fillRect/>
-          </a:stretch>
-        </p:blipFill>
-        <p:spPr>
-          <a:xfrm>
-            <a:off x="884067" y="1274749"/>
-            <a:ext cx="4308497" cy="4308497"/>
-          </a:xfrm>
-          <a:prstGeom prst="rect">
-            <a:avLst/>
-          </a:prstGeom>
-        </p:spPr>
-      </p:pic>
-      <p:sp>
-        <p:nvSpPr>
-          <p:cNvPr id="4" name="Título 1">
-            <a:extLst>
-              <a:ext uri="{FF2B5EF4-FFF2-40B4-BE49-F238E27FC236}">
-                <a16:creationId xmlns:a16="http://schemas.microsoft.com/office/drawing/2014/main" id="{BE5BCEE3-3778-48B3-B70F-26DFD7843385}"/>
-              </a:ext>
-            </a:extLst>
-          </p:cNvPr>
-          <p:cNvSpPr txBox="1">
-            <a:spLocks/>
-          </p:cNvSpPr>
-          <p:nvPr/>
-        </p:nvSpPr>
-        <p:spPr>
-          <a:xfrm>
-            <a:off x="5616955" y="595759"/>
-            <a:ext cx="5442598" cy="2833239"/>
-          </a:xfrm>
-          <a:prstGeom prst="rect">
-            <a:avLst/>
-          </a:prstGeom>
-        </p:spPr>
-        <p:txBody>
-          <a:bodyPr vert="horz" lIns="91440" tIns="45720" rIns="91440" bIns="45720" rtlCol="0" anchor="b">
-            <a:noAutofit/>
-          </a:bodyPr>
-          <a:lstStyle>
-            <a:lvl1pPr algn="l" defTabSz="914400" rtl="0" eaLnBrk="1" latinLnBrk="0" hangingPunct="1">
-              <a:lnSpc>
-                <a:spcPct val="90000"/>
-              </a:lnSpc>
-              <a:spcBef>
-                <a:spcPct val="0"/>
-              </a:spcBef>
-              <a:buNone/>
-              <a:defRPr sz="4400" kern="1200">
-                <a:solidFill>
-                  <a:schemeClr val="tx1"/>
-                </a:solidFill>
-                <a:latin typeface="+mj-lt"/>
-                <a:ea typeface="+mj-ea"/>
-                <a:cs typeface="+mj-cs"/>
-              </a:defRPr>
-            </a:lvl1pPr>
-          </a:lstStyle>
-          <a:p>
-            <a:pPr algn="ctr"/>
-            <a:r>
-              <a:rPr lang="en-US" sz="6600" b="1" dirty="0">
-                <a:latin typeface="Neue Haas Grotesk Text Pro (Títulos)"/>
-              </a:rPr>
-              <a:t>Suporte do </a:t>
-            </a:r>
-            <a:r>
-              <a:rPr lang="en-US" sz="6600" b="1" dirty="0">
-                <a:solidFill>
-                  <a:srgbClr val="66CDAA"/>
-                </a:solidFill>
-                <a:latin typeface="Neue Haas Grotesk Text Pro (Títulos)"/>
-              </a:rPr>
-              <a:t>projeto:</a:t>
-            </a:r>
-          </a:p>
-          <a:p>
-            <a:pPr algn="ctr"/>
-            <a:r>
-              <a:rPr lang="en-US" sz="6600" b="1" dirty="0">
-                <a:latin typeface="Neue Haas Grotesk Text Pro (Títulos)"/>
-              </a:rPr>
-              <a:t>Zendesk</a:t>
-            </a:r>
-          </a:p>
-        </p:txBody>
-      </p:sp>
-      <p:pic>
-        <p:nvPicPr>
-          <p:cNvPr id="3074" name="Picture 2" descr="Zendesk icon - Free download on Iconfinder">
-            <a:extLst>
-              <a:ext uri="{FF2B5EF4-FFF2-40B4-BE49-F238E27FC236}">
-                <a16:creationId xmlns:a16="http://schemas.microsoft.com/office/drawing/2014/main" id="{5F581C65-6123-4328-BEDB-5D29C293A6E0}"/>
-              </a:ext>
-            </a:extLst>
-          </p:cNvPr>
-          <p:cNvPicPr>
-            <a:picLocks noChangeAspect="1" noChangeArrowheads="1"/>
-          </p:cNvPicPr>
-          <p:nvPr/>
-        </p:nvPicPr>
-        <p:blipFill>
-          <a:blip r:embed="rId3">
-            <a:extLst>
-              <a:ext uri="{28A0092B-C50C-407E-A947-70E740481C1C}">
-                <a14:useLocalDpi xmlns:a14="http://schemas.microsoft.com/office/drawing/2010/main" val="0"/>
-              </a:ext>
-            </a:extLst>
-          </a:blip>
-          <a:srcRect/>
-          <a:stretch>
-            <a:fillRect/>
-          </a:stretch>
-        </p:blipFill>
-        <p:spPr bwMode="auto">
-          <a:xfrm>
-            <a:off x="6999437" y="3428998"/>
-            <a:ext cx="2677633" cy="2677633"/>
-          </a:xfrm>
-          <a:prstGeom prst="rect">
-            <a:avLst/>
-          </a:prstGeom>
-          <a:noFill/>
-          <a:extLst>
-            <a:ext uri="{909E8E84-426E-40DD-AFC4-6F175D3DCCD1}">
-              <a14:hiddenFill xmlns:a14="http://schemas.microsoft.com/office/drawing/2010/main">
-                <a:solidFill>
-                  <a:srgbClr val="FFFFFF"/>
-                </a:solidFill>
-              </a14:hiddenFill>
-            </a:ext>
-          </a:extLst>
-        </p:spPr>
-      </p:pic>
-    </p:spTree>
-    <p:extLst>
-      <p:ext uri="{BB962C8B-B14F-4D97-AF65-F5344CB8AC3E}">
-        <p14:creationId xmlns:p14="http://schemas.microsoft.com/office/powerpoint/2010/main" val="3038810236"/>
-      </p:ext>
-    </p:extLst>
-  </p:cSld>
-  <p:clrMapOvr>
-    <a:masterClrMapping/>
-  </p:clrMapOvr>
-</p:sld>
-</file>
-
-<file path=ppt/slides/slide14.xml><?xml version="1.0" encoding="utf-8"?>
-<p:sld xmlns:a="http://schemas.openxmlformats.org/drawingml/2006/main" xmlns:r="http://schemas.openxmlformats.org/officeDocument/2006/relationships" xmlns:p="http://schemas.openxmlformats.org/presentationml/2006/main">
-  <p:cSld>
-    <p:spTree>
-      <p:nvGrpSpPr>
-        <p:cNvPr id="1" name=""/>
-        <p:cNvGrpSpPr/>
-        <p:nvPr/>
-      </p:nvGrpSpPr>
-      <p:grpSpPr>
-        <a:xfrm>
-          <a:off x="0" y="0"/>
-          <a:ext cx="0" cy="0"/>
-          <a:chOff x="0" y="0"/>
-          <a:chExt cx="0" cy="0"/>
-        </a:xfrm>
-      </p:grpSpPr>
       <p:sp>
         <p:nvSpPr>
           <p:cNvPr id="2" name="Título 1">
@@ -4498,7 +4309,7 @@
 </p:sld>
 </file>
 
-<file path=ppt/slides/slide15.xml><?xml version="1.0" encoding="utf-8"?>
+<file path=ppt/slides/slide14.xml><?xml version="1.0" encoding="utf-8"?>
 <p:sld xmlns:a="http://schemas.openxmlformats.org/drawingml/2006/main" xmlns:r="http://schemas.openxmlformats.org/officeDocument/2006/relationships" xmlns:p="http://schemas.openxmlformats.org/presentationml/2006/main">
   <p:cSld>
     <p:spTree>
@@ -5686,6 +5497,26 @@
           </a:bodyPr>
           <a:lstStyle/>
           <a:p>
+            <a:pPr marL="342900" indent="-342900">
+              <a:buFontTx/>
+              <a:buChar char="-"/>
+            </a:pPr>
+            <a:r>
+              <a:rPr lang="pt-BR" sz="4800" b="1" dirty="0"/>
+              <a:t>Notion</a:t>
+            </a:r>
+          </a:p>
+          <a:p>
+            <a:pPr marL="342900" indent="-342900">
+              <a:buFontTx/>
+              <a:buChar char="-"/>
+            </a:pPr>
+            <a:r>
+              <a:rPr lang="pt-BR" sz="4800" b="1" dirty="0"/>
+              <a:t>Gestão de riscos</a:t>
+            </a:r>
+          </a:p>
+          <a:p>
             <a:pPr marL="342900" indent="-342900" algn="ctr">
               <a:buFontTx/>
               <a:buChar char="-"/>
@@ -5693,26 +5524,6 @@
             <a:r>
               <a:rPr lang="pt-BR" sz="4800" b="1" dirty="0"/>
               <a:t>Ágil SCRUM</a:t>
-            </a:r>
-          </a:p>
-          <a:p>
-            <a:pPr marL="342900" indent="-342900">
-              <a:buFontTx/>
-              <a:buChar char="-"/>
-            </a:pPr>
-            <a:r>
-              <a:rPr lang="pt-BR" sz="4800" b="1" dirty="0"/>
-              <a:t>Notion</a:t>
-            </a:r>
-          </a:p>
-          <a:p>
-            <a:pPr marL="342900" indent="-342900">
-              <a:buFontTx/>
-              <a:buChar char="-"/>
-            </a:pPr>
-            <a:r>
-              <a:rPr lang="pt-BR" sz="4800" b="1" dirty="0"/>
-              <a:t>Gestão de riscos</a:t>
             </a:r>
           </a:p>
         </p:txBody>

</xml_diff>